<commit_message>
add to week4 docs
</commit_message>
<xml_diff>
--- a/Documentation/Weekly Report/week4/CMSC-4920-Group2-Week4.pptx
+++ b/Documentation/Weekly Report/week4/CMSC-4920-Group2-Week4.pptx
@@ -107,7 +107,20 @@
       </a:defRPr>
     </a:lvl9pPr>
   </p:defaultTextStyle>
+  <p:extLst>
+    <p:ext uri="{EFAFB233-063F-42B5-8137-9DF3F51BA10A}">
+      <p15:sldGuideLst xmlns:p15="http://schemas.microsoft.com/office/powerpoint/2012/main"/>
+    </p:ext>
+  </p:extLst>
 </p:presentation>
+</file>
+
+<file path=ppt/revisionInfo.xml><?xml version="1.0" encoding="utf-8"?>
+<p1510:revInfo xmlns:a="http://schemas.openxmlformats.org/drawingml/2006/main" xmlns:r="http://schemas.openxmlformats.org/officeDocument/2006/relationships" xmlns:p1510="http://schemas.microsoft.com/office/powerpoint/2015/10/main">
+  <p1510:revLst>
+    <p1510:client id="{37B8F5E0-7123-4539-B655-966C911AA931}" v="1" dt="2026-02-03T23:01:08.854"/>
+  </p1510:revLst>
+</p1510:revInfo>
 </file>
 
 <file path=ppt/changesInfos/changesInfo1.xml><?xml version="1.0" encoding="utf-8"?>
@@ -435,6 +448,94 @@
       </pc:sldMasterChg>
     </pc:docChg>
   </pc:docChgLst>
+  <pc:docChgLst>
+    <pc:chgData name="Margo Bonal" userId="18c9fa0f-b53d-478b-9dc0-6ad88786c19f" providerId="ADAL" clId="{93D479E5-F67F-4B8A-A78F-A0B574A116B6}"/>
+    <pc:docChg chg="undo custSel modSld">
+      <pc:chgData name="Margo Bonal" userId="18c9fa0f-b53d-478b-9dc0-6ad88786c19f" providerId="ADAL" clId="{93D479E5-F67F-4B8A-A78F-A0B574A116B6}" dt="2026-02-03T23:01:29.897" v="9" actId="14100"/>
+      <pc:docMkLst>
+        <pc:docMk/>
+      </pc:docMkLst>
+      <pc:sldChg chg="addSp delSp modSp mod setBg addAnim delAnim">
+        <pc:chgData name="Margo Bonal" userId="18c9fa0f-b53d-478b-9dc0-6ad88786c19f" providerId="ADAL" clId="{93D479E5-F67F-4B8A-A78F-A0B574A116B6}" dt="2026-02-03T23:01:29.897" v="9" actId="14100"/>
+        <pc:sldMkLst>
+          <pc:docMk/>
+          <pc:sldMk cId="1619079604" sldId="259"/>
+        </pc:sldMkLst>
+        <pc:spChg chg="mod">
+          <ac:chgData name="Margo Bonal" userId="18c9fa0f-b53d-478b-9dc0-6ad88786c19f" providerId="ADAL" clId="{93D479E5-F67F-4B8A-A78F-A0B574A116B6}" dt="2026-02-03T23:01:21.843" v="7" actId="26606"/>
+          <ac:spMkLst>
+            <pc:docMk/>
+            <pc:sldMk cId="1619079604" sldId="259"/>
+            <ac:spMk id="2" creationId="{6AEF2B38-CEDA-4975-20B3-61F49EDAA71B}"/>
+          </ac:spMkLst>
+        </pc:spChg>
+        <pc:spChg chg="del">
+          <ac:chgData name="Margo Bonal" userId="18c9fa0f-b53d-478b-9dc0-6ad88786c19f" providerId="ADAL" clId="{93D479E5-F67F-4B8A-A78F-A0B574A116B6}" dt="2026-02-03T23:00:52.954" v="0" actId="478"/>
+          <ac:spMkLst>
+            <pc:docMk/>
+            <pc:sldMk cId="1619079604" sldId="259"/>
+            <ac:spMk id="3" creationId="{C867833D-A874-AB71-87A3-CB3EF85D1241}"/>
+          </ac:spMkLst>
+        </pc:spChg>
+        <pc:spChg chg="add del">
+          <ac:chgData name="Margo Bonal" userId="18c9fa0f-b53d-478b-9dc0-6ad88786c19f" providerId="ADAL" clId="{93D479E5-F67F-4B8A-A78F-A0B574A116B6}" dt="2026-02-03T23:00:57.931" v="2" actId="22"/>
+          <ac:spMkLst>
+            <pc:docMk/>
+            <pc:sldMk cId="1619079604" sldId="259"/>
+            <ac:spMk id="5" creationId="{54D2AD5A-3A83-EE3E-0FB2-874D79CFDA22}"/>
+          </ac:spMkLst>
+        </pc:spChg>
+        <pc:spChg chg="add del">
+          <ac:chgData name="Margo Bonal" userId="18c9fa0f-b53d-478b-9dc0-6ad88786c19f" providerId="ADAL" clId="{93D479E5-F67F-4B8A-A78F-A0B574A116B6}" dt="2026-02-03T23:01:21.843" v="7" actId="26606"/>
+          <ac:spMkLst>
+            <pc:docMk/>
+            <pc:sldMk cId="1619079604" sldId="259"/>
+            <ac:spMk id="11" creationId="{774A975B-A886-5202-0489-6965514A0D14}"/>
+          </ac:spMkLst>
+        </pc:spChg>
+        <pc:spChg chg="add del">
+          <ac:chgData name="Margo Bonal" userId="18c9fa0f-b53d-478b-9dc0-6ad88786c19f" providerId="ADAL" clId="{93D479E5-F67F-4B8A-A78F-A0B574A116B6}" dt="2026-02-03T23:01:21.843" v="7" actId="26606"/>
+          <ac:spMkLst>
+            <pc:docMk/>
+            <pc:sldMk cId="1619079604" sldId="259"/>
+            <ac:spMk id="13" creationId="{EA67E988-5919-57BB-C7DE-D3EAD38A3045}"/>
+          </ac:spMkLst>
+        </pc:spChg>
+        <pc:spChg chg="add del">
+          <ac:chgData name="Margo Bonal" userId="18c9fa0f-b53d-478b-9dc0-6ad88786c19f" providerId="ADAL" clId="{93D479E5-F67F-4B8A-A78F-A0B574A116B6}" dt="2026-02-03T23:01:21.843" v="7" actId="26606"/>
+          <ac:spMkLst>
+            <pc:docMk/>
+            <pc:sldMk cId="1619079604" sldId="259"/>
+            <ac:spMk id="15" creationId="{FAF3766F-DEF3-4802-BB0D-7A18EDD9704F}"/>
+          </ac:spMkLst>
+        </pc:spChg>
+        <pc:spChg chg="add del">
+          <ac:chgData name="Margo Bonal" userId="18c9fa0f-b53d-478b-9dc0-6ad88786c19f" providerId="ADAL" clId="{93D479E5-F67F-4B8A-A78F-A0B574A116B6}" dt="2026-02-03T23:01:21.843" v="7" actId="26606"/>
+          <ac:spMkLst>
+            <pc:docMk/>
+            <pc:sldMk cId="1619079604" sldId="259"/>
+            <ac:spMk id="17" creationId="{B2C335F7-F61C-4EB4-80F2-4B1438FE66BB}"/>
+          </ac:spMkLst>
+        </pc:spChg>
+        <pc:spChg chg="add del">
+          <ac:chgData name="Margo Bonal" userId="18c9fa0f-b53d-478b-9dc0-6ad88786c19f" providerId="ADAL" clId="{93D479E5-F67F-4B8A-A78F-A0B574A116B6}" dt="2026-02-03T23:01:21.843" v="7" actId="26606"/>
+          <ac:spMkLst>
+            <pc:docMk/>
+            <pc:sldMk cId="1619079604" sldId="259"/>
+            <ac:spMk id="19" creationId="{E4C7F386-A972-9ED7-C153-F0E50968255B}"/>
+          </ac:spMkLst>
+        </pc:spChg>
+        <pc:picChg chg="add mod">
+          <ac:chgData name="Margo Bonal" userId="18c9fa0f-b53d-478b-9dc0-6ad88786c19f" providerId="ADAL" clId="{93D479E5-F67F-4B8A-A78F-A0B574A116B6}" dt="2026-02-03T23:01:29.897" v="9" actId="14100"/>
+          <ac:picMkLst>
+            <pc:docMk/>
+            <pc:sldMk cId="1619079604" sldId="259"/>
+            <ac:picMk id="6" creationId="{6D225721-0D4B-0F5E-1772-DBEBF94E117B}"/>
+          </ac:picMkLst>
+        </pc:picChg>
+      </pc:sldChg>
+    </pc:docChg>
+  </pc:docChgLst>
 </pc:chgInfo>
 </file>
 
@@ -721,7 +822,7 @@
           <a:p>
             <a:fld id="{E80C50CD-E178-4744-9B35-B2F624D6C5E9}" type="datetimeFigureOut">
               <a:rPr lang="en-US" smtClean="0"/>
-              <a:t>2/2/2026</a:t>
+              <a:t>2/3/2026</a:t>
             </a:fld>
             <a:endParaRPr lang="en-US"/>
           </a:p>
@@ -919,7 +1020,7 @@
           <a:p>
             <a:fld id="{E80C50CD-E178-4744-9B35-B2F624D6C5E9}" type="datetimeFigureOut">
               <a:rPr lang="en-US" smtClean="0"/>
-              <a:t>2/2/2026</a:t>
+              <a:t>2/3/2026</a:t>
             </a:fld>
             <a:endParaRPr lang="en-US"/>
           </a:p>
@@ -1127,7 +1228,7 @@
           <a:p>
             <a:fld id="{E80C50CD-E178-4744-9B35-B2F624D6C5E9}" type="datetimeFigureOut">
               <a:rPr lang="en-US" smtClean="0"/>
-              <a:t>2/2/2026</a:t>
+              <a:t>2/3/2026</a:t>
             </a:fld>
             <a:endParaRPr lang="en-US"/>
           </a:p>
@@ -1377,7 +1478,7 @@
           <a:p>
             <a:fld id="{E80C50CD-E178-4744-9B35-B2F624D6C5E9}" type="datetimeFigureOut">
               <a:rPr lang="en-US" smtClean="0"/>
-              <a:t>2/2/2026</a:t>
+              <a:t>2/3/2026</a:t>
             </a:fld>
             <a:endParaRPr lang="en-US"/>
           </a:p>
@@ -1656,7 +1757,7 @@
           <a:p>
             <a:fld id="{E80C50CD-E178-4744-9B35-B2F624D6C5E9}" type="datetimeFigureOut">
               <a:rPr lang="en-US" smtClean="0"/>
-              <a:t>2/2/2026</a:t>
+              <a:t>2/3/2026</a:t>
             </a:fld>
             <a:endParaRPr lang="en-US"/>
           </a:p>
@@ -1973,7 +2074,7 @@
           <a:p>
             <a:fld id="{E80C50CD-E178-4744-9B35-B2F624D6C5E9}" type="datetimeFigureOut">
               <a:rPr lang="en-US" smtClean="0"/>
-              <a:t>2/2/2026</a:t>
+              <a:t>2/3/2026</a:t>
             </a:fld>
             <a:endParaRPr lang="en-US"/>
           </a:p>
@@ -2389,7 +2490,7 @@
           <a:p>
             <a:fld id="{E80C50CD-E178-4744-9B35-B2F624D6C5E9}" type="datetimeFigureOut">
               <a:rPr lang="en-US" smtClean="0"/>
-              <a:t>2/2/2026</a:t>
+              <a:t>2/3/2026</a:t>
             </a:fld>
             <a:endParaRPr lang="en-US"/>
           </a:p>
@@ -2530,7 +2631,7 @@
           <a:p>
             <a:fld id="{E80C50CD-E178-4744-9B35-B2F624D6C5E9}" type="datetimeFigureOut">
               <a:rPr lang="en-US" smtClean="0"/>
-              <a:t>2/2/2026</a:t>
+              <a:t>2/3/2026</a:t>
             </a:fld>
             <a:endParaRPr lang="en-US"/>
           </a:p>
@@ -2643,7 +2744,7 @@
           <a:p>
             <a:fld id="{E80C50CD-E178-4744-9B35-B2F624D6C5E9}" type="datetimeFigureOut">
               <a:rPr lang="en-US" smtClean="0"/>
-              <a:t>2/2/2026</a:t>
+              <a:t>2/3/2026</a:t>
             </a:fld>
             <a:endParaRPr lang="en-US"/>
           </a:p>
@@ -2960,7 +3061,7 @@
           <a:p>
             <a:fld id="{E80C50CD-E178-4744-9B35-B2F624D6C5E9}" type="datetimeFigureOut">
               <a:rPr lang="en-US" smtClean="0"/>
-              <a:t>2/2/2026</a:t>
+              <a:t>2/3/2026</a:t>
             </a:fld>
             <a:endParaRPr lang="en-US"/>
           </a:p>
@@ -3252,7 +3353,7 @@
           <a:p>
             <a:fld id="{E80C50CD-E178-4744-9B35-B2F624D6C5E9}" type="datetimeFigureOut">
               <a:rPr lang="en-US" smtClean="0"/>
-              <a:t>2/2/2026</a:t>
+              <a:t>2/3/2026</a:t>
             </a:fld>
             <a:endParaRPr lang="en-US"/>
           </a:p>
@@ -3492,7 +3593,7 @@
             <a:fld id="{E80C50CD-E178-4744-9B35-B2F624D6C5E9}" type="datetimeFigureOut">
               <a:rPr lang="en-US" smtClean="0"/>
               <a:pPr/>
-              <a:t>2/2/2026</a:t>
+              <a:t>2/3/2026</a:t>
             </a:fld>
             <a:endParaRPr lang="en-US"/>
           </a:p>
@@ -4700,37 +4801,48 @@
           <a:lstStyle/>
           <a:p>
             <a:r>
-              <a:rPr lang="en-US" dirty="0"/>
+              <a:rPr lang="en-US"/>
               <a:t>Gant Chart Progress</a:t>
             </a:r>
-          </a:p>
-        </p:txBody>
-      </p:sp>
-      <p:sp>
-        <p:nvSpPr>
-          <p:cNvPr id="3" name="Content Placeholder 2">
-            <a:extLst>
-              <a:ext uri="{FF2B5EF4-FFF2-40B4-BE49-F238E27FC236}">
-                <a16:creationId xmlns:a16="http://schemas.microsoft.com/office/drawing/2014/main" id="{C867833D-A874-AB71-87A3-CB3EF85D1241}"/>
-              </a:ext>
-            </a:extLst>
-          </p:cNvPr>
-          <p:cNvSpPr>
-            <a:spLocks noGrp="1"/>
-          </p:cNvSpPr>
-          <p:nvPr>
-            <p:ph idx="1"/>
-          </p:nvPr>
-        </p:nvSpPr>
-        <p:spPr/>
-        <p:txBody>
-          <a:bodyPr/>
-          <a:lstStyle/>
-          <a:p>
-            <a:endParaRPr lang="en-US"/>
-          </a:p>
-        </p:txBody>
-      </p:sp>
+            <a:endParaRPr lang="en-US" dirty="0"/>
+          </a:p>
+        </p:txBody>
+      </p:sp>
+      <p:pic>
+        <p:nvPicPr>
+          <p:cNvPr id="6" name="Picture 5">
+            <a:extLst>
+              <a:ext uri="{FF2B5EF4-FFF2-40B4-BE49-F238E27FC236}">
+                <a16:creationId xmlns:a16="http://schemas.microsoft.com/office/drawing/2014/main" id="{6D225721-0D4B-0F5E-1772-DBEBF94E117B}"/>
+              </a:ext>
+            </a:extLst>
+          </p:cNvPr>
+          <p:cNvPicPr>
+            <a:picLocks noChangeAspect="1"/>
+          </p:cNvPicPr>
+          <p:nvPr/>
+        </p:nvPicPr>
+        <p:blipFill>
+          <a:blip r:embed="rId2"/>
+          <a:stretch>
+            <a:fillRect/>
+          </a:stretch>
+        </p:blipFill>
+        <p:spPr>
+          <a:xfrm>
+            <a:off x="666119" y="1795221"/>
+            <a:ext cx="11068839" cy="4744858"/>
+          </a:xfrm>
+          <a:prstGeom prst="rect">
+            <a:avLst/>
+          </a:prstGeom>
+          <a:ln>
+            <a:solidFill>
+              <a:schemeClr val="tx1"/>
+            </a:solidFill>
+          </a:ln>
+        </p:spPr>
+      </p:pic>
     </p:spTree>
     <p:extLst>
       <p:ext uri="{BB962C8B-B14F-4D97-AF65-F5344CB8AC3E}">

</xml_diff>

<commit_message>
Edited week 4 powerpoint
</commit_message>
<xml_diff>
--- a/Documentation/Weekly Report/week4/CMSC-4920-Group2-Week4.pptx
+++ b/Documentation/Weekly Report/week4/CMSC-4920-Group2-Week4.pptx
@@ -120,7 +120,7 @@
   <pc:docChgLst>
     <pc:chgData name="John Gerega" userId="bd3e1e46fb6a714b" providerId="LiveId" clId="{45F0C402-C550-4C82-B31D-5B32217A5E94}"/>
     <pc:docChg chg="custSel addSld modSld addMainMaster delMainMaster">
-      <pc:chgData name="John Gerega" userId="bd3e1e46fb6a714b" providerId="LiveId" clId="{45F0C402-C550-4C82-B31D-5B32217A5E94}" dt="2026-02-02T20:40:18.617" v="618" actId="20577"/>
+      <pc:chgData name="John Gerega" userId="bd3e1e46fb6a714b" providerId="LiveId" clId="{45F0C402-C550-4C82-B31D-5B32217A5E94}" dt="2026-02-07T17:26:54.361" v="699" actId="20577"/>
       <pc:docMkLst>
         <pc:docMk/>
       </pc:docMkLst>
@@ -195,7 +195,7 @@
         </pc:spChg>
       </pc:sldChg>
       <pc:sldChg chg="modSp new mod">
-        <pc:chgData name="John Gerega" userId="bd3e1e46fb6a714b" providerId="LiveId" clId="{45F0C402-C550-4C82-B31D-5B32217A5E94}" dt="2026-02-02T20:37:34.476" v="436" actId="20577"/>
+        <pc:chgData name="John Gerega" userId="bd3e1e46fb6a714b" providerId="LiveId" clId="{45F0C402-C550-4C82-B31D-5B32217A5E94}" dt="2026-02-07T17:26:54.361" v="699" actId="20577"/>
         <pc:sldMkLst>
           <pc:docMk/>
           <pc:sldMk cId="15834778" sldId="258"/>
@@ -230,6 +230,14 @@
             <pc:docMk/>
             <pc:sldMk cId="15834778" sldId="258"/>
             <ac:spMk id="5" creationId="{7B8A2A8B-28C1-02AA-9C1B-1B1315480A28}"/>
+          </ac:spMkLst>
+        </pc:spChg>
+        <pc:spChg chg="mod">
+          <ac:chgData name="John Gerega" userId="bd3e1e46fb6a714b" providerId="LiveId" clId="{45F0C402-C550-4C82-B31D-5B32217A5E94}" dt="2026-02-07T17:26:54.361" v="699" actId="20577"/>
+          <ac:spMkLst>
+            <pc:docMk/>
+            <pc:sldMk cId="15834778" sldId="258"/>
+            <ac:spMk id="6" creationId="{F191227A-06C8-D8A3-0CAF-897814B3001C}"/>
           </ac:spMkLst>
         </pc:spChg>
       </pc:sldChg>
@@ -687,7 +695,7 @@
           <a:p>
             <a:fld id="{E80C50CD-E178-4744-9B35-B2F624D6C5E9}" type="datetimeFigureOut">
               <a:rPr lang="en-US" smtClean="0"/>
-              <a:t>2/6/2026</a:t>
+              <a:t>2/7/2026</a:t>
             </a:fld>
             <a:endParaRPr lang="en-US"/>
           </a:p>
@@ -885,7 +893,7 @@
           <a:p>
             <a:fld id="{E80C50CD-E178-4744-9B35-B2F624D6C5E9}" type="datetimeFigureOut">
               <a:rPr lang="en-US" smtClean="0"/>
-              <a:t>2/6/2026</a:t>
+              <a:t>2/7/2026</a:t>
             </a:fld>
             <a:endParaRPr lang="en-US"/>
           </a:p>
@@ -1093,7 +1101,7 @@
           <a:p>
             <a:fld id="{E80C50CD-E178-4744-9B35-B2F624D6C5E9}" type="datetimeFigureOut">
               <a:rPr lang="en-US" smtClean="0"/>
-              <a:t>2/6/2026</a:t>
+              <a:t>2/7/2026</a:t>
             </a:fld>
             <a:endParaRPr lang="en-US"/>
           </a:p>
@@ -1343,7 +1351,7 @@
           <a:p>
             <a:fld id="{E80C50CD-E178-4744-9B35-B2F624D6C5E9}" type="datetimeFigureOut">
               <a:rPr lang="en-US" smtClean="0"/>
-              <a:t>2/6/2026</a:t>
+              <a:t>2/7/2026</a:t>
             </a:fld>
             <a:endParaRPr lang="en-US"/>
           </a:p>
@@ -1622,7 +1630,7 @@
           <a:p>
             <a:fld id="{E80C50CD-E178-4744-9B35-B2F624D6C5E9}" type="datetimeFigureOut">
               <a:rPr lang="en-US" smtClean="0"/>
-              <a:t>2/6/2026</a:t>
+              <a:t>2/7/2026</a:t>
             </a:fld>
             <a:endParaRPr lang="en-US"/>
           </a:p>
@@ -1939,7 +1947,7 @@
           <a:p>
             <a:fld id="{E80C50CD-E178-4744-9B35-B2F624D6C5E9}" type="datetimeFigureOut">
               <a:rPr lang="en-US" smtClean="0"/>
-              <a:t>2/6/2026</a:t>
+              <a:t>2/7/2026</a:t>
             </a:fld>
             <a:endParaRPr lang="en-US"/>
           </a:p>
@@ -2355,7 +2363,7 @@
           <a:p>
             <a:fld id="{E80C50CD-E178-4744-9B35-B2F624D6C5E9}" type="datetimeFigureOut">
               <a:rPr lang="en-US" smtClean="0"/>
-              <a:t>2/6/2026</a:t>
+              <a:t>2/7/2026</a:t>
             </a:fld>
             <a:endParaRPr lang="en-US"/>
           </a:p>
@@ -2496,7 +2504,7 @@
           <a:p>
             <a:fld id="{E80C50CD-E178-4744-9B35-B2F624D6C5E9}" type="datetimeFigureOut">
               <a:rPr lang="en-US" smtClean="0"/>
-              <a:t>2/6/2026</a:t>
+              <a:t>2/7/2026</a:t>
             </a:fld>
             <a:endParaRPr lang="en-US"/>
           </a:p>
@@ -2609,7 +2617,7 @@
           <a:p>
             <a:fld id="{E80C50CD-E178-4744-9B35-B2F624D6C5E9}" type="datetimeFigureOut">
               <a:rPr lang="en-US" smtClean="0"/>
-              <a:t>2/6/2026</a:t>
+              <a:t>2/7/2026</a:t>
             </a:fld>
             <a:endParaRPr lang="en-US"/>
           </a:p>
@@ -2926,7 +2934,7 @@
           <a:p>
             <a:fld id="{E80C50CD-E178-4744-9B35-B2F624D6C5E9}" type="datetimeFigureOut">
               <a:rPr lang="en-US" smtClean="0"/>
-              <a:t>2/6/2026</a:t>
+              <a:t>2/7/2026</a:t>
             </a:fld>
             <a:endParaRPr lang="en-US"/>
           </a:p>
@@ -3218,7 +3226,7 @@
           <a:p>
             <a:fld id="{E80C50CD-E178-4744-9B35-B2F624D6C5E9}" type="datetimeFigureOut">
               <a:rPr lang="en-US" smtClean="0"/>
-              <a:t>2/6/2026</a:t>
+              <a:t>2/7/2026</a:t>
             </a:fld>
             <a:endParaRPr lang="en-US"/>
           </a:p>
@@ -3458,7 +3466,7 @@
             <a:fld id="{E80C50CD-E178-4744-9B35-B2F624D6C5E9}" type="datetimeFigureOut">
               <a:rPr lang="en-US" smtClean="0"/>
               <a:pPr/>
-              <a:t>2/6/2026</a:t>
+              <a:t>2/7/2026</a:t>
             </a:fld>
             <a:endParaRPr lang="en-US"/>
           </a:p>
@@ -4530,6 +4538,12 @@
             </a:r>
           </a:p>
           <a:p>
+            <a:r>
+              <a:rPr lang="en-US" dirty="0"/>
+              <a:t>2. Struggle to filter data on leaderboard based on activity type</a:t>
+            </a:r>
+          </a:p>
+          <a:p>
             <a:pPr marL="0" indent="0">
               <a:buNone/>
             </a:pPr>

</xml_diff>

<commit_message>
finish report and slides
</commit_message>
<xml_diff>
--- a/Documentation/Weekly Report/week4/CMSC-4920-Group2-Week4.pptx
+++ b/Documentation/Weekly Report/week4/CMSC-4920-Group2-Week4.pptx
@@ -8,8 +8,9 @@
     <p:sldId id="256" r:id="rId2"/>
     <p:sldId id="258" r:id="rId3"/>
     <p:sldId id="260" r:id="rId4"/>
-    <p:sldId id="259" r:id="rId5"/>
-    <p:sldId id="265" r:id="rId6"/>
+    <p:sldId id="266" r:id="rId5"/>
+    <p:sldId id="259" r:id="rId6"/>
+    <p:sldId id="265" r:id="rId7"/>
   </p:sldIdLst>
   <p:sldSz cx="12192000" cy="6858000"/>
   <p:notesSz cx="6858000" cy="9144000"/>
@@ -116,64 +117,16 @@
 </p:presentation>
 </file>
 
+<file path=ppt/revisionInfo.xml><?xml version="1.0" encoding="utf-8"?>
+<p1510:revInfo xmlns:a="http://schemas.openxmlformats.org/drawingml/2006/main" xmlns:r="http://schemas.openxmlformats.org/officeDocument/2006/relationships" xmlns:p1510="http://schemas.microsoft.com/office/powerpoint/2015/10/main">
+  <p1510:revLst>
+    <p1510:client id="{37B8F5E0-7123-4539-B655-966C911AA931}" v="5" dt="2026-02-08T13:57:07.036"/>
+  </p1510:revLst>
+</p1510:revInfo>
+</file>
+
 <file path=ppt/changesInfos/changesInfo1.xml><?xml version="1.0" encoding="utf-8"?>
 <pc:chgInfo xmlns:a="http://schemas.openxmlformats.org/drawingml/2006/main" xmlns:r="http://schemas.openxmlformats.org/officeDocument/2006/relationships" xmlns:ac="http://schemas.microsoft.com/office/drawing/2013/main/command" xmlns:pc="http://schemas.microsoft.com/office/powerpoint/2013/main/command">
-  <pc:docChgLst>
-    <pc:chgData name="Margo Bonal" userId="18c9fa0f-b53d-478b-9dc0-6ad88786c19f" providerId="ADAL" clId="{93D479E5-F67F-4B8A-A78F-A0B574A116B6}"/>
-    <pc:docChg chg="undo custSel modSld">
-      <pc:chgData name="Margo Bonal" userId="18c9fa0f-b53d-478b-9dc0-6ad88786c19f" providerId="ADAL" clId="{93D479E5-F67F-4B8A-A78F-A0B574A116B6}" dt="2026-02-03T23:01:29.897" v="9" actId="14100"/>
-      <pc:docMkLst>
-        <pc:docMk/>
-      </pc:docMkLst>
-      <pc:sldChg chg="addSp delSp modSp mod setBg addAnim delAnim">
-        <pc:chgData name="Margo Bonal" userId="18c9fa0f-b53d-478b-9dc0-6ad88786c19f" providerId="ADAL" clId="{93D479E5-F67F-4B8A-A78F-A0B574A116B6}" dt="2026-02-03T23:01:29.897" v="9" actId="14100"/>
-        <pc:sldMkLst>
-          <pc:docMk/>
-          <pc:sldMk cId="1619079604" sldId="259"/>
-        </pc:sldMkLst>
-        <pc:spChg chg="mod">
-          <ac:chgData name="Margo Bonal" userId="18c9fa0f-b53d-478b-9dc0-6ad88786c19f" providerId="ADAL" clId="{93D479E5-F67F-4B8A-A78F-A0B574A116B6}" dt="2026-02-03T23:01:21.843" v="7" actId="26606"/>
-          <ac:spMkLst>
-            <pc:docMk/>
-            <pc:sldMk cId="1619079604" sldId="259"/>
-            <ac:spMk id="2" creationId="{6AEF2B38-CEDA-4975-20B3-61F49EDAA71B}"/>
-          </ac:spMkLst>
-        </pc:spChg>
-        <pc:picChg chg="add mod">
-          <ac:chgData name="Margo Bonal" userId="18c9fa0f-b53d-478b-9dc0-6ad88786c19f" providerId="ADAL" clId="{93D479E5-F67F-4B8A-A78F-A0B574A116B6}" dt="2026-02-03T23:01:29.897" v="9" actId="14100"/>
-          <ac:picMkLst>
-            <pc:docMk/>
-            <pc:sldMk cId="1619079604" sldId="259"/>
-            <ac:picMk id="6" creationId="{6D225721-0D4B-0F5E-1772-DBEBF94E117B}"/>
-          </ac:picMkLst>
-        </pc:picChg>
-      </pc:sldChg>
-    </pc:docChg>
-  </pc:docChgLst>
-  <pc:docChgLst>
-    <pc:chgData name="Luke ruffing" userId="c83d55373a9d0f60" providerId="LiveId" clId="{7F051426-1AF3-4D06-899D-16659997B519}"/>
-    <pc:docChg chg="custSel modSld">
-      <pc:chgData name="Luke ruffing" userId="c83d55373a9d0f60" providerId="LiveId" clId="{7F051426-1AF3-4D06-899D-16659997B519}" dt="2026-02-06T23:17:14.450" v="45" actId="5793"/>
-      <pc:docMkLst>
-        <pc:docMk/>
-      </pc:docMkLst>
-      <pc:sldChg chg="modSp mod">
-        <pc:chgData name="Luke ruffing" userId="c83d55373a9d0f60" providerId="LiveId" clId="{7F051426-1AF3-4D06-899D-16659997B519}" dt="2026-02-06T23:17:14.450" v="45" actId="5793"/>
-        <pc:sldMkLst>
-          <pc:docMk/>
-          <pc:sldMk cId="15834778" sldId="258"/>
-        </pc:sldMkLst>
-        <pc:spChg chg="mod">
-          <ac:chgData name="Luke ruffing" userId="c83d55373a9d0f60" providerId="LiveId" clId="{7F051426-1AF3-4D06-899D-16659997B519}" dt="2026-02-06T23:17:14.450" v="45" actId="5793"/>
-          <ac:spMkLst>
-            <pc:docMk/>
-            <pc:sldMk cId="15834778" sldId="258"/>
-            <ac:spMk id="6" creationId="{F191227A-06C8-D8A3-0CAF-897814B3001C}"/>
-          </ac:spMkLst>
-        </pc:spChg>
-      </pc:sldChg>
-    </pc:docChg>
-  </pc:docChgLst>
   <pc:docChgLst>
     <pc:chgData name="John Gerega" userId="bd3e1e46fb6a714b" providerId="LiveId" clId="{45F0C402-C550-4C82-B31D-5B32217A5E94}"/>
     <pc:docChg chg="custSel addSld modSld addMainMaster delMainMaster">
@@ -229,29 +182,6 @@
         </pc:picChg>
       </pc:sldChg>
       <pc:sldChg chg="modSp new mod">
-        <pc:chgData name="John Gerega" userId="bd3e1e46fb6a714b" providerId="LiveId" clId="{45F0C402-C550-4C82-B31D-5B32217A5E94}" dt="2026-02-02T20:38:25.089" v="584" actId="20577"/>
-        <pc:sldMkLst>
-          <pc:docMk/>
-          <pc:sldMk cId="3757417550" sldId="257"/>
-        </pc:sldMkLst>
-        <pc:spChg chg="mod">
-          <ac:chgData name="John Gerega" userId="bd3e1e46fb6a714b" providerId="LiveId" clId="{45F0C402-C550-4C82-B31D-5B32217A5E94}" dt="2026-02-02T20:37:56.056" v="445" actId="20577"/>
-          <ac:spMkLst>
-            <pc:docMk/>
-            <pc:sldMk cId="3757417550" sldId="257"/>
-            <ac:spMk id="2" creationId="{E7842A09-2E5C-19A8-AA60-5E9E7A570868}"/>
-          </ac:spMkLst>
-        </pc:spChg>
-        <pc:spChg chg="mod">
-          <ac:chgData name="John Gerega" userId="bd3e1e46fb6a714b" providerId="LiveId" clId="{45F0C402-C550-4C82-B31D-5B32217A5E94}" dt="2026-02-02T20:38:25.089" v="584" actId="20577"/>
-          <ac:spMkLst>
-            <pc:docMk/>
-            <pc:sldMk cId="3757417550" sldId="257"/>
-            <ac:spMk id="3" creationId="{66010F8E-0D09-78CB-9B21-BE691E563911}"/>
-          </ac:spMkLst>
-        </pc:spChg>
-      </pc:sldChg>
-      <pc:sldChg chg="modSp new mod">
         <pc:chgData name="John Gerega" userId="bd3e1e46fb6a714b" providerId="LiveId" clId="{45F0C402-C550-4C82-B31D-5B32217A5E94}" dt="2026-02-07T17:26:54.361" v="699" actId="20577"/>
         <pc:sldMkLst>
           <pc:docMk/>
@@ -279,14 +209,6 @@
             <pc:docMk/>
             <pc:sldMk cId="15834778" sldId="258"/>
             <ac:spMk id="4" creationId="{E561C6AA-9902-DF8F-9362-2CB01093FE3C}"/>
-          </ac:spMkLst>
-        </pc:spChg>
-        <pc:spChg chg="mod">
-          <ac:chgData name="John Gerega" userId="bd3e1e46fb6a714b" providerId="LiveId" clId="{45F0C402-C550-4C82-B31D-5B32217A5E94}" dt="2026-02-02T20:37:34.476" v="436" actId="20577"/>
-          <ac:spMkLst>
-            <pc:docMk/>
-            <pc:sldMk cId="15834778" sldId="258"/>
-            <ac:spMk id="5" creationId="{7B8A2A8B-28C1-02AA-9C1B-1B1315480A28}"/>
           </ac:spMkLst>
         </pc:spChg>
         <pc:spChg chg="mod">
@@ -410,171 +332,269 @@
       </pc:sldMasterChg>
     </pc:docChg>
   </pc:docChgLst>
+  <pc:docChgLst>
+    <pc:chgData name="Margo Bonal" userId="18c9fa0f-b53d-478b-9dc0-6ad88786c19f" providerId="ADAL" clId="{93D479E5-F67F-4B8A-A78F-A0B574A116B6}"/>
+    <pc:docChg chg="undo custSel addSld modSld">
+      <pc:chgData name="Margo Bonal" userId="18c9fa0f-b53d-478b-9dc0-6ad88786c19f" providerId="ADAL" clId="{93D479E5-F67F-4B8A-A78F-A0B574A116B6}" dt="2026-02-08T13:57:07.036" v="892" actId="12100"/>
+      <pc:docMkLst>
+        <pc:docMk/>
+      </pc:docMkLst>
+      <pc:sldChg chg="modSp mod">
+        <pc:chgData name="Margo Bonal" userId="18c9fa0f-b53d-478b-9dc0-6ad88786c19f" providerId="ADAL" clId="{93D479E5-F67F-4B8A-A78F-A0B574A116B6}" dt="2026-02-08T13:51:50.428" v="748" actId="20577"/>
+        <pc:sldMkLst>
+          <pc:docMk/>
+          <pc:sldMk cId="15834778" sldId="258"/>
+        </pc:sldMkLst>
+        <pc:spChg chg="mod">
+          <ac:chgData name="Margo Bonal" userId="18c9fa0f-b53d-478b-9dc0-6ad88786c19f" providerId="ADAL" clId="{93D479E5-F67F-4B8A-A78F-A0B574A116B6}" dt="2026-02-08T13:51:50.428" v="748" actId="20577"/>
+          <ac:spMkLst>
+            <pc:docMk/>
+            <pc:sldMk cId="15834778" sldId="258"/>
+            <ac:spMk id="4" creationId="{E561C6AA-9902-DF8F-9362-2CB01093FE3C}"/>
+          </ac:spMkLst>
+        </pc:spChg>
+      </pc:sldChg>
+      <pc:sldChg chg="addSp delSp modSp mod setBg addAnim delAnim">
+        <pc:chgData name="Margo Bonal" userId="18c9fa0f-b53d-478b-9dc0-6ad88786c19f" providerId="ADAL" clId="{93D479E5-F67F-4B8A-A78F-A0B574A116B6}" dt="2026-02-03T23:01:29.897" v="9" actId="14100"/>
+        <pc:sldMkLst>
+          <pc:docMk/>
+          <pc:sldMk cId="1619079604" sldId="259"/>
+        </pc:sldMkLst>
+        <pc:spChg chg="mod">
+          <ac:chgData name="Margo Bonal" userId="18c9fa0f-b53d-478b-9dc0-6ad88786c19f" providerId="ADAL" clId="{93D479E5-F67F-4B8A-A78F-A0B574A116B6}" dt="2026-02-03T23:01:21.843" v="7" actId="26606"/>
+          <ac:spMkLst>
+            <pc:docMk/>
+            <pc:sldMk cId="1619079604" sldId="259"/>
+            <ac:spMk id="2" creationId="{6AEF2B38-CEDA-4975-20B3-61F49EDAA71B}"/>
+          </ac:spMkLst>
+        </pc:spChg>
+        <pc:picChg chg="add mod">
+          <ac:chgData name="Margo Bonal" userId="18c9fa0f-b53d-478b-9dc0-6ad88786c19f" providerId="ADAL" clId="{93D479E5-F67F-4B8A-A78F-A0B574A116B6}" dt="2026-02-03T23:01:29.897" v="9" actId="14100"/>
+          <ac:picMkLst>
+            <pc:docMk/>
+            <pc:sldMk cId="1619079604" sldId="259"/>
+            <ac:picMk id="6" creationId="{6D225721-0D4B-0F5E-1772-DBEBF94E117B}"/>
+          </ac:picMkLst>
+        </pc:picChg>
+      </pc:sldChg>
+      <pc:sldChg chg="modSp mod">
+        <pc:chgData name="Margo Bonal" userId="18c9fa0f-b53d-478b-9dc0-6ad88786c19f" providerId="ADAL" clId="{93D479E5-F67F-4B8A-A78F-A0B574A116B6}" dt="2026-02-08T13:52:54.191" v="864" actId="313"/>
+        <pc:sldMkLst>
+          <pc:docMk/>
+          <pc:sldMk cId="3161600005" sldId="260"/>
+        </pc:sldMkLst>
+        <pc:spChg chg="mod">
+          <ac:chgData name="Margo Bonal" userId="18c9fa0f-b53d-478b-9dc0-6ad88786c19f" providerId="ADAL" clId="{93D479E5-F67F-4B8A-A78F-A0B574A116B6}" dt="2026-02-08T13:52:30.423" v="801" actId="20577"/>
+          <ac:spMkLst>
+            <pc:docMk/>
+            <pc:sldMk cId="3161600005" sldId="260"/>
+            <ac:spMk id="4" creationId="{776ECB18-DBAF-2BDD-C40E-4EABB40220F0}"/>
+          </ac:spMkLst>
+        </pc:spChg>
+        <pc:spChg chg="mod">
+          <ac:chgData name="Margo Bonal" userId="18c9fa0f-b53d-478b-9dc0-6ad88786c19f" providerId="ADAL" clId="{93D479E5-F67F-4B8A-A78F-A0B574A116B6}" dt="2026-02-08T13:52:54.191" v="864" actId="313"/>
+          <ac:spMkLst>
+            <pc:docMk/>
+            <pc:sldMk cId="3161600005" sldId="260"/>
+            <ac:spMk id="6" creationId="{088E4DDC-393B-1288-15A0-F2DC55C7EA64}"/>
+          </ac:spMkLst>
+        </pc:spChg>
+      </pc:sldChg>
+      <pc:sldChg chg="addSp modSp mod setBg">
+        <pc:chgData name="Margo Bonal" userId="18c9fa0f-b53d-478b-9dc0-6ad88786c19f" providerId="ADAL" clId="{93D479E5-F67F-4B8A-A78F-A0B574A116B6}" dt="2026-02-08T13:57:07.036" v="892" actId="12100"/>
+        <pc:sldMkLst>
+          <pc:docMk/>
+          <pc:sldMk cId="908531274" sldId="265"/>
+        </pc:sldMkLst>
+        <pc:spChg chg="mod">
+          <ac:chgData name="Margo Bonal" userId="18c9fa0f-b53d-478b-9dc0-6ad88786c19f" providerId="ADAL" clId="{93D479E5-F67F-4B8A-A78F-A0B574A116B6}" dt="2026-02-08T13:55:15.747" v="889" actId="26606"/>
+          <ac:spMkLst>
+            <pc:docMk/>
+            <pc:sldMk cId="908531274" sldId="265"/>
+            <ac:spMk id="2" creationId="{9CD0FCC9-9B2B-2FB9-60E5-72F1827F24DF}"/>
+          </ac:spMkLst>
+        </pc:spChg>
+        <pc:spChg chg="add">
+          <ac:chgData name="Margo Bonal" userId="18c9fa0f-b53d-478b-9dc0-6ad88786c19f" providerId="ADAL" clId="{93D479E5-F67F-4B8A-A78F-A0B574A116B6}" dt="2026-02-08T13:55:15.747" v="889" actId="26606"/>
+          <ac:spMkLst>
+            <pc:docMk/>
+            <pc:sldMk cId="908531274" sldId="265"/>
+            <ac:spMk id="28" creationId="{817D949E-564D-4503-A64E-D22FA3232C29}"/>
+          </ac:spMkLst>
+        </pc:spChg>
+        <pc:spChg chg="add">
+          <ac:chgData name="Margo Bonal" userId="18c9fa0f-b53d-478b-9dc0-6ad88786c19f" providerId="ADAL" clId="{93D479E5-F67F-4B8A-A78F-A0B574A116B6}" dt="2026-02-08T13:55:15.747" v="889" actId="26606"/>
+          <ac:spMkLst>
+            <pc:docMk/>
+            <pc:sldMk cId="908531274" sldId="265"/>
+            <ac:spMk id="30" creationId="{92BE0106-0C20-465B-A1BE-0BAC2737B1AD}"/>
+          </ac:spMkLst>
+        </pc:spChg>
+        <pc:spChg chg="add">
+          <ac:chgData name="Margo Bonal" userId="18c9fa0f-b53d-478b-9dc0-6ad88786c19f" providerId="ADAL" clId="{93D479E5-F67F-4B8A-A78F-A0B574A116B6}" dt="2026-02-08T13:55:15.747" v="889" actId="26606"/>
+          <ac:spMkLst>
+            <pc:docMk/>
+            <pc:sldMk cId="908531274" sldId="265"/>
+            <ac:spMk id="32" creationId="{851808AB-2943-464C-A710-F2A18D869334}"/>
+          </ac:spMkLst>
+        </pc:spChg>
+        <pc:graphicFrameChg chg="mod modGraphic">
+          <ac:chgData name="Margo Bonal" userId="18c9fa0f-b53d-478b-9dc0-6ad88786c19f" providerId="ADAL" clId="{93D479E5-F67F-4B8A-A78F-A0B574A116B6}" dt="2026-02-08T13:57:07.036" v="892" actId="12100"/>
+          <ac:graphicFrameMkLst>
+            <pc:docMk/>
+            <pc:sldMk cId="908531274" sldId="265"/>
+            <ac:graphicFrameMk id="23" creationId="{44CD89A8-8DA1-F116-3D4F-01244121EF2F}"/>
+          </ac:graphicFrameMkLst>
+        </pc:graphicFrameChg>
+      </pc:sldChg>
+      <pc:sldChg chg="delSp modSp new mod">
+        <pc:chgData name="Margo Bonal" userId="18c9fa0f-b53d-478b-9dc0-6ad88786c19f" providerId="ADAL" clId="{93D479E5-F67F-4B8A-A78F-A0B574A116B6}" dt="2026-02-08T13:54:39.835" v="888" actId="14100"/>
+        <pc:sldMkLst>
+          <pc:docMk/>
+          <pc:sldMk cId="291263137" sldId="266"/>
+        </pc:sldMkLst>
+        <pc:spChg chg="mod">
+          <ac:chgData name="Margo Bonal" userId="18c9fa0f-b53d-478b-9dc0-6ad88786c19f" providerId="ADAL" clId="{93D479E5-F67F-4B8A-A78F-A0B574A116B6}" dt="2026-02-08T13:53:12.305" v="884" actId="20577"/>
+          <ac:spMkLst>
+            <pc:docMk/>
+            <pc:sldMk cId="291263137" sldId="266"/>
+            <ac:spMk id="2" creationId="{550E036F-9CC8-EA49-B945-2716443B0D88}"/>
+          </ac:spMkLst>
+        </pc:spChg>
+        <pc:spChg chg="del">
+          <ac:chgData name="Margo Bonal" userId="18c9fa0f-b53d-478b-9dc0-6ad88786c19f" providerId="ADAL" clId="{93D479E5-F67F-4B8A-A78F-A0B574A116B6}" dt="2026-02-08T13:54:34.404" v="887" actId="21"/>
+          <ac:spMkLst>
+            <pc:docMk/>
+            <pc:sldMk cId="291263137" sldId="266"/>
+            <ac:spMk id="3" creationId="{7D1CFC71-2587-C6B9-0611-5CBB283752C5}"/>
+          </ac:spMkLst>
+        </pc:spChg>
+        <pc:spChg chg="mod">
+          <ac:chgData name="Margo Bonal" userId="18c9fa0f-b53d-478b-9dc0-6ad88786c19f" providerId="ADAL" clId="{93D479E5-F67F-4B8A-A78F-A0B574A116B6}" dt="2026-02-08T13:54:39.835" v="888" actId="14100"/>
+          <ac:spMkLst>
+            <pc:docMk/>
+            <pc:sldMk cId="291263137" sldId="266"/>
+            <ac:spMk id="4" creationId="{0330C9FD-8763-49EF-E294-3242410E144E}"/>
+          </ac:spMkLst>
+        </pc:spChg>
+        <pc:spChg chg="del">
+          <ac:chgData name="Margo Bonal" userId="18c9fa0f-b53d-478b-9dc0-6ad88786c19f" providerId="ADAL" clId="{93D479E5-F67F-4B8A-A78F-A0B574A116B6}" dt="2026-02-08T13:53:17.781" v="885" actId="21"/>
+          <ac:spMkLst>
+            <pc:docMk/>
+            <pc:sldMk cId="291263137" sldId="266"/>
+            <ac:spMk id="5" creationId="{30AD3A22-232F-E2CF-07BA-2F93F9E96965}"/>
+          </ac:spMkLst>
+        </pc:spChg>
+        <pc:spChg chg="del">
+          <ac:chgData name="Margo Bonal" userId="18c9fa0f-b53d-478b-9dc0-6ad88786c19f" providerId="ADAL" clId="{93D479E5-F67F-4B8A-A78F-A0B574A116B6}" dt="2026-02-08T13:53:20.937" v="886" actId="21"/>
+          <ac:spMkLst>
+            <pc:docMk/>
+            <pc:sldMk cId="291263137" sldId="266"/>
+            <ac:spMk id="6" creationId="{A95DA369-5598-AC33-41E7-D7C92E46E492}"/>
+          </ac:spMkLst>
+        </pc:spChg>
+      </pc:sldChg>
+    </pc:docChg>
+  </pc:docChgLst>
+  <pc:docChgLst>
+    <pc:chgData name="Luke ruffing" userId="c83d55373a9d0f60" providerId="LiveId" clId="{7F051426-1AF3-4D06-899D-16659997B519}"/>
+    <pc:docChg chg="custSel modSld">
+      <pc:chgData name="Luke ruffing" userId="c83d55373a9d0f60" providerId="LiveId" clId="{7F051426-1AF3-4D06-899D-16659997B519}" dt="2026-02-06T23:17:14.450" v="45" actId="5793"/>
+      <pc:docMkLst>
+        <pc:docMk/>
+      </pc:docMkLst>
+      <pc:sldChg chg="modSp mod">
+        <pc:chgData name="Luke ruffing" userId="c83d55373a9d0f60" providerId="LiveId" clId="{7F051426-1AF3-4D06-899D-16659997B519}" dt="2026-02-06T23:17:14.450" v="45" actId="5793"/>
+        <pc:sldMkLst>
+          <pc:docMk/>
+          <pc:sldMk cId="15834778" sldId="258"/>
+        </pc:sldMkLst>
+      </pc:sldChg>
+    </pc:docChg>
+  </pc:docChgLst>
 </pc:chgInfo>
 </file>
 
 <file path=ppt/diagrams/colors1.xml><?xml version="1.0" encoding="utf-8"?>
-<dgm:colorsDef xmlns:dgm="http://schemas.openxmlformats.org/drawingml/2006/diagram" xmlns:a="http://schemas.openxmlformats.org/drawingml/2006/main" uniqueId="urn:microsoft.com/office/officeart/2005/8/colors/accent2_2">
+<dgm:colorsDef xmlns:dgm="http://schemas.openxmlformats.org/drawingml/2006/diagram" xmlns:a="http://schemas.openxmlformats.org/drawingml/2006/main" uniqueId="urn:microsoft.com/office/officeart/2005/8/colors/accent0_1">
   <dgm:title val=""/>
   <dgm:desc val=""/>
   <dgm:catLst>
-    <dgm:cat type="accent2" pri="11200"/>
+    <dgm:cat type="mainScheme" pri="10100"/>
   </dgm:catLst>
   <dgm:styleLbl name="node0">
     <dgm:fillClrLst meth="repeat">
-      <a:schemeClr val="accent2"/>
+      <a:schemeClr val="lt1"/>
     </dgm:fillClrLst>
     <dgm:linClrLst meth="repeat">
-      <a:schemeClr val="lt1"/>
+      <a:schemeClr val="dk1">
+        <a:shade val="80000"/>
+      </a:schemeClr>
     </dgm:linClrLst>
     <dgm:effectClrLst/>
     <dgm:txLinClrLst/>
-    <dgm:txFillClrLst/>
+    <dgm:txFillClrLst meth="repeat">
+      <a:schemeClr val="dk1"/>
+    </dgm:txFillClrLst>
     <dgm:txEffectClrLst/>
   </dgm:styleLbl>
   <dgm:styleLbl name="node1">
     <dgm:fillClrLst meth="repeat">
-      <a:schemeClr val="accent2"/>
+      <a:schemeClr val="lt1"/>
     </dgm:fillClrLst>
     <dgm:linClrLst meth="repeat">
-      <a:schemeClr val="lt1"/>
+      <a:schemeClr val="dk1">
+        <a:shade val="80000"/>
+      </a:schemeClr>
     </dgm:linClrLst>
     <dgm:effectClrLst/>
     <dgm:txLinClrLst/>
-    <dgm:txFillClrLst/>
+    <dgm:txFillClrLst meth="repeat">
+      <a:schemeClr val="dk1"/>
+    </dgm:txFillClrLst>
     <dgm:txEffectClrLst/>
   </dgm:styleLbl>
   <dgm:styleLbl name="alignNode1">
     <dgm:fillClrLst meth="repeat">
-      <a:schemeClr val="accent2"/>
+      <a:schemeClr val="lt1"/>
     </dgm:fillClrLst>
     <dgm:linClrLst meth="repeat">
-      <a:schemeClr val="accent2"/>
+      <a:schemeClr val="dk1">
+        <a:shade val="80000"/>
+      </a:schemeClr>
     </dgm:linClrLst>
     <dgm:effectClrLst/>
     <dgm:txLinClrLst/>
-    <dgm:txFillClrLst/>
+    <dgm:txFillClrLst meth="repeat">
+      <a:schemeClr val="dk1"/>
+    </dgm:txFillClrLst>
     <dgm:txEffectClrLst/>
   </dgm:styleLbl>
   <dgm:styleLbl name="lnNode1">
     <dgm:fillClrLst meth="repeat">
-      <a:schemeClr val="accent2"/>
+      <a:schemeClr val="lt1"/>
     </dgm:fillClrLst>
     <dgm:linClrLst meth="repeat">
-      <a:schemeClr val="lt1"/>
+      <a:schemeClr val="dk1">
+        <a:shade val="80000"/>
+      </a:schemeClr>
     </dgm:linClrLst>
     <dgm:effectClrLst/>
     <dgm:txLinClrLst/>
-    <dgm:txFillClrLst/>
+    <dgm:txFillClrLst meth="repeat">
+      <a:schemeClr val="dk1"/>
+    </dgm:txFillClrLst>
     <dgm:txEffectClrLst/>
   </dgm:styleLbl>
   <dgm:styleLbl name="vennNode1">
     <dgm:fillClrLst meth="repeat">
-      <a:schemeClr val="accent2">
+      <a:schemeClr val="lt1">
         <a:alpha val="50000"/>
       </a:schemeClr>
     </dgm:fillClrLst>
     <dgm:linClrLst meth="repeat">
-      <a:schemeClr val="lt1"/>
-    </dgm:linClrLst>
-    <dgm:effectClrLst/>
-    <dgm:txLinClrLst/>
-    <dgm:txFillClrLst/>
-    <dgm:txEffectClrLst/>
-  </dgm:styleLbl>
-  <dgm:styleLbl name="node2">
-    <dgm:fillClrLst meth="repeat">
-      <a:schemeClr val="accent2"/>
-    </dgm:fillClrLst>
-    <dgm:linClrLst meth="repeat">
-      <a:schemeClr val="lt1"/>
-    </dgm:linClrLst>
-    <dgm:effectClrLst/>
-    <dgm:txLinClrLst/>
-    <dgm:txFillClrLst/>
-    <dgm:txEffectClrLst/>
-  </dgm:styleLbl>
-  <dgm:styleLbl name="node3">
-    <dgm:fillClrLst meth="repeat">
-      <a:schemeClr val="accent2"/>
-    </dgm:fillClrLst>
-    <dgm:linClrLst meth="repeat">
-      <a:schemeClr val="lt1"/>
-    </dgm:linClrLst>
-    <dgm:effectClrLst/>
-    <dgm:txLinClrLst/>
-    <dgm:txFillClrLst/>
-    <dgm:txEffectClrLst/>
-  </dgm:styleLbl>
-  <dgm:styleLbl name="node4">
-    <dgm:fillClrLst meth="repeat">
-      <a:schemeClr val="accent2"/>
-    </dgm:fillClrLst>
-    <dgm:linClrLst meth="repeat">
-      <a:schemeClr val="lt1"/>
-    </dgm:linClrLst>
-    <dgm:effectClrLst/>
-    <dgm:txLinClrLst/>
-    <dgm:txFillClrLst/>
-    <dgm:txEffectClrLst/>
-  </dgm:styleLbl>
-  <dgm:styleLbl name="fgImgPlace1">
-    <dgm:fillClrLst meth="repeat">
-      <a:schemeClr val="accent2">
-        <a:tint val="50000"/>
-      </a:schemeClr>
-    </dgm:fillClrLst>
-    <dgm:linClrLst meth="repeat">
-      <a:schemeClr val="lt1"/>
-    </dgm:linClrLst>
-    <dgm:effectClrLst/>
-    <dgm:txLinClrLst/>
-    <dgm:txFillClrLst meth="repeat">
-      <a:schemeClr val="lt1"/>
-    </dgm:txFillClrLst>
-    <dgm:txEffectClrLst/>
-  </dgm:styleLbl>
-  <dgm:styleLbl name="alignImgPlace1">
-    <dgm:fillClrLst meth="repeat">
-      <a:schemeClr val="accent2">
-        <a:tint val="50000"/>
-      </a:schemeClr>
-    </dgm:fillClrLst>
-    <dgm:linClrLst meth="repeat">
-      <a:schemeClr val="lt1"/>
-    </dgm:linClrLst>
-    <dgm:effectClrLst/>
-    <dgm:txLinClrLst/>
-    <dgm:txFillClrLst meth="repeat">
-      <a:schemeClr val="lt1"/>
-    </dgm:txFillClrLst>
-    <dgm:txEffectClrLst/>
-  </dgm:styleLbl>
-  <dgm:styleLbl name="bgImgPlace1">
-    <dgm:fillClrLst meth="repeat">
-      <a:schemeClr val="accent2">
-        <a:tint val="50000"/>
-      </a:schemeClr>
-    </dgm:fillClrLst>
-    <dgm:linClrLst meth="repeat">
-      <a:schemeClr val="lt1"/>
-    </dgm:linClrLst>
-    <dgm:effectClrLst/>
-    <dgm:txLinClrLst/>
-    <dgm:txFillClrLst meth="repeat">
-      <a:schemeClr val="lt1"/>
-    </dgm:txFillClrLst>
-    <dgm:txEffectClrLst/>
-  </dgm:styleLbl>
-  <dgm:styleLbl name="sibTrans2D1">
-    <dgm:fillClrLst meth="repeat">
-      <a:schemeClr val="accent2">
-        <a:tint val="60000"/>
-      </a:schemeClr>
-    </dgm:fillClrLst>
-    <dgm:linClrLst meth="repeat">
-      <a:schemeClr val="accent2">
-        <a:tint val="60000"/>
+      <a:schemeClr val="dk1">
+        <a:shade val="80000"/>
       </a:schemeClr>
     </dgm:linClrLst>
     <dgm:effectClrLst/>
@@ -582,137 +602,63 @@
     <dgm:txFillClrLst/>
     <dgm:txEffectClrLst/>
   </dgm:styleLbl>
-  <dgm:styleLbl name="fgSibTrans2D1">
+  <dgm:styleLbl name="node2">
     <dgm:fillClrLst meth="repeat">
-      <a:schemeClr val="accent2">
-        <a:tint val="60000"/>
-      </a:schemeClr>
+      <a:schemeClr val="lt1"/>
     </dgm:fillClrLst>
     <dgm:linClrLst meth="repeat">
-      <a:schemeClr val="accent2">
-        <a:tint val="60000"/>
-      </a:schemeClr>
-    </dgm:linClrLst>
-    <dgm:effectClrLst/>
-    <dgm:txLinClrLst/>
-    <dgm:txFillClrLst/>
-    <dgm:txEffectClrLst/>
-  </dgm:styleLbl>
-  <dgm:styleLbl name="bgSibTrans2D1">
-    <dgm:fillClrLst meth="repeat">
-      <a:schemeClr val="accent2">
-        <a:tint val="60000"/>
-      </a:schemeClr>
-    </dgm:fillClrLst>
-    <dgm:linClrLst meth="repeat">
-      <a:schemeClr val="accent2">
-        <a:tint val="60000"/>
-      </a:schemeClr>
-    </dgm:linClrLst>
-    <dgm:effectClrLst/>
-    <dgm:txLinClrLst/>
-    <dgm:txFillClrLst/>
-    <dgm:txEffectClrLst/>
-  </dgm:styleLbl>
-  <dgm:styleLbl name="sibTrans1D1">
-    <dgm:fillClrLst meth="repeat">
-      <a:schemeClr val="accent2"/>
-    </dgm:fillClrLst>
-    <dgm:linClrLst meth="repeat">
-      <a:schemeClr val="accent2"/>
-    </dgm:linClrLst>
-    <dgm:effectClrLst/>
-    <dgm:txLinClrLst/>
-    <dgm:txFillClrLst meth="repeat">
-      <a:schemeClr val="tx1"/>
-    </dgm:txFillClrLst>
-    <dgm:txEffectClrLst/>
-  </dgm:styleLbl>
-  <dgm:styleLbl name="callout">
-    <dgm:fillClrLst meth="repeat">
-      <a:schemeClr val="accent2"/>
-    </dgm:fillClrLst>
-    <dgm:linClrLst meth="repeat">
-      <a:schemeClr val="accent2">
-        <a:tint val="50000"/>
+      <a:schemeClr val="dk1">
+        <a:shade val="80000"/>
       </a:schemeClr>
     </dgm:linClrLst>
     <dgm:effectClrLst/>
     <dgm:txLinClrLst/>
     <dgm:txFillClrLst meth="repeat">
-      <a:schemeClr val="tx1"/>
+      <a:schemeClr val="dk1"/>
     </dgm:txFillClrLst>
     <dgm:txEffectClrLst/>
   </dgm:styleLbl>
-  <dgm:styleLbl name="asst0">
+  <dgm:styleLbl name="node3">
     <dgm:fillClrLst meth="repeat">
-      <a:schemeClr val="accent2"/>
+      <a:schemeClr val="lt1"/>
     </dgm:fillClrLst>
     <dgm:linClrLst meth="repeat">
-      <a:schemeClr val="lt1"/>
+      <a:schemeClr val="dk1">
+        <a:shade val="80000"/>
+      </a:schemeClr>
     </dgm:linClrLst>
     <dgm:effectClrLst/>
     <dgm:txLinClrLst/>
-    <dgm:txFillClrLst/>
+    <dgm:txFillClrLst meth="repeat">
+      <a:schemeClr val="dk1"/>
+    </dgm:txFillClrLst>
     <dgm:txEffectClrLst/>
   </dgm:styleLbl>
-  <dgm:styleLbl name="asst1">
+  <dgm:styleLbl name="node4">
     <dgm:fillClrLst meth="repeat">
-      <a:schemeClr val="accent2"/>
+      <a:schemeClr val="lt1"/>
     </dgm:fillClrLst>
     <dgm:linClrLst meth="repeat">
-      <a:schemeClr val="lt1"/>
+      <a:schemeClr val="dk1">
+        <a:shade val="80000"/>
+      </a:schemeClr>
     </dgm:linClrLst>
     <dgm:effectClrLst/>
     <dgm:txLinClrLst/>
-    <dgm:txFillClrLst/>
+    <dgm:txFillClrLst meth="repeat">
+      <a:schemeClr val="dk1"/>
+    </dgm:txFillClrLst>
     <dgm:txEffectClrLst/>
   </dgm:styleLbl>
-  <dgm:styleLbl name="asst2">
+  <dgm:styleLbl name="fgImgPlace1">
     <dgm:fillClrLst meth="repeat">
-      <a:schemeClr val="accent2"/>
-    </dgm:fillClrLst>
-    <dgm:linClrLst meth="repeat">
-      <a:schemeClr val="lt1"/>
-    </dgm:linClrLst>
-    <dgm:effectClrLst/>
-    <dgm:txLinClrLst/>
-    <dgm:txFillClrLst/>
-    <dgm:txEffectClrLst/>
-  </dgm:styleLbl>
-  <dgm:styleLbl name="asst3">
-    <dgm:fillClrLst meth="repeat">
-      <a:schemeClr val="accent2"/>
-    </dgm:fillClrLst>
-    <dgm:linClrLst meth="repeat">
-      <a:schemeClr val="lt1"/>
-    </dgm:linClrLst>
-    <dgm:effectClrLst/>
-    <dgm:txLinClrLst/>
-    <dgm:txFillClrLst/>
-    <dgm:txEffectClrLst/>
-  </dgm:styleLbl>
-  <dgm:styleLbl name="asst4">
-    <dgm:fillClrLst meth="repeat">
-      <a:schemeClr val="accent2"/>
-    </dgm:fillClrLst>
-    <dgm:linClrLst meth="repeat">
-      <a:schemeClr val="lt1"/>
-    </dgm:linClrLst>
-    <dgm:effectClrLst/>
-    <dgm:txLinClrLst/>
-    <dgm:txFillClrLst/>
-    <dgm:txEffectClrLst/>
-  </dgm:styleLbl>
-  <dgm:styleLbl name="parChTrans2D1">
-    <dgm:fillClrLst meth="repeat">
-      <a:schemeClr val="accent2">
-        <a:tint val="60000"/>
+      <a:schemeClr val="dk1">
+        <a:tint val="40000"/>
       </a:schemeClr>
     </dgm:fillClrLst>
     <dgm:linClrLst meth="repeat">
-      <a:schemeClr val="accent2">
-        <a:tint val="60000"/>
+      <a:schemeClr val="dk1">
+        <a:shade val="80000"/>
       </a:schemeClr>
     </dgm:linClrLst>
     <dgm:effectClrLst/>
@@ -722,12 +668,16 @@
     </dgm:txFillClrLst>
     <dgm:txEffectClrLst/>
   </dgm:styleLbl>
-  <dgm:styleLbl name="parChTrans2D2">
+  <dgm:styleLbl name="alignImgPlace1">
     <dgm:fillClrLst meth="repeat">
-      <a:schemeClr val="accent2"/>
+      <a:schemeClr val="dk1">
+        <a:tint val="40000"/>
+      </a:schemeClr>
     </dgm:fillClrLst>
     <dgm:linClrLst meth="repeat">
-      <a:schemeClr val="accent2"/>
+      <a:schemeClr val="dk1">
+        <a:shade val="80000"/>
+      </a:schemeClr>
     </dgm:linClrLst>
     <dgm:effectClrLst/>
     <dgm:txLinClrLst/>
@@ -736,12 +686,16 @@
     </dgm:txFillClrLst>
     <dgm:txEffectClrLst/>
   </dgm:styleLbl>
-  <dgm:styleLbl name="parChTrans2D3">
+  <dgm:styleLbl name="bgImgPlace1">
     <dgm:fillClrLst meth="repeat">
-      <a:schemeClr val="accent2"/>
+      <a:schemeClr val="dk1">
+        <a:tint val="40000"/>
+      </a:schemeClr>
     </dgm:fillClrLst>
     <dgm:linClrLst meth="repeat">
-      <a:schemeClr val="accent2"/>
+      <a:schemeClr val="dk1">
+        <a:shade val="80000"/>
+      </a:schemeClr>
     </dgm:linClrLst>
     <dgm:effectClrLst/>
     <dgm:txLinClrLst/>
@@ -750,12 +704,214 @@
     </dgm:txFillClrLst>
     <dgm:txEffectClrLst/>
   </dgm:styleLbl>
+  <dgm:styleLbl name="sibTrans2D1">
+    <dgm:fillClrLst meth="repeat">
+      <a:schemeClr val="dk1">
+        <a:tint val="60000"/>
+      </a:schemeClr>
+    </dgm:fillClrLst>
+    <dgm:linClrLst meth="repeat">
+      <a:schemeClr val="dk1">
+        <a:tint val="60000"/>
+      </a:schemeClr>
+    </dgm:linClrLst>
+    <dgm:effectClrLst/>
+    <dgm:txLinClrLst/>
+    <dgm:txFillClrLst meth="repeat">
+      <a:schemeClr val="dk1"/>
+    </dgm:txFillClrLst>
+    <dgm:txEffectClrLst/>
+  </dgm:styleLbl>
+  <dgm:styleLbl name="fgSibTrans2D1">
+    <dgm:fillClrLst meth="repeat">
+      <a:schemeClr val="dk1">
+        <a:tint val="60000"/>
+      </a:schemeClr>
+    </dgm:fillClrLst>
+    <dgm:linClrLst meth="repeat">
+      <a:schemeClr val="dk1">
+        <a:tint val="60000"/>
+      </a:schemeClr>
+    </dgm:linClrLst>
+    <dgm:effectClrLst/>
+    <dgm:txLinClrLst/>
+    <dgm:txFillClrLst meth="repeat">
+      <a:schemeClr val="dk1"/>
+    </dgm:txFillClrLst>
+    <dgm:txEffectClrLst/>
+  </dgm:styleLbl>
+  <dgm:styleLbl name="bgSibTrans2D1">
+    <dgm:fillClrLst meth="repeat">
+      <a:schemeClr val="dk1">
+        <a:tint val="60000"/>
+      </a:schemeClr>
+    </dgm:fillClrLst>
+    <dgm:linClrLst meth="repeat">
+      <a:schemeClr val="dk1">
+        <a:tint val="60000"/>
+      </a:schemeClr>
+    </dgm:linClrLst>
+    <dgm:effectClrLst/>
+    <dgm:txLinClrLst/>
+    <dgm:txFillClrLst meth="repeat">
+      <a:schemeClr val="dk1"/>
+    </dgm:txFillClrLst>
+    <dgm:txEffectClrLst/>
+  </dgm:styleLbl>
+  <dgm:styleLbl name="sibTrans1D1">
+    <dgm:fillClrLst meth="repeat">
+      <a:schemeClr val="dk1"/>
+    </dgm:fillClrLst>
+    <dgm:linClrLst meth="repeat">
+      <a:schemeClr val="dk1"/>
+    </dgm:linClrLst>
+    <dgm:effectClrLst/>
+    <dgm:txLinClrLst/>
+    <dgm:txFillClrLst meth="repeat">
+      <a:schemeClr val="tx1"/>
+    </dgm:txFillClrLst>
+    <dgm:txEffectClrLst/>
+  </dgm:styleLbl>
+  <dgm:styleLbl name="callout">
+    <dgm:fillClrLst meth="repeat">
+      <a:schemeClr val="dk1"/>
+    </dgm:fillClrLst>
+    <dgm:linClrLst meth="repeat">
+      <a:schemeClr val="dk1"/>
+    </dgm:linClrLst>
+    <dgm:effectClrLst/>
+    <dgm:txLinClrLst/>
+    <dgm:txFillClrLst meth="repeat">
+      <a:schemeClr val="tx1"/>
+    </dgm:txFillClrLst>
+    <dgm:txEffectClrLst/>
+  </dgm:styleLbl>
+  <dgm:styleLbl name="asst0">
+    <dgm:fillClrLst meth="repeat">
+      <a:schemeClr val="lt1"/>
+    </dgm:fillClrLst>
+    <dgm:linClrLst meth="repeat">
+      <a:schemeClr val="dk1">
+        <a:shade val="80000"/>
+      </a:schemeClr>
+    </dgm:linClrLst>
+    <dgm:effectClrLst/>
+    <dgm:txLinClrLst/>
+    <dgm:txFillClrLst meth="repeat">
+      <a:schemeClr val="dk1"/>
+    </dgm:txFillClrLst>
+    <dgm:txEffectClrLst/>
+  </dgm:styleLbl>
+  <dgm:styleLbl name="asst1">
+    <dgm:fillClrLst meth="repeat">
+      <a:schemeClr val="lt1"/>
+    </dgm:fillClrLst>
+    <dgm:linClrLst meth="repeat">
+      <a:schemeClr val="dk1">
+        <a:shade val="80000"/>
+      </a:schemeClr>
+    </dgm:linClrLst>
+    <dgm:effectClrLst/>
+    <dgm:txLinClrLst/>
+    <dgm:txFillClrLst meth="repeat">
+      <a:schemeClr val="dk1"/>
+    </dgm:txFillClrLst>
+    <dgm:txEffectClrLst/>
+  </dgm:styleLbl>
+  <dgm:styleLbl name="asst2">
+    <dgm:fillClrLst meth="repeat">
+      <a:schemeClr val="lt1"/>
+    </dgm:fillClrLst>
+    <dgm:linClrLst meth="repeat">
+      <a:schemeClr val="dk1">
+        <a:shade val="80000"/>
+      </a:schemeClr>
+    </dgm:linClrLst>
+    <dgm:effectClrLst/>
+    <dgm:txLinClrLst/>
+    <dgm:txFillClrLst meth="repeat">
+      <a:schemeClr val="dk1"/>
+    </dgm:txFillClrLst>
+    <dgm:txEffectClrLst/>
+  </dgm:styleLbl>
+  <dgm:styleLbl name="asst3">
+    <dgm:fillClrLst meth="repeat">
+      <a:schemeClr val="lt1"/>
+    </dgm:fillClrLst>
+    <dgm:linClrLst meth="repeat">
+      <a:schemeClr val="dk1">
+        <a:shade val="80000"/>
+      </a:schemeClr>
+    </dgm:linClrLst>
+    <dgm:effectClrLst/>
+    <dgm:txLinClrLst/>
+    <dgm:txFillClrLst meth="repeat">
+      <a:schemeClr val="dk1"/>
+    </dgm:txFillClrLst>
+    <dgm:txEffectClrLst/>
+  </dgm:styleLbl>
+  <dgm:styleLbl name="asst4">
+    <dgm:fillClrLst meth="repeat">
+      <a:schemeClr val="lt1"/>
+    </dgm:fillClrLst>
+    <dgm:linClrLst meth="repeat">
+      <a:schemeClr val="dk1">
+        <a:shade val="80000"/>
+      </a:schemeClr>
+    </dgm:linClrLst>
+    <dgm:effectClrLst/>
+    <dgm:txLinClrLst/>
+    <dgm:txFillClrLst meth="repeat">
+      <a:schemeClr val="dk1"/>
+    </dgm:txFillClrLst>
+    <dgm:txEffectClrLst/>
+  </dgm:styleLbl>
+  <dgm:styleLbl name="parChTrans2D1">
+    <dgm:fillClrLst meth="repeat">
+      <a:schemeClr val="dk1">
+        <a:tint val="60000"/>
+      </a:schemeClr>
+    </dgm:fillClrLst>
+    <dgm:linClrLst meth="repeat">
+      <a:schemeClr val="dk1">
+        <a:tint val="60000"/>
+      </a:schemeClr>
+    </dgm:linClrLst>
+    <dgm:effectClrLst/>
+    <dgm:txLinClrLst/>
+    <dgm:txFillClrLst/>
+    <dgm:txEffectClrLst/>
+  </dgm:styleLbl>
+  <dgm:styleLbl name="parChTrans2D2">
+    <dgm:fillClrLst meth="repeat">
+      <a:schemeClr val="dk1"/>
+    </dgm:fillClrLst>
+    <dgm:linClrLst meth="repeat">
+      <a:schemeClr val="dk1"/>
+    </dgm:linClrLst>
+    <dgm:effectClrLst/>
+    <dgm:txLinClrLst/>
+    <dgm:txFillClrLst/>
+    <dgm:txEffectClrLst/>
+  </dgm:styleLbl>
+  <dgm:styleLbl name="parChTrans2D3">
+    <dgm:fillClrLst meth="repeat">
+      <a:schemeClr val="dk1"/>
+    </dgm:fillClrLst>
+    <dgm:linClrLst meth="repeat">
+      <a:schemeClr val="dk1"/>
+    </dgm:linClrLst>
+    <dgm:effectClrLst/>
+    <dgm:txLinClrLst/>
+    <dgm:txFillClrLst/>
+    <dgm:txEffectClrLst/>
+  </dgm:styleLbl>
   <dgm:styleLbl name="parChTrans2D4">
     <dgm:fillClrLst meth="repeat">
-      <a:schemeClr val="accent2"/>
+      <a:schemeClr val="dk1"/>
     </dgm:fillClrLst>
     <dgm:linClrLst meth="repeat">
-      <a:schemeClr val="accent2"/>
+      <a:schemeClr val="dk1"/>
     </dgm:linClrLst>
     <dgm:effectClrLst/>
     <dgm:txLinClrLst/>
@@ -766,10 +922,10 @@
   </dgm:styleLbl>
   <dgm:styleLbl name="parChTrans1D1">
     <dgm:fillClrLst meth="repeat">
-      <a:schemeClr val="accent2"/>
+      <a:schemeClr val="dk1"/>
     </dgm:fillClrLst>
     <dgm:linClrLst meth="repeat">
-      <a:schemeClr val="accent2">
+      <a:schemeClr val="dk1">
         <a:shade val="60000"/>
       </a:schemeClr>
     </dgm:linClrLst>
@@ -782,10 +938,10 @@
   </dgm:styleLbl>
   <dgm:styleLbl name="parChTrans1D2">
     <dgm:fillClrLst meth="repeat">
-      <a:schemeClr val="accent2"/>
+      <a:schemeClr val="dk1"/>
     </dgm:fillClrLst>
     <dgm:linClrLst meth="repeat">
-      <a:schemeClr val="accent2">
+      <a:schemeClr val="dk1">
         <a:shade val="60000"/>
       </a:schemeClr>
     </dgm:linClrLst>
@@ -798,10 +954,10 @@
   </dgm:styleLbl>
   <dgm:styleLbl name="parChTrans1D3">
     <dgm:fillClrLst meth="repeat">
-      <a:schemeClr val="accent2"/>
+      <a:schemeClr val="dk1"/>
     </dgm:fillClrLst>
     <dgm:linClrLst meth="repeat">
-      <a:schemeClr val="accent2">
+      <a:schemeClr val="dk1">
         <a:shade val="80000"/>
       </a:schemeClr>
     </dgm:linClrLst>
@@ -814,10 +970,10 @@
   </dgm:styleLbl>
   <dgm:styleLbl name="parChTrans1D4">
     <dgm:fillClrLst meth="repeat">
-      <a:schemeClr val="accent2"/>
+      <a:schemeClr val="dk1"/>
     </dgm:fillClrLst>
     <dgm:linClrLst meth="repeat">
-      <a:schemeClr val="accent2">
+      <a:schemeClr val="dk1">
         <a:shade val="80000"/>
       </a:schemeClr>
     </dgm:linClrLst>
@@ -830,12 +986,13 @@
   </dgm:styleLbl>
   <dgm:styleLbl name="fgAcc1">
     <dgm:fillClrLst meth="repeat">
-      <a:schemeClr val="lt1">
+      <a:schemeClr val="dk1">
         <a:alpha val="90000"/>
+        <a:tint val="40000"/>
       </a:schemeClr>
     </dgm:fillClrLst>
     <dgm:linClrLst meth="repeat">
-      <a:schemeClr val="accent2"/>
+      <a:schemeClr val="dk1"/>
     </dgm:linClrLst>
     <dgm:effectClrLst/>
     <dgm:txLinClrLst/>
@@ -846,12 +1003,13 @@
   </dgm:styleLbl>
   <dgm:styleLbl name="conFgAcc1">
     <dgm:fillClrLst meth="repeat">
-      <a:schemeClr val="lt1">
+      <a:schemeClr val="dk1">
         <a:alpha val="90000"/>
+        <a:tint val="40000"/>
       </a:schemeClr>
     </dgm:fillClrLst>
     <dgm:linClrLst meth="repeat">
-      <a:schemeClr val="accent2"/>
+      <a:schemeClr val="dk1"/>
     </dgm:linClrLst>
     <dgm:effectClrLst/>
     <dgm:txLinClrLst/>
@@ -862,12 +1020,13 @@
   </dgm:styleLbl>
   <dgm:styleLbl name="alignAcc1">
     <dgm:fillClrLst meth="repeat">
-      <a:schemeClr val="lt1">
+      <a:schemeClr val="dk1">
         <a:alpha val="90000"/>
+        <a:tint val="40000"/>
       </a:schemeClr>
     </dgm:fillClrLst>
     <dgm:linClrLst meth="repeat">
-      <a:schemeClr val="accent2"/>
+      <a:schemeClr val="dk1"/>
     </dgm:linClrLst>
     <dgm:effectClrLst/>
     <dgm:txLinClrLst/>
@@ -878,12 +1037,13 @@
   </dgm:styleLbl>
   <dgm:styleLbl name="trAlignAcc1">
     <dgm:fillClrLst meth="repeat">
-      <a:schemeClr val="lt1">
+      <a:schemeClr val="dk1">
         <a:alpha val="40000"/>
+        <a:tint val="40000"/>
       </a:schemeClr>
     </dgm:fillClrLst>
     <dgm:linClrLst meth="repeat">
-      <a:schemeClr val="accent2"/>
+      <a:schemeClr val="dk1"/>
     </dgm:linClrLst>
     <dgm:effectClrLst/>
     <dgm:txLinClrLst/>
@@ -894,12 +1054,13 @@
   </dgm:styleLbl>
   <dgm:styleLbl name="bgAcc1">
     <dgm:fillClrLst meth="repeat">
-      <a:schemeClr val="lt1">
+      <a:schemeClr val="dk1">
         <a:alpha val="90000"/>
+        <a:tint val="40000"/>
       </a:schemeClr>
     </dgm:fillClrLst>
     <dgm:linClrLst meth="repeat">
-      <a:schemeClr val="accent2"/>
+      <a:schemeClr val="dk1"/>
     </dgm:linClrLst>
     <dgm:effectClrLst/>
     <dgm:txLinClrLst/>
@@ -913,7 +1074,7 @@
       <a:schemeClr val="lt1"/>
     </dgm:fillClrLst>
     <dgm:linClrLst meth="repeat">
-      <a:schemeClr val="accent2"/>
+      <a:schemeClr val="dk1"/>
     </dgm:linClrLst>
     <dgm:effectClrLst/>
     <dgm:txLinClrLst/>
@@ -927,7 +1088,7 @@
       <a:schemeClr val="lt1"/>
     </dgm:fillClrLst>
     <dgm:linClrLst meth="repeat">
-      <a:schemeClr val="accent2"/>
+      <a:schemeClr val="dk1"/>
     </dgm:linClrLst>
     <dgm:effectClrLst/>
     <dgm:txLinClrLst/>
@@ -941,7 +1102,7 @@
       <a:schemeClr val="lt1"/>
     </dgm:fillClrLst>
     <dgm:linClrLst meth="repeat">
-      <a:schemeClr val="accent2"/>
+      <a:schemeClr val="dk1"/>
     </dgm:linClrLst>
     <dgm:effectClrLst/>
     <dgm:txLinClrLst/>
@@ -952,15 +1113,14 @@
   </dgm:styleLbl>
   <dgm:styleLbl name="fgAccFollowNode1">
     <dgm:fillClrLst meth="repeat">
-      <a:schemeClr val="accent2">
+      <a:schemeClr val="lt1">
         <a:alpha val="90000"/>
         <a:tint val="40000"/>
       </a:schemeClr>
     </dgm:fillClrLst>
     <dgm:linClrLst meth="repeat">
-      <a:schemeClr val="accent2">
+      <a:schemeClr val="dk1">
         <a:alpha val="90000"/>
-        <a:tint val="40000"/>
       </a:schemeClr>
     </dgm:linClrLst>
     <dgm:effectClrLst/>
@@ -972,15 +1132,14 @@
   </dgm:styleLbl>
   <dgm:styleLbl name="alignAccFollowNode1">
     <dgm:fillClrLst meth="repeat">
-      <a:schemeClr val="accent2">
+      <a:schemeClr val="lt1">
         <a:alpha val="90000"/>
         <a:tint val="40000"/>
       </a:schemeClr>
     </dgm:fillClrLst>
     <dgm:linClrLst meth="repeat">
-      <a:schemeClr val="accent2">
+      <a:schemeClr val="dk1">
         <a:alpha val="90000"/>
-        <a:tint val="40000"/>
       </a:schemeClr>
     </dgm:linClrLst>
     <dgm:effectClrLst/>
@@ -992,15 +1151,14 @@
   </dgm:styleLbl>
   <dgm:styleLbl name="bgAccFollowNode1">
     <dgm:fillClrLst meth="repeat">
-      <a:schemeClr val="accent2">
+      <a:schemeClr val="lt1">
         <a:alpha val="90000"/>
         <a:tint val="40000"/>
       </a:schemeClr>
     </dgm:fillClrLst>
     <dgm:linClrLst meth="repeat">
-      <a:schemeClr val="accent2">
+      <a:schemeClr val="dk1">
         <a:alpha val="90000"/>
-        <a:tint val="40000"/>
       </a:schemeClr>
     </dgm:linClrLst>
     <dgm:effectClrLst/>
@@ -1012,12 +1170,13 @@
   </dgm:styleLbl>
   <dgm:styleLbl name="fgAcc0">
     <dgm:fillClrLst meth="repeat">
-      <a:schemeClr val="lt1">
+      <a:schemeClr val="dk1">
         <a:alpha val="90000"/>
+        <a:tint val="40000"/>
       </a:schemeClr>
     </dgm:fillClrLst>
     <dgm:linClrLst meth="repeat">
-      <a:schemeClr val="accent2"/>
+      <a:schemeClr val="dk1"/>
     </dgm:linClrLst>
     <dgm:effectClrLst/>
     <dgm:txLinClrLst/>
@@ -1028,12 +1187,13 @@
   </dgm:styleLbl>
   <dgm:styleLbl name="fgAcc2">
     <dgm:fillClrLst meth="repeat">
-      <a:schemeClr val="lt1">
+      <a:schemeClr val="dk1">
         <a:alpha val="90000"/>
+        <a:tint val="40000"/>
       </a:schemeClr>
     </dgm:fillClrLst>
     <dgm:linClrLst meth="repeat">
-      <a:schemeClr val="accent2"/>
+      <a:schemeClr val="dk1"/>
     </dgm:linClrLst>
     <dgm:effectClrLst/>
     <dgm:txLinClrLst/>
@@ -1044,12 +1204,13 @@
   </dgm:styleLbl>
   <dgm:styleLbl name="fgAcc3">
     <dgm:fillClrLst meth="repeat">
-      <a:schemeClr val="lt1">
+      <a:schemeClr val="dk1">
         <a:alpha val="90000"/>
+        <a:tint val="40000"/>
       </a:schemeClr>
     </dgm:fillClrLst>
     <dgm:linClrLst meth="repeat">
-      <a:schemeClr val="accent2"/>
+      <a:schemeClr val="dk1"/>
     </dgm:linClrLst>
     <dgm:effectClrLst/>
     <dgm:txLinClrLst/>
@@ -1060,12 +1221,13 @@
   </dgm:styleLbl>
   <dgm:styleLbl name="fgAcc4">
     <dgm:fillClrLst meth="repeat">
-      <a:schemeClr val="lt1">
+      <a:schemeClr val="dk1">
         <a:alpha val="90000"/>
+        <a:tint val="40000"/>
       </a:schemeClr>
     </dgm:fillClrLst>
     <dgm:linClrLst meth="repeat">
-      <a:schemeClr val="accent2"/>
+      <a:schemeClr val="dk1"/>
     </dgm:linClrLst>
     <dgm:effectClrLst/>
     <dgm:txLinClrLst/>
@@ -1076,12 +1238,12 @@
   </dgm:styleLbl>
   <dgm:styleLbl name="bgShp">
     <dgm:fillClrLst meth="repeat">
-      <a:schemeClr val="accent2">
+      <a:schemeClr val="dk1">
         <a:tint val="40000"/>
       </a:schemeClr>
     </dgm:fillClrLst>
     <dgm:linClrLst meth="repeat">
-      <a:schemeClr val="accent2"/>
+      <a:schemeClr val="dk1"/>
     </dgm:linClrLst>
     <dgm:effectClrLst/>
     <dgm:txLinClrLst/>
@@ -1092,12 +1254,12 @@
   </dgm:styleLbl>
   <dgm:styleLbl name="dkBgShp">
     <dgm:fillClrLst meth="repeat">
-      <a:schemeClr val="accent2">
+      <a:schemeClr val="dk1">
         <a:shade val="80000"/>
       </a:schemeClr>
     </dgm:fillClrLst>
     <dgm:linClrLst meth="repeat">
-      <a:schemeClr val="accent2"/>
+      <a:schemeClr val="dk1"/>
     </dgm:linClrLst>
     <dgm:effectClrLst/>
     <dgm:txLinClrLst/>
@@ -1108,13 +1270,13 @@
   </dgm:styleLbl>
   <dgm:styleLbl name="trBgShp">
     <dgm:fillClrLst meth="repeat">
-      <a:schemeClr val="accent2">
+      <a:schemeClr val="dk1">
         <a:tint val="50000"/>
         <a:alpha val="40000"/>
       </a:schemeClr>
     </dgm:fillClrLst>
     <dgm:linClrLst meth="repeat">
-      <a:schemeClr val="accent2"/>
+      <a:schemeClr val="dk1"/>
     </dgm:linClrLst>
     <dgm:effectClrLst/>
     <dgm:txLinClrLst/>
@@ -1125,7 +1287,7 @@
   </dgm:styleLbl>
   <dgm:styleLbl name="fgShp">
     <dgm:fillClrLst meth="repeat">
-      <a:schemeClr val="accent2">
+      <a:schemeClr val="dk1">
         <a:tint val="60000"/>
       </a:schemeClr>
     </dgm:fillClrLst>
@@ -1164,7 +1326,7 @@
 <dgm:dataModel xmlns:dgm="http://schemas.openxmlformats.org/drawingml/2006/diagram" xmlns:a="http://schemas.openxmlformats.org/drawingml/2006/main">
   <dgm:ptLst>
     <dgm:pt modelId="{7C883F58-09E0-4E70-98D4-32C537E6F358}" type="doc">
-      <dgm:prSet loTypeId="urn:microsoft.com/office/officeart/2008/layout/LinedList" loCatId="list" qsTypeId="urn:microsoft.com/office/officeart/2005/8/quickstyle/simple1" qsCatId="simple" csTypeId="urn:microsoft.com/office/officeart/2005/8/colors/accent2_2" csCatId="accent2" phldr="1"/>
+      <dgm:prSet loTypeId="urn:microsoft.com/office/officeart/2008/layout/LinedList" loCatId="list" qsTypeId="urn:microsoft.com/office/officeart/2005/8/quickstyle/simple1" qsCatId="simple" csTypeId="urn:microsoft.com/office/officeart/2005/8/colors/accent0_1" csCatId="mainScheme" phldr="1"/>
       <dgm:spPr/>
       <dgm:t>
         <a:bodyPr/>
@@ -1183,7 +1345,7 @@
         <a:p>
           <a:r>
             <a:rPr lang="en-US" dirty="0"/>
-            <a:t>Work on Clubs Page</a:t>
+            <a:t>Continue Clubs Page Development </a:t>
           </a:r>
         </a:p>
       </dgm:t>
@@ -1219,7 +1381,7 @@
         <a:p>
           <a:r>
             <a:rPr lang="en-US" dirty="0"/>
-            <a:t>Work on Leaderboard Page</a:t>
+            <a:t>Continue Leaderboard Page Development </a:t>
           </a:r>
         </a:p>
       </dgm:t>
@@ -1254,10 +1416,9 @@
         <a:lstStyle/>
         <a:p>
           <a:r>
-            <a:rPr lang="en-US"/>
-            <a:t>Intial development of Challenges</a:t>
+            <a:rPr lang="en-US" dirty="0"/>
+            <a:t>Begin Challenges Page Development</a:t>
           </a:r>
-          <a:endParaRPr lang="en-US" dirty="0"/>
         </a:p>
       </dgm:t>
     </dgm:pt>
@@ -1291,10 +1452,9 @@
         <a:lstStyle/>
         <a:p>
           <a:r>
-            <a:rPr lang="en-US"/>
-            <a:t>Intial development of Friends Feature</a:t>
+            <a:rPr lang="en-US" dirty="0"/>
+            <a:t>View Friends Accounts</a:t>
           </a:r>
-          <a:endParaRPr lang="en-US" dirty="0"/>
         </a:p>
       </dgm:t>
     </dgm:pt>
@@ -1320,7 +1480,7 @@
         </a:p>
       </dgm:t>
     </dgm:pt>
-    <dgm:pt modelId="{48BAD3F8-3D98-41DC-8713-8A46947D54BF}" type="pres">
+    <dgm:pt modelId="{276604CE-7742-461E-A1FB-5048586C5350}" type="pres">
       <dgm:prSet presAssocID="{7C883F58-09E0-4E70-98D4-32C537E6F358}" presName="vert0" presStyleCnt="0">
         <dgm:presLayoutVars>
           <dgm:dir/>
@@ -1330,97 +1490,97 @@
       </dgm:prSet>
       <dgm:spPr/>
     </dgm:pt>
-    <dgm:pt modelId="{4BFEBB5B-53AD-4478-991A-3FA771EB7BA5}" type="pres">
+    <dgm:pt modelId="{0F199995-7505-4B9F-9DBC-C39FD8496ABF}" type="pres">
       <dgm:prSet presAssocID="{C65EF1A1-4987-4440-88B2-2E7916CF0BC5}" presName="thickLine" presStyleLbl="alignNode1" presStyleIdx="0" presStyleCnt="4"/>
       <dgm:spPr/>
     </dgm:pt>
-    <dgm:pt modelId="{1A0411B5-B465-4AB9-97B9-4D9A6BEC09B9}" type="pres">
+    <dgm:pt modelId="{5DE2624A-6D7F-4DAA-96DF-B718DA4E7783}" type="pres">
       <dgm:prSet presAssocID="{C65EF1A1-4987-4440-88B2-2E7916CF0BC5}" presName="horz1" presStyleCnt="0"/>
       <dgm:spPr/>
     </dgm:pt>
-    <dgm:pt modelId="{01D886A0-9B83-4FFA-AD54-3FE483549AF7}" type="pres">
+    <dgm:pt modelId="{E7487A2F-0727-4597-8435-723BD19D3B22}" type="pres">
       <dgm:prSet presAssocID="{C65EF1A1-4987-4440-88B2-2E7916CF0BC5}" presName="tx1" presStyleLbl="revTx" presStyleIdx="0" presStyleCnt="4"/>
       <dgm:spPr/>
     </dgm:pt>
-    <dgm:pt modelId="{562E2210-AF74-4FC6-B64F-D45990827F55}" type="pres">
+    <dgm:pt modelId="{4DC4D27E-86DA-4630-9F1E-424B508FE567}" type="pres">
       <dgm:prSet presAssocID="{C65EF1A1-4987-4440-88B2-2E7916CF0BC5}" presName="vert1" presStyleCnt="0"/>
       <dgm:spPr/>
     </dgm:pt>
-    <dgm:pt modelId="{730406B4-A603-4EDF-8D44-FBADCF3F62D3}" type="pres">
+    <dgm:pt modelId="{42DE9A3D-D36B-48B0-A9CC-5C9B4FB79C2A}" type="pres">
       <dgm:prSet presAssocID="{9DC6CDF4-2BCB-4D5A-A2F7-9F8ECB80A928}" presName="thickLine" presStyleLbl="alignNode1" presStyleIdx="1" presStyleCnt="4"/>
       <dgm:spPr/>
     </dgm:pt>
-    <dgm:pt modelId="{3E1F02FD-3DB4-4770-ACF7-431781932B69}" type="pres">
+    <dgm:pt modelId="{D09D6C41-8919-4657-A155-C826C3ACFB78}" type="pres">
       <dgm:prSet presAssocID="{9DC6CDF4-2BCB-4D5A-A2F7-9F8ECB80A928}" presName="horz1" presStyleCnt="0"/>
       <dgm:spPr/>
     </dgm:pt>
-    <dgm:pt modelId="{3B18C8AD-A823-481E-A63F-94893DB99A00}" type="pres">
+    <dgm:pt modelId="{A7348878-5FE5-4EEF-AE6E-6E7EA3A90261}" type="pres">
       <dgm:prSet presAssocID="{9DC6CDF4-2BCB-4D5A-A2F7-9F8ECB80A928}" presName="tx1" presStyleLbl="revTx" presStyleIdx="1" presStyleCnt="4"/>
       <dgm:spPr/>
     </dgm:pt>
-    <dgm:pt modelId="{1B484A30-A1D7-47B4-B8C0-603EE63B9738}" type="pres">
+    <dgm:pt modelId="{44310A2F-0535-4896-BE26-02EE5186D6AC}" type="pres">
       <dgm:prSet presAssocID="{9DC6CDF4-2BCB-4D5A-A2F7-9F8ECB80A928}" presName="vert1" presStyleCnt="0"/>
       <dgm:spPr/>
     </dgm:pt>
-    <dgm:pt modelId="{9A7B83FB-97A4-4565-8FA1-2C9186B906F8}" type="pres">
+    <dgm:pt modelId="{6C8467B9-4C0B-4CE7-8A42-FC64A9E10138}" type="pres">
       <dgm:prSet presAssocID="{13EAF17F-E179-489C-8C7B-820079082AE2}" presName="thickLine" presStyleLbl="alignNode1" presStyleIdx="2" presStyleCnt="4"/>
       <dgm:spPr/>
     </dgm:pt>
-    <dgm:pt modelId="{BF77AE80-6093-41E0-BC6E-476FB4D0EAAE}" type="pres">
+    <dgm:pt modelId="{7E7AD706-D3F3-40B8-B57E-7965755C82C0}" type="pres">
       <dgm:prSet presAssocID="{13EAF17F-E179-489C-8C7B-820079082AE2}" presName="horz1" presStyleCnt="0"/>
       <dgm:spPr/>
     </dgm:pt>
-    <dgm:pt modelId="{FCC6C5BC-1AE5-4704-829B-43333914BEAD}" type="pres">
+    <dgm:pt modelId="{383CC481-DF00-41CD-A46D-FD01FC896133}" type="pres">
       <dgm:prSet presAssocID="{13EAF17F-E179-489C-8C7B-820079082AE2}" presName="tx1" presStyleLbl="revTx" presStyleIdx="2" presStyleCnt="4"/>
       <dgm:spPr/>
     </dgm:pt>
-    <dgm:pt modelId="{B5E87857-05BA-42EA-8D26-C32799986ACE}" type="pres">
+    <dgm:pt modelId="{DD9B1B45-7874-495E-8D38-2000547C63A4}" type="pres">
       <dgm:prSet presAssocID="{13EAF17F-E179-489C-8C7B-820079082AE2}" presName="vert1" presStyleCnt="0"/>
       <dgm:spPr/>
     </dgm:pt>
-    <dgm:pt modelId="{B5803361-3774-416B-9BD3-768648C81E80}" type="pres">
+    <dgm:pt modelId="{56D65ACD-28A1-4234-A529-AA94488022DF}" type="pres">
       <dgm:prSet presAssocID="{5274ACC2-5CD8-421B-B400-65F9017F93A3}" presName="thickLine" presStyleLbl="alignNode1" presStyleIdx="3" presStyleCnt="4"/>
       <dgm:spPr/>
     </dgm:pt>
-    <dgm:pt modelId="{434B6525-3F44-4211-89B3-E6B4ACD3E5B4}" type="pres">
+    <dgm:pt modelId="{2268E112-CDC6-4811-9EE6-8E2FD7779A73}" type="pres">
       <dgm:prSet presAssocID="{5274ACC2-5CD8-421B-B400-65F9017F93A3}" presName="horz1" presStyleCnt="0"/>
       <dgm:spPr/>
     </dgm:pt>
-    <dgm:pt modelId="{ECAE5BE4-5262-440E-B5E2-072412CC2B98}" type="pres">
+    <dgm:pt modelId="{AA4D3A39-EA1B-4A21-A9EE-A703B2DD1679}" type="pres">
       <dgm:prSet presAssocID="{5274ACC2-5CD8-421B-B400-65F9017F93A3}" presName="tx1" presStyleLbl="revTx" presStyleIdx="3" presStyleCnt="4"/>
       <dgm:spPr/>
     </dgm:pt>
-    <dgm:pt modelId="{115C9F39-49A3-402E-80D3-9D382A2550DB}" type="pres">
+    <dgm:pt modelId="{2EF5FD05-62CA-432E-8813-071EDAFA500B}" type="pres">
       <dgm:prSet presAssocID="{5274ACC2-5CD8-421B-B400-65F9017F93A3}" presName="vert1" presStyleCnt="0"/>
       <dgm:spPr/>
     </dgm:pt>
   </dgm:ptLst>
   <dgm:cxnLst>
-    <dgm:cxn modelId="{F8FDD45E-D9C6-4172-9AAE-BBF6200D555D}" type="presOf" srcId="{C65EF1A1-4987-4440-88B2-2E7916CF0BC5}" destId="{01D886A0-9B83-4FFA-AD54-3FE483549AF7}" srcOrd="0" destOrd="0" presId="urn:microsoft.com/office/officeart/2008/layout/LinedList"/>
+    <dgm:cxn modelId="{F030A33A-2D57-474A-9006-FA847136A542}" type="presOf" srcId="{13EAF17F-E179-489C-8C7B-820079082AE2}" destId="{383CC481-DF00-41CD-A46D-FD01FC896133}" srcOrd="0" destOrd="0" presId="urn:microsoft.com/office/officeart/2008/layout/LinedList"/>
+    <dgm:cxn modelId="{791CF645-63C7-4EDC-8A49-3104EA8923E4}" type="presOf" srcId="{C65EF1A1-4987-4440-88B2-2E7916CF0BC5}" destId="{E7487A2F-0727-4597-8435-723BD19D3B22}" srcOrd="0" destOrd="0" presId="urn:microsoft.com/office/officeart/2008/layout/LinedList"/>
     <dgm:cxn modelId="{3E97607E-8CD9-4BBF-B41C-1200A4631164}" srcId="{7C883F58-09E0-4E70-98D4-32C537E6F358}" destId="{5274ACC2-5CD8-421B-B400-65F9017F93A3}" srcOrd="3" destOrd="0" parTransId="{35FD7264-5B0C-4BA4-B912-CD59D4303F58}" sibTransId="{C83F91CA-13DB-4089-858E-E3D4B37DB32B}"/>
     <dgm:cxn modelId="{35FCEE86-B5FE-47DA-87C2-D0F72527B7F6}" srcId="{7C883F58-09E0-4E70-98D4-32C537E6F358}" destId="{C65EF1A1-4987-4440-88B2-2E7916CF0BC5}" srcOrd="0" destOrd="0" parTransId="{DD7D6ECE-FF12-4EA8-A8E4-5F2EAA2892FB}" sibTransId="{FCF3654C-E3BD-47D0-A0CA-9FC07C5BE1B5}"/>
-    <dgm:cxn modelId="{C299E793-073D-44B4-8498-13EB8593D9B1}" type="presOf" srcId="{7C883F58-09E0-4E70-98D4-32C537E6F358}" destId="{48BAD3F8-3D98-41DC-8713-8A46947D54BF}" srcOrd="0" destOrd="0" presId="urn:microsoft.com/office/officeart/2008/layout/LinedList"/>
-    <dgm:cxn modelId="{E214169E-4BD6-4213-A9B2-227677082659}" type="presOf" srcId="{13EAF17F-E179-489C-8C7B-820079082AE2}" destId="{FCC6C5BC-1AE5-4704-829B-43333914BEAD}" srcOrd="0" destOrd="0" presId="urn:microsoft.com/office/officeart/2008/layout/LinedList"/>
-    <dgm:cxn modelId="{E67B43D9-4409-44FE-9C78-B68DF009AFD5}" type="presOf" srcId="{9DC6CDF4-2BCB-4D5A-A2F7-9F8ECB80A928}" destId="{3B18C8AD-A823-481E-A63F-94893DB99A00}" srcOrd="0" destOrd="0" presId="urn:microsoft.com/office/officeart/2008/layout/LinedList"/>
+    <dgm:cxn modelId="{5301BA8C-06F8-48F6-8C0F-730BC0AA449A}" type="presOf" srcId="{7C883F58-09E0-4E70-98D4-32C537E6F358}" destId="{276604CE-7742-461E-A1FB-5048586C5350}" srcOrd="0" destOrd="0" presId="urn:microsoft.com/office/officeart/2008/layout/LinedList"/>
     <dgm:cxn modelId="{078A1CDD-EFC7-4264-AE23-9CD8AA11F804}" srcId="{7C883F58-09E0-4E70-98D4-32C537E6F358}" destId="{9DC6CDF4-2BCB-4D5A-A2F7-9F8ECB80A928}" srcOrd="1" destOrd="0" parTransId="{7C9BC6AB-481B-4ADC-BE3C-005DE147CD6E}" sibTransId="{4D855D76-FE7B-46C2-B885-4E579779B739}"/>
+    <dgm:cxn modelId="{51F458E0-54CD-4C7B-9EB5-597DA78D1BF6}" type="presOf" srcId="{5274ACC2-5CD8-421B-B400-65F9017F93A3}" destId="{AA4D3A39-EA1B-4A21-A9EE-A703B2DD1679}" srcOrd="0" destOrd="0" presId="urn:microsoft.com/office/officeart/2008/layout/LinedList"/>
     <dgm:cxn modelId="{B53DCEE8-CAED-4225-9FF2-A809EE91ED5F}" srcId="{7C883F58-09E0-4E70-98D4-32C537E6F358}" destId="{13EAF17F-E179-489C-8C7B-820079082AE2}" srcOrd="2" destOrd="0" parTransId="{B050925C-E8AC-4D1D-860E-344C9EB5F256}" sibTransId="{4183C5E8-3F30-4046-82CD-C224611F81B6}"/>
-    <dgm:cxn modelId="{F93611FF-0856-49BB-B16B-938E0202CB97}" type="presOf" srcId="{5274ACC2-5CD8-421B-B400-65F9017F93A3}" destId="{ECAE5BE4-5262-440E-B5E2-072412CC2B98}" srcOrd="0" destOrd="0" presId="urn:microsoft.com/office/officeart/2008/layout/LinedList"/>
-    <dgm:cxn modelId="{732784C8-AEAF-4D77-994A-822739813FCA}" type="presParOf" srcId="{48BAD3F8-3D98-41DC-8713-8A46947D54BF}" destId="{4BFEBB5B-53AD-4478-991A-3FA771EB7BA5}" srcOrd="0" destOrd="0" presId="urn:microsoft.com/office/officeart/2008/layout/LinedList"/>
-    <dgm:cxn modelId="{973AFD39-3A9E-4951-90E9-EA9E51832CD6}" type="presParOf" srcId="{48BAD3F8-3D98-41DC-8713-8A46947D54BF}" destId="{1A0411B5-B465-4AB9-97B9-4D9A6BEC09B9}" srcOrd="1" destOrd="0" presId="urn:microsoft.com/office/officeart/2008/layout/LinedList"/>
-    <dgm:cxn modelId="{21A6F230-A10F-4619-A409-3D7A314987BB}" type="presParOf" srcId="{1A0411B5-B465-4AB9-97B9-4D9A6BEC09B9}" destId="{01D886A0-9B83-4FFA-AD54-3FE483549AF7}" srcOrd="0" destOrd="0" presId="urn:microsoft.com/office/officeart/2008/layout/LinedList"/>
-    <dgm:cxn modelId="{A797D92F-E08F-45E9-B472-1B75991F6457}" type="presParOf" srcId="{1A0411B5-B465-4AB9-97B9-4D9A6BEC09B9}" destId="{562E2210-AF74-4FC6-B64F-D45990827F55}" srcOrd="1" destOrd="0" presId="urn:microsoft.com/office/officeart/2008/layout/LinedList"/>
-    <dgm:cxn modelId="{2EE15FA7-5E51-448D-B45E-D4A4504AC17E}" type="presParOf" srcId="{48BAD3F8-3D98-41DC-8713-8A46947D54BF}" destId="{730406B4-A603-4EDF-8D44-FBADCF3F62D3}" srcOrd="2" destOrd="0" presId="urn:microsoft.com/office/officeart/2008/layout/LinedList"/>
-    <dgm:cxn modelId="{D36E3DE0-2FEC-4B73-8F21-95AB3B9466CD}" type="presParOf" srcId="{48BAD3F8-3D98-41DC-8713-8A46947D54BF}" destId="{3E1F02FD-3DB4-4770-ACF7-431781932B69}" srcOrd="3" destOrd="0" presId="urn:microsoft.com/office/officeart/2008/layout/LinedList"/>
-    <dgm:cxn modelId="{985145F4-7DDE-437B-971E-378327DD3B78}" type="presParOf" srcId="{3E1F02FD-3DB4-4770-ACF7-431781932B69}" destId="{3B18C8AD-A823-481E-A63F-94893DB99A00}" srcOrd="0" destOrd="0" presId="urn:microsoft.com/office/officeart/2008/layout/LinedList"/>
-    <dgm:cxn modelId="{28C8C85D-5373-4E89-9264-718D0FB4C8BD}" type="presParOf" srcId="{3E1F02FD-3DB4-4770-ACF7-431781932B69}" destId="{1B484A30-A1D7-47B4-B8C0-603EE63B9738}" srcOrd="1" destOrd="0" presId="urn:microsoft.com/office/officeart/2008/layout/LinedList"/>
-    <dgm:cxn modelId="{3EB95009-C1F3-45EE-A554-4F3B0969F09D}" type="presParOf" srcId="{48BAD3F8-3D98-41DC-8713-8A46947D54BF}" destId="{9A7B83FB-97A4-4565-8FA1-2C9186B906F8}" srcOrd="4" destOrd="0" presId="urn:microsoft.com/office/officeart/2008/layout/LinedList"/>
-    <dgm:cxn modelId="{48D87936-EAFF-49B3-AF1A-517C8C9D0AD5}" type="presParOf" srcId="{48BAD3F8-3D98-41DC-8713-8A46947D54BF}" destId="{BF77AE80-6093-41E0-BC6E-476FB4D0EAAE}" srcOrd="5" destOrd="0" presId="urn:microsoft.com/office/officeart/2008/layout/LinedList"/>
-    <dgm:cxn modelId="{215F96EC-D7ED-4661-A0C5-0374593369B6}" type="presParOf" srcId="{BF77AE80-6093-41E0-BC6E-476FB4D0EAAE}" destId="{FCC6C5BC-1AE5-4704-829B-43333914BEAD}" srcOrd="0" destOrd="0" presId="urn:microsoft.com/office/officeart/2008/layout/LinedList"/>
-    <dgm:cxn modelId="{5B649220-4BF4-4BF7-B2B6-903CF4A85856}" type="presParOf" srcId="{BF77AE80-6093-41E0-BC6E-476FB4D0EAAE}" destId="{B5E87857-05BA-42EA-8D26-C32799986ACE}" srcOrd="1" destOrd="0" presId="urn:microsoft.com/office/officeart/2008/layout/LinedList"/>
-    <dgm:cxn modelId="{D1AAE4FB-AE67-403F-83BF-10E4D605D057}" type="presParOf" srcId="{48BAD3F8-3D98-41DC-8713-8A46947D54BF}" destId="{B5803361-3774-416B-9BD3-768648C81E80}" srcOrd="6" destOrd="0" presId="urn:microsoft.com/office/officeart/2008/layout/LinedList"/>
-    <dgm:cxn modelId="{29D2F874-0191-4998-8EC6-B5DCD4628F37}" type="presParOf" srcId="{48BAD3F8-3D98-41DC-8713-8A46947D54BF}" destId="{434B6525-3F44-4211-89B3-E6B4ACD3E5B4}" srcOrd="7" destOrd="0" presId="urn:microsoft.com/office/officeart/2008/layout/LinedList"/>
-    <dgm:cxn modelId="{6D5459B3-81C1-4AF6-BE18-51869FFD547B}" type="presParOf" srcId="{434B6525-3F44-4211-89B3-E6B4ACD3E5B4}" destId="{ECAE5BE4-5262-440E-B5E2-072412CC2B98}" srcOrd="0" destOrd="0" presId="urn:microsoft.com/office/officeart/2008/layout/LinedList"/>
-    <dgm:cxn modelId="{3764D77D-E074-4B6B-9A97-40620037CA7D}" type="presParOf" srcId="{434B6525-3F44-4211-89B3-E6B4ACD3E5B4}" destId="{115C9F39-49A3-402E-80D3-9D382A2550DB}" srcOrd="1" destOrd="0" presId="urn:microsoft.com/office/officeart/2008/layout/LinedList"/>
+    <dgm:cxn modelId="{EAFDCAF9-29AC-48D4-A298-CC2F75849CE0}" type="presOf" srcId="{9DC6CDF4-2BCB-4D5A-A2F7-9F8ECB80A928}" destId="{A7348878-5FE5-4EEF-AE6E-6E7EA3A90261}" srcOrd="0" destOrd="0" presId="urn:microsoft.com/office/officeart/2008/layout/LinedList"/>
+    <dgm:cxn modelId="{25B94CAD-06A9-4658-960A-A4895F617863}" type="presParOf" srcId="{276604CE-7742-461E-A1FB-5048586C5350}" destId="{0F199995-7505-4B9F-9DBC-C39FD8496ABF}" srcOrd="0" destOrd="0" presId="urn:microsoft.com/office/officeart/2008/layout/LinedList"/>
+    <dgm:cxn modelId="{6432556C-3E58-42B8-ACBD-C63FC7681150}" type="presParOf" srcId="{276604CE-7742-461E-A1FB-5048586C5350}" destId="{5DE2624A-6D7F-4DAA-96DF-B718DA4E7783}" srcOrd="1" destOrd="0" presId="urn:microsoft.com/office/officeart/2008/layout/LinedList"/>
+    <dgm:cxn modelId="{283053C9-D01A-4B11-9730-24F38F89D221}" type="presParOf" srcId="{5DE2624A-6D7F-4DAA-96DF-B718DA4E7783}" destId="{E7487A2F-0727-4597-8435-723BD19D3B22}" srcOrd="0" destOrd="0" presId="urn:microsoft.com/office/officeart/2008/layout/LinedList"/>
+    <dgm:cxn modelId="{378B700A-CDAE-402D-B998-C7E834E32F34}" type="presParOf" srcId="{5DE2624A-6D7F-4DAA-96DF-B718DA4E7783}" destId="{4DC4D27E-86DA-4630-9F1E-424B508FE567}" srcOrd="1" destOrd="0" presId="urn:microsoft.com/office/officeart/2008/layout/LinedList"/>
+    <dgm:cxn modelId="{171C8AA9-AFB1-4DF4-9D8B-63A1FFA0716C}" type="presParOf" srcId="{276604CE-7742-461E-A1FB-5048586C5350}" destId="{42DE9A3D-D36B-48B0-A9CC-5C9B4FB79C2A}" srcOrd="2" destOrd="0" presId="urn:microsoft.com/office/officeart/2008/layout/LinedList"/>
+    <dgm:cxn modelId="{599C4CA5-3C60-4EB7-9C5C-9406BD5FD5C5}" type="presParOf" srcId="{276604CE-7742-461E-A1FB-5048586C5350}" destId="{D09D6C41-8919-4657-A155-C826C3ACFB78}" srcOrd="3" destOrd="0" presId="urn:microsoft.com/office/officeart/2008/layout/LinedList"/>
+    <dgm:cxn modelId="{3066C009-1AEC-4838-A837-B79E73E88EBE}" type="presParOf" srcId="{D09D6C41-8919-4657-A155-C826C3ACFB78}" destId="{A7348878-5FE5-4EEF-AE6E-6E7EA3A90261}" srcOrd="0" destOrd="0" presId="urn:microsoft.com/office/officeart/2008/layout/LinedList"/>
+    <dgm:cxn modelId="{822D3625-81AB-4EF6-A864-89D886D52500}" type="presParOf" srcId="{D09D6C41-8919-4657-A155-C826C3ACFB78}" destId="{44310A2F-0535-4896-BE26-02EE5186D6AC}" srcOrd="1" destOrd="0" presId="urn:microsoft.com/office/officeart/2008/layout/LinedList"/>
+    <dgm:cxn modelId="{E6F44004-A0F1-45EC-86B9-67331DB04434}" type="presParOf" srcId="{276604CE-7742-461E-A1FB-5048586C5350}" destId="{6C8467B9-4C0B-4CE7-8A42-FC64A9E10138}" srcOrd="4" destOrd="0" presId="urn:microsoft.com/office/officeart/2008/layout/LinedList"/>
+    <dgm:cxn modelId="{748205F5-2397-4142-B613-2E3243F6684A}" type="presParOf" srcId="{276604CE-7742-461E-A1FB-5048586C5350}" destId="{7E7AD706-D3F3-40B8-B57E-7965755C82C0}" srcOrd="5" destOrd="0" presId="urn:microsoft.com/office/officeart/2008/layout/LinedList"/>
+    <dgm:cxn modelId="{8D0F816B-B145-4C7B-885E-7C2468E931E1}" type="presParOf" srcId="{7E7AD706-D3F3-40B8-B57E-7965755C82C0}" destId="{383CC481-DF00-41CD-A46D-FD01FC896133}" srcOrd="0" destOrd="0" presId="urn:microsoft.com/office/officeart/2008/layout/LinedList"/>
+    <dgm:cxn modelId="{497E415F-03CD-4D84-8F29-10A3D8A6EB29}" type="presParOf" srcId="{7E7AD706-D3F3-40B8-B57E-7965755C82C0}" destId="{DD9B1B45-7874-495E-8D38-2000547C63A4}" srcOrd="1" destOrd="0" presId="urn:microsoft.com/office/officeart/2008/layout/LinedList"/>
+    <dgm:cxn modelId="{B6F7C035-0F9E-4A94-AB94-A19ED2DB9C66}" type="presParOf" srcId="{276604CE-7742-461E-A1FB-5048586C5350}" destId="{56D65ACD-28A1-4234-A529-AA94488022DF}" srcOrd="6" destOrd="0" presId="urn:microsoft.com/office/officeart/2008/layout/LinedList"/>
+    <dgm:cxn modelId="{EB444053-D12C-42F5-933B-F81F2195D2DF}" type="presParOf" srcId="{276604CE-7742-461E-A1FB-5048586C5350}" destId="{2268E112-CDC6-4811-9EE6-8E2FD7779A73}" srcOrd="7" destOrd="0" presId="urn:microsoft.com/office/officeart/2008/layout/LinedList"/>
+    <dgm:cxn modelId="{5D1A5A06-B591-4771-9959-FD9BFA34A46F}" type="presParOf" srcId="{2268E112-CDC6-4811-9EE6-8E2FD7779A73}" destId="{AA4D3A39-EA1B-4A21-A9EE-A703B2DD1679}" srcOrd="0" destOrd="0" presId="urn:microsoft.com/office/officeart/2008/layout/LinedList"/>
+    <dgm:cxn modelId="{B8A2E9FB-8BDF-4D4F-B4D9-88F96AAE777D}" type="presParOf" srcId="{2268E112-CDC6-4811-9EE6-8E2FD7779A73}" destId="{2EF5FD05-62CA-432E-8813-071EDAFA500B}" srcOrd="1" destOrd="0" presId="urn:microsoft.com/office/officeart/2008/layout/LinedList"/>
   </dgm:cxnLst>
   <dgm:bg/>
   <dgm:whole/>
@@ -1440,7 +1600,7 @@
       <dsp:cNvGrpSpPr/>
     </dsp:nvGrpSpPr>
     <dsp:grpSpPr/>
-    <dsp:sp modelId="{4BFEBB5B-53AD-4478-991A-3FA771EB7BA5}">
+    <dsp:sp modelId="{0F199995-7505-4B9F-9DBC-C39FD8496ABF}">
       <dsp:nvSpPr>
         <dsp:cNvPr id="0" name=""/>
         <dsp:cNvSpPr/>
@@ -1448,13 +1608,13 @@
       <dsp:spPr>
         <a:xfrm>
           <a:off x="0" y="0"/>
-          <a:ext cx="10058399" cy="0"/>
+          <a:ext cx="6620255" cy="0"/>
         </a:xfrm>
         <a:prstGeom prst="line">
           <a:avLst/>
         </a:prstGeom>
         <a:solidFill>
-          <a:schemeClr val="accent2">
+          <a:schemeClr val="lt1">
             <a:hueOff val="0"/>
             <a:satOff val="0"/>
             <a:lumOff val="0"/>
@@ -1463,7 +1623,8 @@
         </a:solidFill>
         <a:ln w="19050" cap="flat" cmpd="sng" algn="ctr">
           <a:solidFill>
-            <a:schemeClr val="accent2">
+            <a:schemeClr val="dk1">
+              <a:shade val="80000"/>
               <a:hueOff val="0"/>
               <a:satOff val="0"/>
               <a:lumOff val="0"/>
@@ -1490,7 +1651,7 @@
         </a:fontRef>
       </dsp:style>
     </dsp:sp>
-    <dsp:sp modelId="{01D886A0-9B83-4FFA-AD54-3FE483549AF7}">
+    <dsp:sp modelId="{E7487A2F-0727-4597-8435-723BD19D3B22}">
       <dsp:nvSpPr>
         <dsp:cNvPr id="0" name=""/>
         <dsp:cNvSpPr/>
@@ -1498,7 +1659,7 @@
       <dsp:spPr>
         <a:xfrm>
           <a:off x="0" y="0"/>
-          <a:ext cx="10058399" cy="904461"/>
+          <a:ext cx="6620255" cy="1241298"/>
         </a:xfrm>
         <a:prstGeom prst="rect">
           <a:avLst/>
@@ -1522,12 +1683,12 @@
         <a:fontRef idx="minor"/>
       </dsp:style>
       <dsp:txBody>
-        <a:bodyPr spcFirstLastPara="0" vert="horz" wrap="square" lIns="160020" tIns="160020" rIns="160020" bIns="160020" numCol="1" spcCol="1270" anchor="t" anchorCtr="0">
+        <a:bodyPr spcFirstLastPara="0" vert="horz" wrap="square" lIns="133350" tIns="133350" rIns="133350" bIns="133350" numCol="1" spcCol="1270" anchor="t" anchorCtr="0">
           <a:noAutofit/>
         </a:bodyPr>
         <a:lstStyle/>
         <a:p>
-          <a:pPr marL="0" lvl="0" indent="0" algn="l" defTabSz="1866900">
+          <a:pPr marL="0" lvl="0" indent="0" algn="l" defTabSz="1555750">
             <a:lnSpc>
               <a:spcPct val="90000"/>
             </a:lnSpc>
@@ -1540,31 +1701,31 @@
             <a:buNone/>
           </a:pPr>
           <a:r>
-            <a:rPr lang="en-US" sz="4200" kern="1200" dirty="0"/>
-            <a:t>Work on Clubs Page</a:t>
+            <a:rPr lang="en-US" sz="3500" kern="1200" dirty="0"/>
+            <a:t>Continue Clubs Page Development </a:t>
           </a:r>
         </a:p>
       </dsp:txBody>
       <dsp:txXfrm>
         <a:off x="0" y="0"/>
-        <a:ext cx="10058399" cy="904461"/>
+        <a:ext cx="6620255" cy="1241298"/>
       </dsp:txXfrm>
     </dsp:sp>
-    <dsp:sp modelId="{730406B4-A603-4EDF-8D44-FBADCF3F62D3}">
+    <dsp:sp modelId="{42DE9A3D-D36B-48B0-A9CC-5C9B4FB79C2A}">
       <dsp:nvSpPr>
         <dsp:cNvPr id="0" name=""/>
         <dsp:cNvSpPr/>
       </dsp:nvSpPr>
       <dsp:spPr>
         <a:xfrm>
-          <a:off x="0" y="904461"/>
-          <a:ext cx="10058399" cy="0"/>
+          <a:off x="0" y="1241298"/>
+          <a:ext cx="6620255" cy="0"/>
         </a:xfrm>
         <a:prstGeom prst="line">
           <a:avLst/>
         </a:prstGeom>
         <a:solidFill>
-          <a:schemeClr val="accent2">
+          <a:schemeClr val="lt1">
             <a:hueOff val="0"/>
             <a:satOff val="0"/>
             <a:lumOff val="0"/>
@@ -1573,7 +1734,8 @@
         </a:solidFill>
         <a:ln w="19050" cap="flat" cmpd="sng" algn="ctr">
           <a:solidFill>
-            <a:schemeClr val="accent2">
+            <a:schemeClr val="dk1">
+              <a:shade val="80000"/>
               <a:hueOff val="0"/>
               <a:satOff val="0"/>
               <a:lumOff val="0"/>
@@ -1600,15 +1762,15 @@
         </a:fontRef>
       </dsp:style>
     </dsp:sp>
-    <dsp:sp modelId="{3B18C8AD-A823-481E-A63F-94893DB99A00}">
+    <dsp:sp modelId="{A7348878-5FE5-4EEF-AE6E-6E7EA3A90261}">
       <dsp:nvSpPr>
         <dsp:cNvPr id="0" name=""/>
         <dsp:cNvSpPr/>
       </dsp:nvSpPr>
       <dsp:spPr>
         <a:xfrm>
-          <a:off x="0" y="904461"/>
-          <a:ext cx="10058399" cy="904461"/>
+          <a:off x="0" y="1241298"/>
+          <a:ext cx="6620255" cy="1241298"/>
         </a:xfrm>
         <a:prstGeom prst="rect">
           <a:avLst/>
@@ -1632,12 +1794,12 @@
         <a:fontRef idx="minor"/>
       </dsp:style>
       <dsp:txBody>
-        <a:bodyPr spcFirstLastPara="0" vert="horz" wrap="square" lIns="160020" tIns="160020" rIns="160020" bIns="160020" numCol="1" spcCol="1270" anchor="t" anchorCtr="0">
+        <a:bodyPr spcFirstLastPara="0" vert="horz" wrap="square" lIns="133350" tIns="133350" rIns="133350" bIns="133350" numCol="1" spcCol="1270" anchor="t" anchorCtr="0">
           <a:noAutofit/>
         </a:bodyPr>
         <a:lstStyle/>
         <a:p>
-          <a:pPr marL="0" lvl="0" indent="0" algn="l" defTabSz="1866900">
+          <a:pPr marL="0" lvl="0" indent="0" algn="l" defTabSz="1555750">
             <a:lnSpc>
               <a:spcPct val="90000"/>
             </a:lnSpc>
@@ -1650,31 +1812,31 @@
             <a:buNone/>
           </a:pPr>
           <a:r>
-            <a:rPr lang="en-US" sz="4200" kern="1200" dirty="0"/>
-            <a:t>Work on Leaderboard Page</a:t>
+            <a:rPr lang="en-US" sz="3500" kern="1200" dirty="0"/>
+            <a:t>Continue Leaderboard Page Development </a:t>
           </a:r>
         </a:p>
       </dsp:txBody>
       <dsp:txXfrm>
-        <a:off x="0" y="904461"/>
-        <a:ext cx="10058399" cy="904461"/>
+        <a:off x="0" y="1241298"/>
+        <a:ext cx="6620255" cy="1241298"/>
       </dsp:txXfrm>
     </dsp:sp>
-    <dsp:sp modelId="{9A7B83FB-97A4-4565-8FA1-2C9186B906F8}">
+    <dsp:sp modelId="{6C8467B9-4C0B-4CE7-8A42-FC64A9E10138}">
       <dsp:nvSpPr>
         <dsp:cNvPr id="0" name=""/>
         <dsp:cNvSpPr/>
       </dsp:nvSpPr>
       <dsp:spPr>
         <a:xfrm>
-          <a:off x="0" y="1808922"/>
-          <a:ext cx="10058399" cy="0"/>
+          <a:off x="0" y="2482596"/>
+          <a:ext cx="6620255" cy="0"/>
         </a:xfrm>
         <a:prstGeom prst="line">
           <a:avLst/>
         </a:prstGeom>
         <a:solidFill>
-          <a:schemeClr val="accent2">
+          <a:schemeClr val="lt1">
             <a:hueOff val="0"/>
             <a:satOff val="0"/>
             <a:lumOff val="0"/>
@@ -1683,7 +1845,8 @@
         </a:solidFill>
         <a:ln w="19050" cap="flat" cmpd="sng" algn="ctr">
           <a:solidFill>
-            <a:schemeClr val="accent2">
+            <a:schemeClr val="dk1">
+              <a:shade val="80000"/>
               <a:hueOff val="0"/>
               <a:satOff val="0"/>
               <a:lumOff val="0"/>
@@ -1710,15 +1873,15 @@
         </a:fontRef>
       </dsp:style>
     </dsp:sp>
-    <dsp:sp modelId="{FCC6C5BC-1AE5-4704-829B-43333914BEAD}">
+    <dsp:sp modelId="{383CC481-DF00-41CD-A46D-FD01FC896133}">
       <dsp:nvSpPr>
         <dsp:cNvPr id="0" name=""/>
         <dsp:cNvSpPr/>
       </dsp:nvSpPr>
       <dsp:spPr>
         <a:xfrm>
-          <a:off x="0" y="1808922"/>
-          <a:ext cx="10058399" cy="904461"/>
+          <a:off x="0" y="2482596"/>
+          <a:ext cx="6620255" cy="1241298"/>
         </a:xfrm>
         <a:prstGeom prst="rect">
           <a:avLst/>
@@ -1742,12 +1905,12 @@
         <a:fontRef idx="minor"/>
       </dsp:style>
       <dsp:txBody>
-        <a:bodyPr spcFirstLastPara="0" vert="horz" wrap="square" lIns="160020" tIns="160020" rIns="160020" bIns="160020" numCol="1" spcCol="1270" anchor="t" anchorCtr="0">
+        <a:bodyPr spcFirstLastPara="0" vert="horz" wrap="square" lIns="133350" tIns="133350" rIns="133350" bIns="133350" numCol="1" spcCol="1270" anchor="t" anchorCtr="0">
           <a:noAutofit/>
         </a:bodyPr>
         <a:lstStyle/>
         <a:p>
-          <a:pPr marL="0" lvl="0" indent="0" algn="l" defTabSz="1866900">
+          <a:pPr marL="0" lvl="0" indent="0" algn="l" defTabSz="1555750">
             <a:lnSpc>
               <a:spcPct val="90000"/>
             </a:lnSpc>
@@ -1760,32 +1923,31 @@
             <a:buNone/>
           </a:pPr>
           <a:r>
-            <a:rPr lang="en-US" sz="4200" kern="1200"/>
-            <a:t>Intial development of Challenges</a:t>
+            <a:rPr lang="en-US" sz="3500" kern="1200" dirty="0"/>
+            <a:t>Begin Challenges Page Development</a:t>
           </a:r>
-          <a:endParaRPr lang="en-US" sz="4200" kern="1200" dirty="0"/>
         </a:p>
       </dsp:txBody>
       <dsp:txXfrm>
-        <a:off x="0" y="1808922"/>
-        <a:ext cx="10058399" cy="904461"/>
+        <a:off x="0" y="2482596"/>
+        <a:ext cx="6620255" cy="1241298"/>
       </dsp:txXfrm>
     </dsp:sp>
-    <dsp:sp modelId="{B5803361-3774-416B-9BD3-768648C81E80}">
+    <dsp:sp modelId="{56D65ACD-28A1-4234-A529-AA94488022DF}">
       <dsp:nvSpPr>
         <dsp:cNvPr id="0" name=""/>
         <dsp:cNvSpPr/>
       </dsp:nvSpPr>
       <dsp:spPr>
         <a:xfrm>
-          <a:off x="0" y="2713383"/>
-          <a:ext cx="10058399" cy="0"/>
+          <a:off x="0" y="3723894"/>
+          <a:ext cx="6620255" cy="0"/>
         </a:xfrm>
         <a:prstGeom prst="line">
           <a:avLst/>
         </a:prstGeom>
         <a:solidFill>
-          <a:schemeClr val="accent2">
+          <a:schemeClr val="lt1">
             <a:hueOff val="0"/>
             <a:satOff val="0"/>
             <a:lumOff val="0"/>
@@ -1794,7 +1956,8 @@
         </a:solidFill>
         <a:ln w="19050" cap="flat" cmpd="sng" algn="ctr">
           <a:solidFill>
-            <a:schemeClr val="accent2">
+            <a:schemeClr val="dk1">
+              <a:shade val="80000"/>
               <a:hueOff val="0"/>
               <a:satOff val="0"/>
               <a:lumOff val="0"/>
@@ -1821,15 +1984,15 @@
         </a:fontRef>
       </dsp:style>
     </dsp:sp>
-    <dsp:sp modelId="{ECAE5BE4-5262-440E-B5E2-072412CC2B98}">
+    <dsp:sp modelId="{AA4D3A39-EA1B-4A21-A9EE-A703B2DD1679}">
       <dsp:nvSpPr>
         <dsp:cNvPr id="0" name=""/>
         <dsp:cNvSpPr/>
       </dsp:nvSpPr>
       <dsp:spPr>
         <a:xfrm>
-          <a:off x="0" y="2713383"/>
-          <a:ext cx="10058399" cy="904461"/>
+          <a:off x="0" y="3723894"/>
+          <a:ext cx="6620255" cy="1241298"/>
         </a:xfrm>
         <a:prstGeom prst="rect">
           <a:avLst/>
@@ -1853,12 +2016,12 @@
         <a:fontRef idx="minor"/>
       </dsp:style>
       <dsp:txBody>
-        <a:bodyPr spcFirstLastPara="0" vert="horz" wrap="square" lIns="160020" tIns="160020" rIns="160020" bIns="160020" numCol="1" spcCol="1270" anchor="t" anchorCtr="0">
+        <a:bodyPr spcFirstLastPara="0" vert="horz" wrap="square" lIns="133350" tIns="133350" rIns="133350" bIns="133350" numCol="1" spcCol="1270" anchor="t" anchorCtr="0">
           <a:noAutofit/>
         </a:bodyPr>
         <a:lstStyle/>
         <a:p>
-          <a:pPr marL="0" lvl="0" indent="0" algn="l" defTabSz="1866900">
+          <a:pPr marL="0" lvl="0" indent="0" algn="l" defTabSz="1555750">
             <a:lnSpc>
               <a:spcPct val="90000"/>
             </a:lnSpc>
@@ -1871,15 +2034,14 @@
             <a:buNone/>
           </a:pPr>
           <a:r>
-            <a:rPr lang="en-US" sz="4200" kern="1200"/>
-            <a:t>Intial development of Friends Feature</a:t>
+            <a:rPr lang="en-US" sz="3500" kern="1200" dirty="0"/>
+            <a:t>View Friends Accounts</a:t>
           </a:r>
-          <a:endParaRPr lang="en-US" sz="4200" kern="1200" dirty="0"/>
         </a:p>
       </dsp:txBody>
       <dsp:txXfrm>
-        <a:off x="0" y="2713383"/>
-        <a:ext cx="10058399" cy="904461"/>
+        <a:off x="0" y="3723894"/>
+        <a:ext cx="6620255" cy="1241298"/>
       </dsp:txXfrm>
     </dsp:sp>
   </dsp:spTree>
@@ -3669,7 +3831,7 @@
           <a:p>
             <a:fld id="{E80C50CD-E178-4744-9B35-B2F624D6C5E9}" type="datetimeFigureOut">
               <a:rPr lang="en-US" smtClean="0"/>
-              <a:t>2/7/2026</a:t>
+              <a:t>2/8/2026</a:t>
             </a:fld>
             <a:endParaRPr lang="en-US"/>
           </a:p>
@@ -3867,7 +4029,7 @@
           <a:p>
             <a:fld id="{E80C50CD-E178-4744-9B35-B2F624D6C5E9}" type="datetimeFigureOut">
               <a:rPr lang="en-US" smtClean="0"/>
-              <a:t>2/7/2026</a:t>
+              <a:t>2/8/2026</a:t>
             </a:fld>
             <a:endParaRPr lang="en-US"/>
           </a:p>
@@ -4075,7 +4237,7 @@
           <a:p>
             <a:fld id="{E80C50CD-E178-4744-9B35-B2F624D6C5E9}" type="datetimeFigureOut">
               <a:rPr lang="en-US" smtClean="0"/>
-              <a:t>2/7/2026</a:t>
+              <a:t>2/8/2026</a:t>
             </a:fld>
             <a:endParaRPr lang="en-US"/>
           </a:p>
@@ -4325,7 +4487,7 @@
           <a:p>
             <a:fld id="{E80C50CD-E178-4744-9B35-B2F624D6C5E9}" type="datetimeFigureOut">
               <a:rPr lang="en-US" smtClean="0"/>
-              <a:t>2/7/2026</a:t>
+              <a:t>2/8/2026</a:t>
             </a:fld>
             <a:endParaRPr lang="en-US"/>
           </a:p>
@@ -4604,7 +4766,7 @@
           <a:p>
             <a:fld id="{E80C50CD-E178-4744-9B35-B2F624D6C5E9}" type="datetimeFigureOut">
               <a:rPr lang="en-US" smtClean="0"/>
-              <a:t>2/7/2026</a:t>
+              <a:t>2/8/2026</a:t>
             </a:fld>
             <a:endParaRPr lang="en-US"/>
           </a:p>
@@ -4921,7 +5083,7 @@
           <a:p>
             <a:fld id="{E80C50CD-E178-4744-9B35-B2F624D6C5E9}" type="datetimeFigureOut">
               <a:rPr lang="en-US" smtClean="0"/>
-              <a:t>2/7/2026</a:t>
+              <a:t>2/8/2026</a:t>
             </a:fld>
             <a:endParaRPr lang="en-US"/>
           </a:p>
@@ -5337,7 +5499,7 @@
           <a:p>
             <a:fld id="{E80C50CD-E178-4744-9B35-B2F624D6C5E9}" type="datetimeFigureOut">
               <a:rPr lang="en-US" smtClean="0"/>
-              <a:t>2/7/2026</a:t>
+              <a:t>2/8/2026</a:t>
             </a:fld>
             <a:endParaRPr lang="en-US"/>
           </a:p>
@@ -5478,7 +5640,7 @@
           <a:p>
             <a:fld id="{E80C50CD-E178-4744-9B35-B2F624D6C5E9}" type="datetimeFigureOut">
               <a:rPr lang="en-US" smtClean="0"/>
-              <a:t>2/7/2026</a:t>
+              <a:t>2/8/2026</a:t>
             </a:fld>
             <a:endParaRPr lang="en-US"/>
           </a:p>
@@ -5591,7 +5753,7 @@
           <a:p>
             <a:fld id="{E80C50CD-E178-4744-9B35-B2F624D6C5E9}" type="datetimeFigureOut">
               <a:rPr lang="en-US" smtClean="0"/>
-              <a:t>2/7/2026</a:t>
+              <a:t>2/8/2026</a:t>
             </a:fld>
             <a:endParaRPr lang="en-US"/>
           </a:p>
@@ -5908,7 +6070,7 @@
           <a:p>
             <a:fld id="{E80C50CD-E178-4744-9B35-B2F624D6C5E9}" type="datetimeFigureOut">
               <a:rPr lang="en-US" smtClean="0"/>
-              <a:t>2/7/2026</a:t>
+              <a:t>2/8/2026</a:t>
             </a:fld>
             <a:endParaRPr lang="en-US"/>
           </a:p>
@@ -6200,7 +6362,7 @@
           <a:p>
             <a:fld id="{E80C50CD-E178-4744-9B35-B2F624D6C5E9}" type="datetimeFigureOut">
               <a:rPr lang="en-US" smtClean="0"/>
-              <a:t>2/7/2026</a:t>
+              <a:t>2/8/2026</a:t>
             </a:fld>
             <a:endParaRPr lang="en-US"/>
           </a:p>
@@ -6440,7 +6602,7 @@
             <a:fld id="{E80C50CD-E178-4744-9B35-B2F624D6C5E9}" type="datetimeFigureOut">
               <a:rPr lang="en-US" smtClean="0"/>
               <a:pPr/>
-              <a:t>2/7/2026</a:t>
+              <a:t>2/8/2026</a:t>
             </a:fld>
             <a:endParaRPr lang="en-US"/>
           </a:p>
@@ -7453,13 +7615,19 @@
           <a:p>
             <a:r>
               <a:rPr lang="en-US" dirty="0"/>
+              <a:t>Corrected Activity Table refreshing error, data can be seen immediately now</a:t>
+            </a:r>
+          </a:p>
+          <a:p>
+            <a:r>
+              <a:rPr lang="en-US" dirty="0"/>
               <a:t>Set up the leaderboard page to extract user activities and filter them based on activity type or general statistics</a:t>
             </a:r>
           </a:p>
           <a:p>
             <a:r>
               <a:rPr lang="en-US" dirty="0"/>
-              <a:t>Begin setup of the clubs page</a:t>
+              <a:t>Begin setup of the Clubs page</a:t>
             </a:r>
           </a:p>
           <a:p>
@@ -7467,6 +7635,27 @@
               <a:rPr lang="en-US" dirty="0"/>
               <a:t>Display recent activities on the dashboard</a:t>
             </a:r>
+          </a:p>
+          <a:p>
+            <a:r>
+              <a:rPr lang="en-US" dirty="0"/>
+              <a:t>Addition of Friends feature: user can view list available users and friends</a:t>
+            </a:r>
+          </a:p>
+          <a:p>
+            <a:pPr marL="0" indent="0">
+              <a:buNone/>
+            </a:pPr>
+            <a:r>
+              <a:rPr lang="en-US" dirty="0"/>
+              <a:t> </a:t>
+            </a:r>
+          </a:p>
+          <a:p>
+            <a:pPr marL="0" indent="0">
+              <a:buNone/>
+            </a:pPr>
+            <a:endParaRPr lang="en-US" dirty="0"/>
           </a:p>
           <a:p>
             <a:endParaRPr lang="en-US" dirty="0"/>
@@ -7596,7 +7785,7 @@
             </a:pPr>
             <a:r>
               <a:rPr lang="en-US" dirty="0"/>
-              <a:t>Owner could join their own club</a:t>
+              <a:t>Async function timing on Activity Table API </a:t>
             </a:r>
           </a:p>
           <a:p>
@@ -7606,8 +7795,45 @@
             </a:pPr>
             <a:r>
               <a:rPr lang="en-US" dirty="0"/>
+              <a:t>Owner could join their own club</a:t>
+            </a:r>
+          </a:p>
+          <a:p>
+            <a:pPr marL="342900" indent="-342900">
+              <a:buFont typeface="+mj-lt"/>
+              <a:buAutoNum type="arabicPeriod"/>
+            </a:pPr>
+            <a:r>
+              <a:rPr lang="en-US" dirty="0"/>
               <a:t>Struggle to filter data on leaderboard based on activity type</a:t>
             </a:r>
+          </a:p>
+          <a:p>
+            <a:pPr marL="342900" indent="-342900">
+              <a:buFont typeface="+mj-lt"/>
+              <a:buAutoNum type="arabicPeriod"/>
+            </a:pPr>
+            <a:r>
+              <a:rPr lang="en-US" dirty="0"/>
+              <a:t>User can’t add themselves as a friend</a:t>
+            </a:r>
+          </a:p>
+          <a:p>
+            <a:pPr marL="342900" indent="-342900">
+              <a:buFont typeface="+mj-lt"/>
+              <a:buAutoNum type="arabicPeriod"/>
+            </a:pPr>
+            <a:r>
+              <a:rPr lang="en-US" dirty="0"/>
+              <a:t>Duplicate Friends</a:t>
+            </a:r>
+          </a:p>
+          <a:p>
+            <a:pPr marL="342900" indent="-342900">
+              <a:buFont typeface="+mj-lt"/>
+              <a:buAutoNum type="arabicPeriod"/>
+            </a:pPr>
+            <a:endParaRPr lang="en-US" dirty="0"/>
           </a:p>
         </p:txBody>
       </p:sp>
@@ -7672,16 +7898,54 @@
             </a:pPr>
             <a:r>
               <a:rPr lang="en-US" dirty="0"/>
+              <a:t>Logic needed rearranged so table API triggered</a:t>
+            </a:r>
+          </a:p>
+          <a:p>
+            <a:pPr marL="342900" indent="-342900">
+              <a:buFont typeface="+mj-lt"/>
+              <a:buAutoNum type="arabicPeriod"/>
+            </a:pPr>
+            <a:r>
+              <a:rPr lang="en-US" dirty="0"/>
               <a:t>Added column in schema to hold club creators User ID</a:t>
             </a:r>
           </a:p>
           <a:p>
-            <a:pPr marL="0" indent="0">
-              <a:buNone/>
+            <a:pPr marL="342900" indent="-342900">
+              <a:buFont typeface="+mj-lt"/>
+              <a:buAutoNum type="arabicPeriod"/>
             </a:pPr>
             <a:r>
               <a:rPr lang="en-US" dirty="0"/>
-              <a:t>2. No solution yet</a:t>
+              <a:t>No solution yet</a:t>
+            </a:r>
+          </a:p>
+          <a:p>
+            <a:pPr marL="342900" indent="-342900">
+              <a:buFont typeface="+mj-lt"/>
+              <a:buAutoNum type="arabicPeriod"/>
+            </a:pPr>
+            <a:r>
+              <a:rPr lang="en-US" dirty="0"/>
+              <a:t>Check user unique id from database, and remove from dropdown </a:t>
+            </a:r>
+          </a:p>
+          <a:p>
+            <a:pPr marL="342900" indent="-342900">
+              <a:buFont typeface="+mj-lt"/>
+              <a:buAutoNum type="arabicPeriod"/>
+            </a:pPr>
+            <a:r>
+              <a:rPr lang="en-US" dirty="0"/>
+              <a:t> Once friend is added, take off dropdown list </a:t>
+            </a:r>
+          </a:p>
+          <a:p>
+            <a:pPr lvl="1"/>
+            <a:r>
+              <a:rPr lang="en-US" dirty="0"/>
+              <a:t>Add to existing friend schema so next session friends are visible</a:t>
             </a:r>
           </a:p>
         </p:txBody>
@@ -7700,6 +7964,94 @@
 </file>
 
 <file path=ppt/slides/slide4.xml><?xml version="1.0" encoding="utf-8"?>
+<p:sld xmlns:a="http://schemas.openxmlformats.org/drawingml/2006/main" xmlns:r="http://schemas.openxmlformats.org/officeDocument/2006/relationships" xmlns:p="http://schemas.openxmlformats.org/presentationml/2006/main">
+  <p:cSld>
+    <p:spTree>
+      <p:nvGrpSpPr>
+        <p:cNvPr id="1" name=""/>
+        <p:cNvGrpSpPr/>
+        <p:nvPr/>
+      </p:nvGrpSpPr>
+      <p:grpSpPr>
+        <a:xfrm>
+          <a:off x="0" y="0"/>
+          <a:ext cx="0" cy="0"/>
+          <a:chOff x="0" y="0"/>
+          <a:chExt cx="0" cy="0"/>
+        </a:xfrm>
+      </p:grpSpPr>
+      <p:sp>
+        <p:nvSpPr>
+          <p:cNvPr id="2" name="Title 1">
+            <a:extLst>
+              <a:ext uri="{FF2B5EF4-FFF2-40B4-BE49-F238E27FC236}">
+                <a16:creationId xmlns:a16="http://schemas.microsoft.com/office/drawing/2014/main" id="{550E036F-9CC8-EA49-B945-2716443B0D88}"/>
+              </a:ext>
+            </a:extLst>
+          </p:cNvPr>
+          <p:cNvSpPr>
+            <a:spLocks noGrp="1"/>
+          </p:cNvSpPr>
+          <p:nvPr>
+            <p:ph type="title"/>
+          </p:nvPr>
+        </p:nvSpPr>
+        <p:spPr/>
+        <p:txBody>
+          <a:bodyPr/>
+          <a:lstStyle/>
+          <a:p>
+            <a:r>
+              <a:rPr lang="en-US" dirty="0"/>
+              <a:t>Progress Video Demo</a:t>
+            </a:r>
+          </a:p>
+        </p:txBody>
+      </p:sp>
+      <p:sp>
+        <p:nvSpPr>
+          <p:cNvPr id="4" name="Content Placeholder 3">
+            <a:extLst>
+              <a:ext uri="{FF2B5EF4-FFF2-40B4-BE49-F238E27FC236}">
+                <a16:creationId xmlns:a16="http://schemas.microsoft.com/office/drawing/2014/main" id="{0330C9FD-8763-49EF-E294-3242410E144E}"/>
+              </a:ext>
+            </a:extLst>
+          </p:cNvPr>
+          <p:cNvSpPr>
+            <a:spLocks noGrp="1"/>
+          </p:cNvSpPr>
+          <p:nvPr>
+            <p:ph sz="half" idx="2"/>
+          </p:nvPr>
+        </p:nvSpPr>
+        <p:spPr>
+          <a:xfrm>
+            <a:off x="521207" y="2004413"/>
+            <a:ext cx="11420493" cy="4341523"/>
+          </a:xfrm>
+        </p:spPr>
+        <p:txBody>
+          <a:bodyPr/>
+          <a:lstStyle/>
+          <a:p>
+            <a:endParaRPr lang="en-US" dirty="0"/>
+          </a:p>
+        </p:txBody>
+      </p:sp>
+    </p:spTree>
+    <p:extLst>
+      <p:ext uri="{BB962C8B-B14F-4D97-AF65-F5344CB8AC3E}">
+        <p14:creationId xmlns:p14="http://schemas.microsoft.com/office/powerpoint/2010/main" val="291263137"/>
+      </p:ext>
+    </p:extLst>
+  </p:cSld>
+  <p:clrMapOvr>
+    <a:masterClrMapping/>
+  </p:clrMapOvr>
+</p:sld>
+</file>
+
+<file path=ppt/slides/slide5.xml><?xml version="1.0" encoding="utf-8"?>
 <p:sld xmlns:a="http://schemas.openxmlformats.org/drawingml/2006/main" xmlns:r="http://schemas.openxmlformats.org/officeDocument/2006/relationships" xmlns:p="http://schemas.openxmlformats.org/presentationml/2006/main">
   <p:cSld>
     <p:spTree>
@@ -7793,9 +8145,17 @@
 </p:sld>
 </file>
 
-<file path=ppt/slides/slide5.xml><?xml version="1.0" encoding="utf-8"?>
+<file path=ppt/slides/slide6.xml><?xml version="1.0" encoding="utf-8"?>
 <p:sld xmlns:a="http://schemas.openxmlformats.org/drawingml/2006/main" xmlns:r="http://schemas.openxmlformats.org/officeDocument/2006/relationships" xmlns:p="http://schemas.openxmlformats.org/presentationml/2006/main">
   <p:cSld>
+    <p:bg>
+      <p:bgPr>
+        <a:solidFill>
+          <a:schemeClr val="bg1"/>
+        </a:solidFill>
+        <a:effectLst/>
+      </p:bgPr>
+    </p:bg>
     <p:spTree>
       <p:nvGrpSpPr>
         <p:cNvPr id="1" name=""/>
@@ -7810,6 +8170,66 @@
           <a:chExt cx="0" cy="0"/>
         </a:xfrm>
       </p:grpSpPr>
+      <p:sp useBgFill="1">
+        <p:nvSpPr>
+          <p:cNvPr id="28" name="Rectangle 27">
+            <a:extLst>
+              <a:ext uri="{FF2B5EF4-FFF2-40B4-BE49-F238E27FC236}">
+                <a16:creationId xmlns:a16="http://schemas.microsoft.com/office/drawing/2014/main" id="{817D949E-564D-4503-A64E-D22FA3232C29}"/>
+              </a:ext>
+              <a:ext uri="{C183D7F6-B498-43B3-948B-1728B52AA6E4}">
+                <adec:decorative xmlns:adec="http://schemas.microsoft.com/office/drawing/2017/decorative" val="1"/>
+              </a:ext>
+            </a:extLst>
+          </p:cNvPr>
+          <p:cNvSpPr>
+            <a:spLocks noGrp="1" noRot="1" noChangeAspect="1" noMove="1" noResize="1" noEditPoints="1" noAdjustHandles="1" noChangeArrowheads="1" noChangeShapeType="1" noTextEdit="1"/>
+          </p:cNvSpPr>
+          <p:nvPr>
+            <p:extLst>
+              <p:ext uri="{386F3935-93C4-4BCD-93E2-E3B085C9AB24}">
+                <p16:designElem xmlns:p16="http://schemas.microsoft.com/office/powerpoint/2015/main" val="1"/>
+              </p:ext>
+            </p:extLst>
+          </p:nvPr>
+        </p:nvSpPr>
+        <p:spPr>
+          <a:xfrm>
+            <a:off x="0" y="0"/>
+            <a:ext cx="12188952" cy="6857995"/>
+          </a:xfrm>
+          <a:prstGeom prst="rect">
+            <a:avLst/>
+          </a:prstGeom>
+          <a:ln>
+            <a:noFill/>
+          </a:ln>
+        </p:spPr>
+        <p:style>
+          <a:lnRef idx="2">
+            <a:schemeClr val="accent1">
+              <a:shade val="50000"/>
+            </a:schemeClr>
+          </a:lnRef>
+          <a:fillRef idx="1">
+            <a:schemeClr val="accent1"/>
+          </a:fillRef>
+          <a:effectRef idx="0">
+            <a:schemeClr val="accent1"/>
+          </a:effectRef>
+          <a:fontRef idx="minor">
+            <a:schemeClr val="lt1"/>
+          </a:fontRef>
+        </p:style>
+        <p:txBody>
+          <a:bodyPr rtlCol="0" anchor="ctr"/>
+          <a:lstStyle/>
+          <a:p>
+            <a:pPr algn="ctr"/>
+            <a:endParaRPr lang="en-US" dirty="0"/>
+          </a:p>
+        </p:txBody>
+      </p:sp>
       <p:sp>
         <p:nvSpPr>
           <p:cNvPr id="2" name="Title 1">
@@ -7828,8 +8248,8 @@
         </p:nvSpPr>
         <p:spPr>
           <a:xfrm>
-            <a:off x="1069848" y="484632"/>
-            <a:ext cx="10058400" cy="1609344"/>
+            <a:off x="521208" y="978408"/>
+            <a:ext cx="4032504" cy="3364992"/>
           </a:xfrm>
         </p:spPr>
         <p:txBody>
@@ -7853,6 +8273,132 @@
           </a:p>
         </p:txBody>
       </p:sp>
+      <p:sp>
+        <p:nvSpPr>
+          <p:cNvPr id="30" name="Rectangle 29">
+            <a:extLst>
+              <a:ext uri="{FF2B5EF4-FFF2-40B4-BE49-F238E27FC236}">
+                <a16:creationId xmlns:a16="http://schemas.microsoft.com/office/drawing/2014/main" id="{92BE0106-0C20-465B-A1BE-0BAC2737B1AD}"/>
+              </a:ext>
+              <a:ext uri="{C183D7F6-B498-43B3-948B-1728B52AA6E4}">
+                <adec:decorative xmlns:adec="http://schemas.microsoft.com/office/drawing/2017/decorative" val="1"/>
+              </a:ext>
+            </a:extLst>
+          </p:cNvPr>
+          <p:cNvSpPr>
+            <a:spLocks noGrp="1" noRot="1" noChangeAspect="1" noMove="1" noResize="1" noEditPoints="1" noAdjustHandles="1" noChangeArrowheads="1" noChangeShapeType="1" noTextEdit="1"/>
+          </p:cNvSpPr>
+          <p:nvPr>
+            <p:extLst>
+              <p:ext uri="{386F3935-93C4-4BCD-93E2-E3B085C9AB24}">
+                <p16:designElem xmlns:p16="http://schemas.microsoft.com/office/powerpoint/2015/main" val="1"/>
+              </p:ext>
+            </p:extLst>
+          </p:nvPr>
+        </p:nvSpPr>
+        <p:spPr>
+          <a:xfrm>
+            <a:off x="517870" y="508090"/>
+            <a:ext cx="4032504" cy="149279"/>
+          </a:xfrm>
+          <a:prstGeom prst="rect">
+            <a:avLst/>
+          </a:prstGeom>
+          <a:solidFill>
+            <a:schemeClr val="tx1"/>
+          </a:solidFill>
+          <a:ln>
+            <a:noFill/>
+          </a:ln>
+        </p:spPr>
+        <p:style>
+          <a:lnRef idx="2">
+            <a:schemeClr val="accent1">
+              <a:shade val="50000"/>
+            </a:schemeClr>
+          </a:lnRef>
+          <a:fillRef idx="1">
+            <a:schemeClr val="accent1"/>
+          </a:fillRef>
+          <a:effectRef idx="0">
+            <a:schemeClr val="accent1"/>
+          </a:effectRef>
+          <a:fontRef idx="minor">
+            <a:schemeClr val="lt1"/>
+          </a:fontRef>
+        </p:style>
+        <p:txBody>
+          <a:bodyPr rtlCol="0" anchor="ctr"/>
+          <a:lstStyle/>
+          <a:p>
+            <a:pPr algn="ctr"/>
+            <a:endParaRPr lang="en-US"/>
+          </a:p>
+        </p:txBody>
+      </p:sp>
+      <p:sp>
+        <p:nvSpPr>
+          <p:cNvPr id="32" name="Rectangle 31">
+            <a:extLst>
+              <a:ext uri="{FF2B5EF4-FFF2-40B4-BE49-F238E27FC236}">
+                <a16:creationId xmlns:a16="http://schemas.microsoft.com/office/drawing/2014/main" id="{851808AB-2943-464C-A710-F2A18D869334}"/>
+              </a:ext>
+              <a:ext uri="{C183D7F6-B498-43B3-948B-1728B52AA6E4}">
+                <adec:decorative xmlns:adec="http://schemas.microsoft.com/office/drawing/2017/decorative" val="1"/>
+              </a:ext>
+            </a:extLst>
+          </p:cNvPr>
+          <p:cNvSpPr>
+            <a:spLocks noGrp="1" noRot="1" noChangeAspect="1" noMove="1" noResize="1" noEditPoints="1" noAdjustHandles="1" noChangeArrowheads="1" noChangeShapeType="1" noTextEdit="1"/>
+          </p:cNvSpPr>
+          <p:nvPr>
+            <p:extLst>
+              <p:ext uri="{386F3935-93C4-4BCD-93E2-E3B085C9AB24}">
+                <p16:designElem xmlns:p16="http://schemas.microsoft.com/office/powerpoint/2015/main" val="1"/>
+              </p:ext>
+            </p:extLst>
+          </p:nvPr>
+        </p:nvSpPr>
+        <p:spPr>
+          <a:xfrm>
+            <a:off x="5065776" y="6300216"/>
+            <a:ext cx="6620256" cy="45719"/>
+          </a:xfrm>
+          <a:prstGeom prst="rect">
+            <a:avLst/>
+          </a:prstGeom>
+          <a:solidFill>
+            <a:schemeClr val="tx1"/>
+          </a:solidFill>
+          <a:ln>
+            <a:noFill/>
+          </a:ln>
+        </p:spPr>
+        <p:style>
+          <a:lnRef idx="2">
+            <a:schemeClr val="accent1">
+              <a:shade val="50000"/>
+            </a:schemeClr>
+          </a:lnRef>
+          <a:fillRef idx="1">
+            <a:schemeClr val="accent1"/>
+          </a:fillRef>
+          <a:effectRef idx="0">
+            <a:schemeClr val="accent1"/>
+          </a:effectRef>
+          <a:fontRef idx="minor">
+            <a:schemeClr val="lt1"/>
+          </a:fontRef>
+        </p:style>
+        <p:txBody>
+          <a:bodyPr rtlCol="0" anchor="ctr"/>
+          <a:lstStyle/>
+          <a:p>
+            <a:pPr algn="ctr"/>
+            <a:endParaRPr lang="en-US"/>
+          </a:p>
+        </p:txBody>
+      </p:sp>
       <p:graphicFrame>
         <p:nvGraphicFramePr>
           <p:cNvPr id="23" name="Content Placeholder 2">
@@ -7869,14 +8415,14 @@
             <p:ph idx="1"/>
             <p:extLst>
               <p:ext uri="{D42A27DB-BD31-4B8C-83A1-F6EECF244321}">
-                <p14:modId xmlns:p14="http://schemas.microsoft.com/office/powerpoint/2010/main" val="1370031671"/>
+                <p14:modId xmlns:p14="http://schemas.microsoft.com/office/powerpoint/2010/main" val="1374972028"/>
               </p:ext>
             </p:extLst>
           </p:nvPr>
         </p:nvGraphicFramePr>
         <p:xfrm>
-          <a:off x="1069975" y="2385390"/>
-          <a:ext cx="10058400" cy="3617845"/>
+          <a:off x="5065776" y="978408"/>
+          <a:ext cx="6620256" cy="4965192"/>
         </p:xfrm>
         <a:graphic>
           <a:graphicData uri="http://schemas.openxmlformats.org/drawingml/2006/diagram">

</xml_diff>

<commit_message>
LEADERBOARD IS GETTING STATS
</commit_message>
<xml_diff>
--- a/Documentation/Weekly Report/week4/CMSC-4920-Group2-Week4.pptx
+++ b/Documentation/Weekly Report/week4/CMSC-4920-Group2-Week4.pptx
@@ -11,6 +11,7 @@
     <p:sldId id="266" r:id="rId5"/>
     <p:sldId id="259" r:id="rId6"/>
     <p:sldId id="265" r:id="rId7"/>
+    <p:sldId id="267" r:id="rId8"/>
   </p:sldIdLst>
   <p:sldSz cx="12192000" cy="6858000"/>
   <p:notesSz cx="6858000" cy="9144000"/>
@@ -130,7 +131,7 @@
   <pc:docChgLst>
     <pc:chgData name="John Gerega" userId="bd3e1e46fb6a714b" providerId="LiveId" clId="{45F0C402-C550-4C82-B31D-5B32217A5E94}"/>
     <pc:docChg chg="custSel addSld modSld addMainMaster delMainMaster">
-      <pc:chgData name="John Gerega" userId="bd3e1e46fb6a714b" providerId="LiveId" clId="{45F0C402-C550-4C82-B31D-5B32217A5E94}" dt="2026-02-07T17:26:54.361" v="699" actId="20577"/>
+      <pc:chgData name="John Gerega" userId="bd3e1e46fb6a714b" providerId="LiveId" clId="{45F0C402-C550-4C82-B31D-5B32217A5E94}" dt="2026-02-09T15:55:13.147" v="700" actId="680"/>
       <pc:docMkLst>
         <pc:docMk/>
       </pc:docMkLst>
@@ -211,14 +212,6 @@
             <ac:spMk id="4" creationId="{E561C6AA-9902-DF8F-9362-2CB01093FE3C}"/>
           </ac:spMkLst>
         </pc:spChg>
-        <pc:spChg chg="mod">
-          <ac:chgData name="John Gerega" userId="bd3e1e46fb6a714b" providerId="LiveId" clId="{45F0C402-C550-4C82-B31D-5B32217A5E94}" dt="2026-02-07T17:26:54.361" v="699" actId="20577"/>
-          <ac:spMkLst>
-            <pc:docMk/>
-            <pc:sldMk cId="15834778" sldId="258"/>
-            <ac:spMk id="6" creationId="{F191227A-06C8-D8A3-0CAF-897814B3001C}"/>
-          </ac:spMkLst>
-        </pc:spChg>
       </pc:sldChg>
       <pc:sldChg chg="modSp new mod">
         <pc:chgData name="John Gerega" userId="bd3e1e46fb6a714b" providerId="LiveId" clId="{45F0C402-C550-4C82-B31D-5B32217A5E94}" dt="2026-02-02T20:40:18.617" v="618" actId="20577"/>
@@ -234,6 +227,13 @@
             <ac:spMk id="2" creationId="{6AEF2B38-CEDA-4975-20B3-61F49EDAA71B}"/>
           </ac:spMkLst>
         </pc:spChg>
+      </pc:sldChg>
+      <pc:sldChg chg="new">
+        <pc:chgData name="John Gerega" userId="bd3e1e46fb6a714b" providerId="LiveId" clId="{45F0C402-C550-4C82-B31D-5B32217A5E94}" dt="2026-02-09T15:55:13.147" v="700" actId="680"/>
+        <pc:sldMkLst>
+          <pc:docMk/>
+          <pc:sldMk cId="1387929111" sldId="267"/>
+        </pc:sldMkLst>
       </pc:sldChg>
       <pc:sldMasterChg chg="add addSldLayout">
         <pc:chgData name="John Gerega" userId="bd3e1e46fb6a714b" providerId="LiveId" clId="{45F0C402-C550-4C82-B31D-5B32217A5E94}" dt="2026-02-02T20:33:55.195" v="25" actId="26606"/>
@@ -6985,7 +6985,7 @@
           <a:p>
             <a:fld id="{E80C50CD-E178-4744-9B35-B2F624D6C5E9}" type="datetimeFigureOut">
               <a:rPr lang="en-US" smtClean="0"/>
-              <a:t>2/8/2026</a:t>
+              <a:t>2/9/2026</a:t>
             </a:fld>
             <a:endParaRPr lang="en-US"/>
           </a:p>
@@ -7183,7 +7183,7 @@
           <a:p>
             <a:fld id="{E80C50CD-E178-4744-9B35-B2F624D6C5E9}" type="datetimeFigureOut">
               <a:rPr lang="en-US" smtClean="0"/>
-              <a:t>2/8/2026</a:t>
+              <a:t>2/9/2026</a:t>
             </a:fld>
             <a:endParaRPr lang="en-US"/>
           </a:p>
@@ -7391,7 +7391,7 @@
           <a:p>
             <a:fld id="{E80C50CD-E178-4744-9B35-B2F624D6C5E9}" type="datetimeFigureOut">
               <a:rPr lang="en-US" smtClean="0"/>
-              <a:t>2/8/2026</a:t>
+              <a:t>2/9/2026</a:t>
             </a:fld>
             <a:endParaRPr lang="en-US"/>
           </a:p>
@@ -7641,7 +7641,7 @@
           <a:p>
             <a:fld id="{E80C50CD-E178-4744-9B35-B2F624D6C5E9}" type="datetimeFigureOut">
               <a:rPr lang="en-US" smtClean="0"/>
-              <a:t>2/8/2026</a:t>
+              <a:t>2/9/2026</a:t>
             </a:fld>
             <a:endParaRPr lang="en-US"/>
           </a:p>
@@ -7920,7 +7920,7 @@
           <a:p>
             <a:fld id="{E80C50CD-E178-4744-9B35-B2F624D6C5E9}" type="datetimeFigureOut">
               <a:rPr lang="en-US" smtClean="0"/>
-              <a:t>2/8/2026</a:t>
+              <a:t>2/9/2026</a:t>
             </a:fld>
             <a:endParaRPr lang="en-US"/>
           </a:p>
@@ -8237,7 +8237,7 @@
           <a:p>
             <a:fld id="{E80C50CD-E178-4744-9B35-B2F624D6C5E9}" type="datetimeFigureOut">
               <a:rPr lang="en-US" smtClean="0"/>
-              <a:t>2/8/2026</a:t>
+              <a:t>2/9/2026</a:t>
             </a:fld>
             <a:endParaRPr lang="en-US"/>
           </a:p>
@@ -8653,7 +8653,7 @@
           <a:p>
             <a:fld id="{E80C50CD-E178-4744-9B35-B2F624D6C5E9}" type="datetimeFigureOut">
               <a:rPr lang="en-US" smtClean="0"/>
-              <a:t>2/8/2026</a:t>
+              <a:t>2/9/2026</a:t>
             </a:fld>
             <a:endParaRPr lang="en-US"/>
           </a:p>
@@ -8794,7 +8794,7 @@
           <a:p>
             <a:fld id="{E80C50CD-E178-4744-9B35-B2F624D6C5E9}" type="datetimeFigureOut">
               <a:rPr lang="en-US" smtClean="0"/>
-              <a:t>2/8/2026</a:t>
+              <a:t>2/9/2026</a:t>
             </a:fld>
             <a:endParaRPr lang="en-US"/>
           </a:p>
@@ -8907,7 +8907,7 @@
           <a:p>
             <a:fld id="{E80C50CD-E178-4744-9B35-B2F624D6C5E9}" type="datetimeFigureOut">
               <a:rPr lang="en-US" smtClean="0"/>
-              <a:t>2/8/2026</a:t>
+              <a:t>2/9/2026</a:t>
             </a:fld>
             <a:endParaRPr lang="en-US"/>
           </a:p>
@@ -9224,7 +9224,7 @@
           <a:p>
             <a:fld id="{E80C50CD-E178-4744-9B35-B2F624D6C5E9}" type="datetimeFigureOut">
               <a:rPr lang="en-US" smtClean="0"/>
-              <a:t>2/8/2026</a:t>
+              <a:t>2/9/2026</a:t>
             </a:fld>
             <a:endParaRPr lang="en-US"/>
           </a:p>
@@ -9516,7 +9516,7 @@
           <a:p>
             <a:fld id="{E80C50CD-E178-4744-9B35-B2F624D6C5E9}" type="datetimeFigureOut">
               <a:rPr lang="en-US" smtClean="0"/>
-              <a:t>2/8/2026</a:t>
+              <a:t>2/9/2026</a:t>
             </a:fld>
             <a:endParaRPr lang="en-US"/>
           </a:p>
@@ -9756,7 +9756,7 @@
             <a:fld id="{E80C50CD-E178-4744-9B35-B2F624D6C5E9}" type="datetimeFigureOut">
               <a:rPr lang="en-US" smtClean="0"/>
               <a:pPr/>
-              <a:t>2/8/2026</a:t>
+              <a:t>2/9/2026</a:t>
             </a:fld>
             <a:endParaRPr lang="en-US"/>
           </a:p>
@@ -11914,6 +11914,86 @@
 </p:sld>
 </file>
 
+<file path=ppt/slides/slide7.xml><?xml version="1.0" encoding="utf-8"?>
+<p:sld xmlns:a="http://schemas.openxmlformats.org/drawingml/2006/main" xmlns:r="http://schemas.openxmlformats.org/officeDocument/2006/relationships" xmlns:p="http://schemas.openxmlformats.org/presentationml/2006/main">
+  <p:cSld>
+    <p:spTree>
+      <p:nvGrpSpPr>
+        <p:cNvPr id="1" name=""/>
+        <p:cNvGrpSpPr/>
+        <p:nvPr/>
+      </p:nvGrpSpPr>
+      <p:grpSpPr>
+        <a:xfrm>
+          <a:off x="0" y="0"/>
+          <a:ext cx="0" cy="0"/>
+          <a:chOff x="0" y="0"/>
+          <a:chExt cx="0" cy="0"/>
+        </a:xfrm>
+      </p:grpSpPr>
+      <p:sp>
+        <p:nvSpPr>
+          <p:cNvPr id="2" name="Title 1">
+            <a:extLst>
+              <a:ext uri="{FF2B5EF4-FFF2-40B4-BE49-F238E27FC236}">
+                <a16:creationId xmlns:a16="http://schemas.microsoft.com/office/drawing/2014/main" id="{B92A0143-14B3-E3F5-40C1-B722B11D6C39}"/>
+              </a:ext>
+            </a:extLst>
+          </p:cNvPr>
+          <p:cNvSpPr>
+            <a:spLocks noGrp="1"/>
+          </p:cNvSpPr>
+          <p:nvPr>
+            <p:ph type="title"/>
+          </p:nvPr>
+        </p:nvSpPr>
+        <p:spPr/>
+        <p:txBody>
+          <a:bodyPr/>
+          <a:lstStyle/>
+          <a:p>
+            <a:endParaRPr lang="en-US"/>
+          </a:p>
+        </p:txBody>
+      </p:sp>
+      <p:sp>
+        <p:nvSpPr>
+          <p:cNvPr id="3" name="Content Placeholder 2">
+            <a:extLst>
+              <a:ext uri="{FF2B5EF4-FFF2-40B4-BE49-F238E27FC236}">
+                <a16:creationId xmlns:a16="http://schemas.microsoft.com/office/drawing/2014/main" id="{8E69346B-FA36-CD4B-AB2D-E8D1E6148C80}"/>
+              </a:ext>
+            </a:extLst>
+          </p:cNvPr>
+          <p:cNvSpPr>
+            <a:spLocks noGrp="1"/>
+          </p:cNvSpPr>
+          <p:nvPr>
+            <p:ph idx="1"/>
+          </p:nvPr>
+        </p:nvSpPr>
+        <p:spPr/>
+        <p:txBody>
+          <a:bodyPr/>
+          <a:lstStyle/>
+          <a:p>
+            <a:endParaRPr lang="en-US"/>
+          </a:p>
+        </p:txBody>
+      </p:sp>
+    </p:spTree>
+    <p:extLst>
+      <p:ext uri="{BB962C8B-B14F-4D97-AF65-F5344CB8AC3E}">
+        <p14:creationId xmlns:p14="http://schemas.microsoft.com/office/powerpoint/2010/main" val="1387929111"/>
+      </p:ext>
+    </p:extLst>
+  </p:cSld>
+  <p:clrMapOvr>
+    <a:masterClrMapping/>
+  </p:clrMapOvr>
+</p:sld>
+</file>
+
 <file path=ppt/theme/theme1.xml><?xml version="1.0" encoding="utf-8"?>
 <a:theme xmlns:a="http://schemas.openxmlformats.org/drawingml/2006/main" name="GestaltVTI">
   <a:themeElements>

</xml_diff>

<commit_message>
fix docs, and add
</commit_message>
<xml_diff>
--- a/Documentation/Weekly Report/week4/CMSC-4920-Group2-Week4.pptx
+++ b/Documentation/Weekly Report/week4/CMSC-4920-Group2-Week4.pptx
@@ -11,7 +11,6 @@
     <p:sldId id="266" r:id="rId5"/>
     <p:sldId id="259" r:id="rId6"/>
     <p:sldId id="265" r:id="rId7"/>
-    <p:sldId id="267" r:id="rId8"/>
   </p:sldIdLst>
   <p:sldSz cx="12192000" cy="6858000"/>
   <p:notesSz cx="6858000" cy="9144000"/>
@@ -123,7 +122,7 @@
   <pc:docChgLst>
     <pc:chgData name="John Gerega" userId="bd3e1e46fb6a714b" providerId="LiveId" clId="{45F0C402-C550-4C82-B31D-5B32217A5E94}"/>
     <pc:docChg chg="custSel addSld modSld addMainMaster delMainMaster">
-      <pc:chgData name="John Gerega" userId="bd3e1e46fb6a714b" providerId="LiveId" clId="{45F0C402-C550-4C82-B31D-5B32217A5E94}" dt="2026-02-13T20:54:44.180" v="1470" actId="20577"/>
+      <pc:chgData name="John Gerega" userId="bd3e1e46fb6a714b" providerId="LiveId" clId="{45F0C402-C550-4C82-B31D-5B32217A5E94}" dt="2026-02-07T17:26:54.361" v="699" actId="20577"/>
       <pc:docMkLst>
         <pc:docMk/>
       </pc:docMkLst>
@@ -175,7 +174,7 @@
         </pc:picChg>
       </pc:sldChg>
       <pc:sldChg chg="modSp new mod">
-        <pc:chgData name="John Gerega" userId="bd3e1e46fb6a714b" providerId="LiveId" clId="{45F0C402-C550-4C82-B31D-5B32217A5E94}" dt="2026-02-11T19:17:57.623" v="894" actId="20577"/>
+        <pc:chgData name="John Gerega" userId="bd3e1e46fb6a714b" providerId="LiveId" clId="{45F0C402-C550-4C82-B31D-5B32217A5E94}" dt="2026-02-07T17:26:54.361" v="699" actId="20577"/>
         <pc:sldMkLst>
           <pc:docMk/>
           <pc:sldMk cId="15834778" sldId="258"/>
@@ -197,7 +196,7 @@
           </ac:spMkLst>
         </pc:spChg>
         <pc:spChg chg="mod">
-          <ac:chgData name="John Gerega" userId="bd3e1e46fb6a714b" providerId="LiveId" clId="{45F0C402-C550-4C82-B31D-5B32217A5E94}" dt="2026-02-11T19:17:57.623" v="894" actId="20577"/>
+          <ac:chgData name="John Gerega" userId="bd3e1e46fb6a714b" providerId="LiveId" clId="{45F0C402-C550-4C82-B31D-5B32217A5E94}" dt="2026-02-02T20:37:22.058" v="426" actId="20577"/>
           <ac:spMkLst>
             <pc:docMk/>
             <pc:sldMk cId="15834778" sldId="258"/>
@@ -219,59 +218,6 @@
             <ac:spMk id="2" creationId="{6AEF2B38-CEDA-4975-20B3-61F49EDAA71B}"/>
           </ac:spMkLst>
         </pc:spChg>
-      </pc:sldChg>
-      <pc:sldChg chg="modSp mod">
-        <pc:chgData name="John Gerega" userId="bd3e1e46fb6a714b" providerId="LiveId" clId="{45F0C402-C550-4C82-B31D-5B32217A5E94}" dt="2026-02-13T20:54:44.180" v="1470" actId="20577"/>
-        <pc:sldMkLst>
-          <pc:docMk/>
-          <pc:sldMk cId="3161600005" sldId="260"/>
-        </pc:sldMkLst>
-        <pc:spChg chg="mod">
-          <ac:chgData name="John Gerega" userId="bd3e1e46fb6a714b" providerId="LiveId" clId="{45F0C402-C550-4C82-B31D-5B32217A5E94}" dt="2026-02-11T19:18:59.216" v="1110" actId="20577"/>
-          <ac:spMkLst>
-            <pc:docMk/>
-            <pc:sldMk cId="3161600005" sldId="260"/>
-            <ac:spMk id="4" creationId="{776ECB18-DBAF-2BDD-C40E-4EABB40220F0}"/>
-          </ac:spMkLst>
-        </pc:spChg>
-        <pc:spChg chg="mod">
-          <ac:chgData name="John Gerega" userId="bd3e1e46fb6a714b" providerId="LiveId" clId="{45F0C402-C550-4C82-B31D-5B32217A5E94}" dt="2026-02-13T20:54:44.180" v="1470" actId="20577"/>
-          <ac:spMkLst>
-            <pc:docMk/>
-            <pc:sldMk cId="3161600005" sldId="260"/>
-            <ac:spMk id="6" creationId="{088E4DDC-393B-1288-15A0-F2DC55C7EA64}"/>
-          </ac:spMkLst>
-        </pc:spChg>
-      </pc:sldChg>
-      <pc:sldChg chg="modSp mod">
-        <pc:chgData name="John Gerega" userId="bd3e1e46fb6a714b" providerId="LiveId" clId="{45F0C402-C550-4C82-B31D-5B32217A5E94}" dt="2026-02-11T19:22:29.161" v="1220" actId="20577"/>
-        <pc:sldMkLst>
-          <pc:docMk/>
-          <pc:sldMk cId="908531274" sldId="265"/>
-        </pc:sldMkLst>
-        <pc:spChg chg="mod">
-          <ac:chgData name="John Gerega" userId="bd3e1e46fb6a714b" providerId="LiveId" clId="{45F0C402-C550-4C82-B31D-5B32217A5E94}" dt="2026-02-11T19:19:06.732" v="1112" actId="20577"/>
-          <ac:spMkLst>
-            <pc:docMk/>
-            <pc:sldMk cId="908531274" sldId="265"/>
-            <ac:spMk id="2" creationId="{9CD0FCC9-9B2B-2FB9-60E5-72F1827F24DF}"/>
-          </ac:spMkLst>
-        </pc:spChg>
-        <pc:graphicFrameChg chg="modGraphic">
-          <ac:chgData name="John Gerega" userId="bd3e1e46fb6a714b" providerId="LiveId" clId="{45F0C402-C550-4C82-B31D-5B32217A5E94}" dt="2026-02-11T19:22:29.161" v="1220" actId="20577"/>
-          <ac:graphicFrameMkLst>
-            <pc:docMk/>
-            <pc:sldMk cId="908531274" sldId="265"/>
-            <ac:graphicFrameMk id="23" creationId="{44CD89A8-8DA1-F116-3D4F-01244121EF2F}"/>
-          </ac:graphicFrameMkLst>
-        </pc:graphicFrameChg>
-      </pc:sldChg>
-      <pc:sldChg chg="new">
-        <pc:chgData name="John Gerega" userId="bd3e1e46fb6a714b" providerId="LiveId" clId="{45F0C402-C550-4C82-B31D-5B32217A5E94}" dt="2026-02-09T15:55:13.147" v="700" actId="680"/>
-        <pc:sldMkLst>
-          <pc:docMk/>
-          <pc:sldMk cId="1387929111" sldId="267"/>
-        </pc:sldMkLst>
       </pc:sldChg>
       <pc:sldMasterChg chg="add addSldLayout">
         <pc:chgData name="John Gerega" userId="bd3e1e46fb6a714b" providerId="LiveId" clId="{45F0C402-C550-4C82-B31D-5B32217A5E94}" dt="2026-02-02T20:33:55.195" v="25" actId="26606"/>
@@ -485,6 +431,149 @@
           </ac:graphicFrameMkLst>
         </pc:graphicFrameChg>
       </pc:sldChg>
+      <pc:sldChg chg="addSp delSp modSp new del mod setBg delAnim modAnim">
+        <pc:chgData name="Margo Bonal" userId="18c9fa0f-b53d-478b-9dc0-6ad88786c19f" providerId="ADAL" clId="{93D479E5-F67F-4B8A-A78F-A0B574A116B6}" dt="2026-02-08T17:43:15.644" v="985" actId="2696"/>
+        <pc:sldMkLst>
+          <pc:docMk/>
+          <pc:sldMk cId="291263137" sldId="266"/>
+        </pc:sldMkLst>
+        <pc:spChg chg="del mod">
+          <ac:chgData name="Margo Bonal" userId="18c9fa0f-b53d-478b-9dc0-6ad88786c19f" providerId="ADAL" clId="{93D479E5-F67F-4B8A-A78F-A0B574A116B6}" dt="2026-02-08T17:39:23.222" v="926" actId="478"/>
+          <ac:spMkLst>
+            <pc:docMk/>
+            <pc:sldMk cId="291263137" sldId="266"/>
+            <ac:spMk id="2" creationId="{550E036F-9CC8-EA49-B945-2716443B0D88}"/>
+          </ac:spMkLst>
+        </pc:spChg>
+        <pc:spChg chg="del">
+          <ac:chgData name="Margo Bonal" userId="18c9fa0f-b53d-478b-9dc0-6ad88786c19f" providerId="ADAL" clId="{93D479E5-F67F-4B8A-A78F-A0B574A116B6}" dt="2026-02-08T13:54:34.404" v="887" actId="21"/>
+          <ac:spMkLst>
+            <pc:docMk/>
+            <pc:sldMk cId="291263137" sldId="266"/>
+            <ac:spMk id="3" creationId="{7D1CFC71-2587-C6B9-0611-5CBB283752C5}"/>
+          </ac:spMkLst>
+        </pc:spChg>
+        <pc:spChg chg="del mod">
+          <ac:chgData name="Margo Bonal" userId="18c9fa0f-b53d-478b-9dc0-6ad88786c19f" providerId="ADAL" clId="{93D479E5-F67F-4B8A-A78F-A0B574A116B6}" dt="2026-02-08T17:37:32.700" v="893"/>
+          <ac:spMkLst>
+            <pc:docMk/>
+            <pc:sldMk cId="291263137" sldId="266"/>
+            <ac:spMk id="4" creationId="{0330C9FD-8763-49EF-E294-3242410E144E}"/>
+          </ac:spMkLst>
+        </pc:spChg>
+        <pc:spChg chg="del">
+          <ac:chgData name="Margo Bonal" userId="18c9fa0f-b53d-478b-9dc0-6ad88786c19f" providerId="ADAL" clId="{93D479E5-F67F-4B8A-A78F-A0B574A116B6}" dt="2026-02-08T13:53:17.781" v="885" actId="21"/>
+          <ac:spMkLst>
+            <pc:docMk/>
+            <pc:sldMk cId="291263137" sldId="266"/>
+            <ac:spMk id="5" creationId="{30AD3A22-232F-E2CF-07BA-2F93F9E96965}"/>
+          </ac:spMkLst>
+        </pc:spChg>
+        <pc:spChg chg="add del mod">
+          <ac:chgData name="Margo Bonal" userId="18c9fa0f-b53d-478b-9dc0-6ad88786c19f" providerId="ADAL" clId="{93D479E5-F67F-4B8A-A78F-A0B574A116B6}" dt="2026-02-08T17:39:26.444" v="927" actId="478"/>
+          <ac:spMkLst>
+            <pc:docMk/>
+            <pc:sldMk cId="291263137" sldId="266"/>
+            <ac:spMk id="6" creationId="{101AEFED-C228-06BB-8BE2-A2555CC7D0C9}"/>
+          </ac:spMkLst>
+        </pc:spChg>
+        <pc:spChg chg="del">
+          <ac:chgData name="Margo Bonal" userId="18c9fa0f-b53d-478b-9dc0-6ad88786c19f" providerId="ADAL" clId="{93D479E5-F67F-4B8A-A78F-A0B574A116B6}" dt="2026-02-08T13:53:20.937" v="886" actId="21"/>
+          <ac:spMkLst>
+            <pc:docMk/>
+            <pc:sldMk cId="291263137" sldId="266"/>
+            <ac:spMk id="6" creationId="{A95DA369-5598-AC33-41E7-D7C92E46E492}"/>
+          </ac:spMkLst>
+        </pc:spChg>
+        <pc:spChg chg="add del">
+          <ac:chgData name="Margo Bonal" userId="18c9fa0f-b53d-478b-9dc0-6ad88786c19f" providerId="ADAL" clId="{93D479E5-F67F-4B8A-A78F-A0B574A116B6}" dt="2026-02-08T17:38:00.961" v="899" actId="26606"/>
+          <ac:spMkLst>
+            <pc:docMk/>
+            <pc:sldMk cId="291263137" sldId="266"/>
+            <ac:spMk id="8" creationId="{774A975B-A886-5202-0489-6965514A0D14}"/>
+          </ac:spMkLst>
+        </pc:spChg>
+        <pc:spChg chg="add mod">
+          <ac:chgData name="Margo Bonal" userId="18c9fa0f-b53d-478b-9dc0-6ad88786c19f" providerId="ADAL" clId="{93D479E5-F67F-4B8A-A78F-A0B574A116B6}" dt="2026-02-08T17:43:02.416" v="981" actId="478"/>
+          <ac:spMkLst>
+            <pc:docMk/>
+            <pc:sldMk cId="291263137" sldId="266"/>
+            <ac:spMk id="9" creationId="{3CB8F89E-521D-7FD6-74E4-390C83F20EC5}"/>
+          </ac:spMkLst>
+        </pc:spChg>
+        <pc:spChg chg="add del">
+          <ac:chgData name="Margo Bonal" userId="18c9fa0f-b53d-478b-9dc0-6ad88786c19f" providerId="ADAL" clId="{93D479E5-F67F-4B8A-A78F-A0B574A116B6}" dt="2026-02-08T17:38:00.961" v="899" actId="26606"/>
+          <ac:spMkLst>
+            <pc:docMk/>
+            <pc:sldMk cId="291263137" sldId="266"/>
+            <ac:spMk id="10" creationId="{EA67E988-5919-57BB-C7DE-D3EAD38A3045}"/>
+          </ac:spMkLst>
+        </pc:spChg>
+        <pc:spChg chg="add del">
+          <ac:chgData name="Margo Bonal" userId="18c9fa0f-b53d-478b-9dc0-6ad88786c19f" providerId="ADAL" clId="{93D479E5-F67F-4B8A-A78F-A0B574A116B6}" dt="2026-02-08T17:38:00.961" v="899" actId="26606"/>
+          <ac:spMkLst>
+            <pc:docMk/>
+            <pc:sldMk cId="291263137" sldId="266"/>
+            <ac:spMk id="12" creationId="{FAF3766F-DEF3-4802-BB0D-7A18EDD9704F}"/>
+          </ac:spMkLst>
+        </pc:spChg>
+        <pc:spChg chg="add del">
+          <ac:chgData name="Margo Bonal" userId="18c9fa0f-b53d-478b-9dc0-6ad88786c19f" providerId="ADAL" clId="{93D479E5-F67F-4B8A-A78F-A0B574A116B6}" dt="2026-02-08T17:38:00.961" v="899" actId="26606"/>
+          <ac:spMkLst>
+            <pc:docMk/>
+            <pc:sldMk cId="291263137" sldId="266"/>
+            <ac:spMk id="14" creationId="{D91952F0-771E-D2ED-C333-EEED6708B80C}"/>
+          </ac:spMkLst>
+        </pc:spChg>
+        <pc:spChg chg="add del">
+          <ac:chgData name="Margo Bonal" userId="18c9fa0f-b53d-478b-9dc0-6ad88786c19f" providerId="ADAL" clId="{93D479E5-F67F-4B8A-A78F-A0B574A116B6}" dt="2026-02-08T17:38:00.961" v="899" actId="26606"/>
+          <ac:spMkLst>
+            <pc:docMk/>
+            <pc:sldMk cId="291263137" sldId="266"/>
+            <ac:spMk id="16" creationId="{3FB6D83C-2377-9CAD-A991-9E0B6AF25067}"/>
+          </ac:spMkLst>
+        </pc:spChg>
+        <pc:spChg chg="add">
+          <ac:chgData name="Margo Bonal" userId="18c9fa0f-b53d-478b-9dc0-6ad88786c19f" providerId="ADAL" clId="{93D479E5-F67F-4B8A-A78F-A0B574A116B6}" dt="2026-02-08T17:38:00.961" v="899" actId="26606"/>
+          <ac:spMkLst>
+            <pc:docMk/>
+            <pc:sldMk cId="291263137" sldId="266"/>
+            <ac:spMk id="21" creationId="{774A975B-A886-5202-0489-6965514A0D14}"/>
+          </ac:spMkLst>
+        </pc:spChg>
+        <pc:spChg chg="add">
+          <ac:chgData name="Margo Bonal" userId="18c9fa0f-b53d-478b-9dc0-6ad88786c19f" providerId="ADAL" clId="{93D479E5-F67F-4B8A-A78F-A0B574A116B6}" dt="2026-02-08T17:38:00.961" v="899" actId="26606"/>
+          <ac:spMkLst>
+            <pc:docMk/>
+            <pc:sldMk cId="291263137" sldId="266"/>
+            <ac:spMk id="23" creationId="{EA67E988-5919-57BB-C7DE-D3EAD38A3045}"/>
+          </ac:spMkLst>
+        </pc:spChg>
+        <pc:spChg chg="add">
+          <ac:chgData name="Margo Bonal" userId="18c9fa0f-b53d-478b-9dc0-6ad88786c19f" providerId="ADAL" clId="{93D479E5-F67F-4B8A-A78F-A0B574A116B6}" dt="2026-02-08T17:38:00.961" v="899" actId="26606"/>
+          <ac:spMkLst>
+            <pc:docMk/>
+            <pc:sldMk cId="291263137" sldId="266"/>
+            <ac:spMk id="25" creationId="{5820888B-4EA5-E0E8-6D52-7733E1E77451}"/>
+          </ac:spMkLst>
+        </pc:spChg>
+        <pc:spChg chg="add">
+          <ac:chgData name="Margo Bonal" userId="18c9fa0f-b53d-478b-9dc0-6ad88786c19f" providerId="ADAL" clId="{93D479E5-F67F-4B8A-A78F-A0B574A116B6}" dt="2026-02-08T17:38:00.961" v="899" actId="26606"/>
+          <ac:spMkLst>
+            <pc:docMk/>
+            <pc:sldMk cId="291263137" sldId="266"/>
+            <ac:spMk id="27" creationId="{06B5A8BF-0680-F9A7-27B1-3971EC934783}"/>
+          </ac:spMkLst>
+        </pc:spChg>
+        <pc:picChg chg="add del mod">
+          <ac:chgData name="Margo Bonal" userId="18c9fa0f-b53d-478b-9dc0-6ad88786c19f" providerId="ADAL" clId="{93D479E5-F67F-4B8A-A78F-A0B574A116B6}" dt="2026-02-08T17:43:02.416" v="981" actId="478"/>
+          <ac:picMkLst>
+            <pc:docMk/>
+            <pc:sldMk cId="291263137" sldId="266"/>
+            <ac:picMk id="3" creationId="{FE7FCACC-E94B-AA0E-095C-3F19BE9732D2}"/>
+          </ac:picMkLst>
+        </pc:picChg>
+      </pc:sldChg>
       <pc:sldChg chg="addSp delSp modSp new mod setBg">
         <pc:chgData name="Margo Bonal" userId="18c9fa0f-b53d-478b-9dc0-6ad88786c19f" providerId="ADAL" clId="{93D479E5-F67F-4B8A-A78F-A0B574A116B6}" dt="2026-02-08T18:38:49.546" v="1128" actId="20577"/>
         <pc:sldMkLst>
@@ -497,6 +586,38 @@
             <pc:docMk/>
             <pc:sldMk cId="4227096544" sldId="266"/>
             <ac:spMk id="2" creationId="{6E9A9E5D-07AB-E926-5C64-E2F9B691E543}"/>
+          </ac:spMkLst>
+        </pc:spChg>
+        <pc:spChg chg="del">
+          <ac:chgData name="Margo Bonal" userId="18c9fa0f-b53d-478b-9dc0-6ad88786c19f" providerId="ADAL" clId="{93D479E5-F67F-4B8A-A78F-A0B574A116B6}" dt="2026-02-08T18:34:56.968" v="1085" actId="478"/>
+          <ac:spMkLst>
+            <pc:docMk/>
+            <pc:sldMk cId="4227096544" sldId="266"/>
+            <ac:spMk id="3" creationId="{360A1374-0C25-3855-226B-116C7410F5DE}"/>
+          </ac:spMkLst>
+        </pc:spChg>
+        <pc:spChg chg="del mod">
+          <ac:chgData name="Margo Bonal" userId="18c9fa0f-b53d-478b-9dc0-6ad88786c19f" providerId="ADAL" clId="{93D479E5-F67F-4B8A-A78F-A0B574A116B6}" dt="2026-02-08T18:35:30.335" v="1122" actId="26606"/>
+          <ac:spMkLst>
+            <pc:docMk/>
+            <pc:sldMk cId="4227096544" sldId="266"/>
+            <ac:spMk id="4" creationId="{A9374BA4-E475-B73E-F0C9-C91EB3C0287E}"/>
+          </ac:spMkLst>
+        </pc:spChg>
+        <pc:spChg chg="del">
+          <ac:chgData name="Margo Bonal" userId="18c9fa0f-b53d-478b-9dc0-6ad88786c19f" providerId="ADAL" clId="{93D479E5-F67F-4B8A-A78F-A0B574A116B6}" dt="2026-02-08T18:35:01.862" v="1089" actId="478"/>
+          <ac:spMkLst>
+            <pc:docMk/>
+            <pc:sldMk cId="4227096544" sldId="266"/>
+            <ac:spMk id="5" creationId="{5CAFA643-141A-668B-57BB-3032936BED50}"/>
+          </ac:spMkLst>
+        </pc:spChg>
+        <pc:spChg chg="del">
+          <ac:chgData name="Margo Bonal" userId="18c9fa0f-b53d-478b-9dc0-6ad88786c19f" providerId="ADAL" clId="{93D479E5-F67F-4B8A-A78F-A0B574A116B6}" dt="2026-02-08T18:35:02.968" v="1090" actId="478"/>
+          <ac:spMkLst>
+            <pc:docMk/>
+            <pc:sldMk cId="4227096544" sldId="266"/>
+            <ac:spMk id="6" creationId="{39ABD288-2D39-CEE7-6EA5-620FDF556246}"/>
           </ac:spMkLst>
         </pc:spChg>
         <pc:spChg chg="add">
@@ -539,6 +660,418 @@
             <ac:graphicFrameMk id="7" creationId="{09FEC443-CB09-EFC4-CCC3-4CB5EB7F2E1D}"/>
           </ac:graphicFrameMkLst>
         </pc:graphicFrameChg>
+      </pc:sldChg>
+      <pc:sldChg chg="addSp delSp modSp new del mod delAnim modAnim">
+        <pc:chgData name="Margo Bonal" userId="18c9fa0f-b53d-478b-9dc0-6ad88786c19f" providerId="ADAL" clId="{93D479E5-F67F-4B8A-A78F-A0B574A116B6}" dt="2026-02-08T18:34:39.681" v="1053" actId="2696"/>
+        <pc:sldMkLst>
+          <pc:docMk/>
+          <pc:sldMk cId="910720759" sldId="267"/>
+        </pc:sldMkLst>
+        <pc:spChg chg="del">
+          <ac:chgData name="Margo Bonal" userId="18c9fa0f-b53d-478b-9dc0-6ad88786c19f" providerId="ADAL" clId="{93D479E5-F67F-4B8A-A78F-A0B574A116B6}" dt="2026-02-08T17:38:56.141" v="919" actId="478"/>
+          <ac:spMkLst>
+            <pc:docMk/>
+            <pc:sldMk cId="910720759" sldId="267"/>
+            <ac:spMk id="2" creationId="{29FFB94E-786A-3016-B6D7-848D9602CEE6}"/>
+          </ac:spMkLst>
+        </pc:spChg>
+        <pc:spChg chg="del">
+          <ac:chgData name="Margo Bonal" userId="18c9fa0f-b53d-478b-9dc0-6ad88786c19f" providerId="ADAL" clId="{93D479E5-F67F-4B8A-A78F-A0B574A116B6}" dt="2026-02-08T17:38:43.609" v="911" actId="478"/>
+          <ac:spMkLst>
+            <pc:docMk/>
+            <pc:sldMk cId="910720759" sldId="267"/>
+            <ac:spMk id="3" creationId="{DE16C08C-CFB4-030D-6527-B2780CFE97CB}"/>
+          </ac:spMkLst>
+        </pc:spChg>
+        <pc:spChg chg="del">
+          <ac:chgData name="Margo Bonal" userId="18c9fa0f-b53d-478b-9dc0-6ad88786c19f" providerId="ADAL" clId="{93D479E5-F67F-4B8A-A78F-A0B574A116B6}" dt="2026-02-08T17:38:45.033" v="912" actId="478"/>
+          <ac:spMkLst>
+            <pc:docMk/>
+            <pc:sldMk cId="910720759" sldId="267"/>
+            <ac:spMk id="4" creationId="{CBF22B04-A525-C5F7-8F1F-4F9B780F1A98}"/>
+          </ac:spMkLst>
+        </pc:spChg>
+        <pc:spChg chg="del mod">
+          <ac:chgData name="Margo Bonal" userId="18c9fa0f-b53d-478b-9dc0-6ad88786c19f" providerId="ADAL" clId="{93D479E5-F67F-4B8A-A78F-A0B574A116B6}" dt="2026-02-08T17:38:51.931" v="917" actId="478"/>
+          <ac:spMkLst>
+            <pc:docMk/>
+            <pc:sldMk cId="910720759" sldId="267"/>
+            <ac:spMk id="5" creationId="{25C07C3A-6E97-37F9-86DF-2998437474D6}"/>
+          </ac:spMkLst>
+        </pc:spChg>
+        <pc:spChg chg="del">
+          <ac:chgData name="Margo Bonal" userId="18c9fa0f-b53d-478b-9dc0-6ad88786c19f" providerId="ADAL" clId="{93D479E5-F67F-4B8A-A78F-A0B574A116B6}" dt="2026-02-08T17:38:54.459" v="918" actId="478"/>
+          <ac:spMkLst>
+            <pc:docMk/>
+            <pc:sldMk cId="910720759" sldId="267"/>
+            <ac:spMk id="6" creationId="{9A7744C7-F22F-9823-900A-8B0785EF41E1}"/>
+          </ac:spMkLst>
+        </pc:spChg>
+        <pc:picChg chg="add del mod">
+          <ac:chgData name="Margo Bonal" userId="18c9fa0f-b53d-478b-9dc0-6ad88786c19f" providerId="ADAL" clId="{93D479E5-F67F-4B8A-A78F-A0B574A116B6}" dt="2026-02-08T18:17:16.462" v="1036" actId="21"/>
+          <ac:picMkLst>
+            <pc:docMk/>
+            <pc:sldMk cId="910720759" sldId="267"/>
+            <ac:picMk id="2" creationId="{59E376FF-DED8-4C3E-D81A-E8942E175512}"/>
+          </ac:picMkLst>
+        </pc:picChg>
+        <pc:picChg chg="add mod">
+          <ac:chgData name="Margo Bonal" userId="18c9fa0f-b53d-478b-9dc0-6ad88786c19f" providerId="ADAL" clId="{93D479E5-F67F-4B8A-A78F-A0B574A116B6}" dt="2026-02-08T18:19:49.599" v="1041" actId="14100"/>
+          <ac:picMkLst>
+            <pc:docMk/>
+            <pc:sldMk cId="910720759" sldId="267"/>
+            <ac:picMk id="3" creationId="{0ADEACCA-C510-5FA8-75B6-C3733402A3FA}"/>
+          </ac:picMkLst>
+        </pc:picChg>
+        <pc:picChg chg="add del mod">
+          <ac:chgData name="Margo Bonal" userId="18c9fa0f-b53d-478b-9dc0-6ad88786c19f" providerId="ADAL" clId="{93D479E5-F67F-4B8A-A78F-A0B574A116B6}" dt="2026-02-08T18:09:39.822" v="1032" actId="478"/>
+          <ac:picMkLst>
+            <pc:docMk/>
+            <pc:sldMk cId="910720759" sldId="267"/>
+            <ac:picMk id="7" creationId="{92F20CD5-7D1F-44A2-CA4D-91A02160DE97}"/>
+          </ac:picMkLst>
+        </pc:picChg>
+      </pc:sldChg>
+      <pc:sldChg chg="addSp delSp modSp new del mod setBg setClrOvrMap">
+        <pc:chgData name="Margo Bonal" userId="18c9fa0f-b53d-478b-9dc0-6ad88786c19f" providerId="ADAL" clId="{93D479E5-F67F-4B8A-A78F-A0B574A116B6}" dt="2026-02-08T17:41:59.116" v="974" actId="2696"/>
+        <pc:sldMkLst>
+          <pc:docMk/>
+          <pc:sldMk cId="3596845019" sldId="268"/>
+        </pc:sldMkLst>
+        <pc:spChg chg="mod">
+          <ac:chgData name="Margo Bonal" userId="18c9fa0f-b53d-478b-9dc0-6ad88786c19f" providerId="ADAL" clId="{93D479E5-F67F-4B8A-A78F-A0B574A116B6}" dt="2026-02-08T17:41:53.369" v="972" actId="20577"/>
+          <ac:spMkLst>
+            <pc:docMk/>
+            <pc:sldMk cId="3596845019" sldId="268"/>
+            <ac:spMk id="2" creationId="{5F4BD8EE-4586-71C1-D6AA-3C86DFF5BCCC}"/>
+          </ac:spMkLst>
+        </pc:spChg>
+        <pc:spChg chg="del">
+          <ac:chgData name="Margo Bonal" userId="18c9fa0f-b53d-478b-9dc0-6ad88786c19f" providerId="ADAL" clId="{93D479E5-F67F-4B8A-A78F-A0B574A116B6}" dt="2026-02-08T17:40:09.145" v="961" actId="478"/>
+          <ac:spMkLst>
+            <pc:docMk/>
+            <pc:sldMk cId="3596845019" sldId="268"/>
+            <ac:spMk id="3" creationId="{14D185BA-A026-DFDD-68FF-8FE69848DADE}"/>
+          </ac:spMkLst>
+        </pc:spChg>
+        <pc:spChg chg="add del">
+          <ac:chgData name="Margo Bonal" userId="18c9fa0f-b53d-478b-9dc0-6ad88786c19f" providerId="ADAL" clId="{93D479E5-F67F-4B8A-A78F-A0B574A116B6}" dt="2026-02-08T17:40:20.414" v="966" actId="26606"/>
+          <ac:spMkLst>
+            <pc:docMk/>
+            <pc:sldMk cId="3596845019" sldId="268"/>
+            <ac:spMk id="4" creationId="{34FF9958-7E0A-627E-DA51-E8C5859A7CB4}"/>
+          </ac:spMkLst>
+        </pc:spChg>
+        <pc:spChg chg="del">
+          <ac:chgData name="Margo Bonal" userId="18c9fa0f-b53d-478b-9dc0-6ad88786c19f" providerId="ADAL" clId="{93D479E5-F67F-4B8A-A78F-A0B574A116B6}" dt="2026-02-08T17:40:04.789" v="959" actId="478"/>
+          <ac:spMkLst>
+            <pc:docMk/>
+            <pc:sldMk cId="3596845019" sldId="268"/>
+            <ac:spMk id="5" creationId="{316C5222-7107-CAC8-BBC1-9AFACD707C45}"/>
+          </ac:spMkLst>
+        </pc:spChg>
+        <pc:spChg chg="del">
+          <ac:chgData name="Margo Bonal" userId="18c9fa0f-b53d-478b-9dc0-6ad88786c19f" providerId="ADAL" clId="{93D479E5-F67F-4B8A-A78F-A0B574A116B6}" dt="2026-02-08T17:40:06.049" v="960" actId="478"/>
+          <ac:spMkLst>
+            <pc:docMk/>
+            <pc:sldMk cId="3596845019" sldId="268"/>
+            <ac:spMk id="6" creationId="{0C98F7B5-4CF7-2DC3-1F1A-9BB9E40BCEE8}"/>
+          </ac:spMkLst>
+        </pc:spChg>
+        <pc:spChg chg="add del">
+          <ac:chgData name="Margo Bonal" userId="18c9fa0f-b53d-478b-9dc0-6ad88786c19f" providerId="ADAL" clId="{93D479E5-F67F-4B8A-A78F-A0B574A116B6}" dt="2026-02-08T17:40:15.927" v="963" actId="26606"/>
+          <ac:spMkLst>
+            <pc:docMk/>
+            <pc:sldMk cId="3596845019" sldId="268"/>
+            <ac:spMk id="10" creationId="{774A975B-A886-5202-0489-6965514A0D14}"/>
+          </ac:spMkLst>
+        </pc:spChg>
+        <pc:spChg chg="add del">
+          <ac:chgData name="Margo Bonal" userId="18c9fa0f-b53d-478b-9dc0-6ad88786c19f" providerId="ADAL" clId="{93D479E5-F67F-4B8A-A78F-A0B574A116B6}" dt="2026-02-08T17:40:15.927" v="963" actId="26606"/>
+          <ac:spMkLst>
+            <pc:docMk/>
+            <pc:sldMk cId="3596845019" sldId="268"/>
+            <ac:spMk id="12" creationId="{EA67E988-5919-57BB-C7DE-D3EAD38A3045}"/>
+          </ac:spMkLst>
+        </pc:spChg>
+        <pc:spChg chg="add del">
+          <ac:chgData name="Margo Bonal" userId="18c9fa0f-b53d-478b-9dc0-6ad88786c19f" providerId="ADAL" clId="{93D479E5-F67F-4B8A-A78F-A0B574A116B6}" dt="2026-02-08T17:40:15.927" v="963" actId="26606"/>
+          <ac:spMkLst>
+            <pc:docMk/>
+            <pc:sldMk cId="3596845019" sldId="268"/>
+            <ac:spMk id="14" creationId="{33E93247-6229-44AB-A550-739E971E690B}"/>
+          </ac:spMkLst>
+        </pc:spChg>
+        <pc:spChg chg="add del">
+          <ac:chgData name="Margo Bonal" userId="18c9fa0f-b53d-478b-9dc0-6ad88786c19f" providerId="ADAL" clId="{93D479E5-F67F-4B8A-A78F-A0B574A116B6}" dt="2026-02-08T17:40:15.927" v="963" actId="26606"/>
+          <ac:spMkLst>
+            <pc:docMk/>
+            <pc:sldMk cId="3596845019" sldId="268"/>
+            <ac:spMk id="16" creationId="{912025B4-7337-735E-4DC9-E634D2011984}"/>
+          </ac:spMkLst>
+        </pc:spChg>
+        <pc:spChg chg="add del">
+          <ac:chgData name="Margo Bonal" userId="18c9fa0f-b53d-478b-9dc0-6ad88786c19f" providerId="ADAL" clId="{93D479E5-F67F-4B8A-A78F-A0B574A116B6}" dt="2026-02-08T17:40:15.927" v="963" actId="26606"/>
+          <ac:spMkLst>
+            <pc:docMk/>
+            <pc:sldMk cId="3596845019" sldId="268"/>
+            <ac:spMk id="18" creationId="{150CDACD-D191-E642-F686-FCB54B7E5F67}"/>
+          </ac:spMkLst>
+        </pc:spChg>
+        <pc:spChg chg="add del">
+          <ac:chgData name="Margo Bonal" userId="18c9fa0f-b53d-478b-9dc0-6ad88786c19f" providerId="ADAL" clId="{93D479E5-F67F-4B8A-A78F-A0B574A116B6}" dt="2026-02-08T17:40:20.371" v="965" actId="26606"/>
+          <ac:spMkLst>
+            <pc:docMk/>
+            <pc:sldMk cId="3596845019" sldId="268"/>
+            <ac:spMk id="20" creationId="{774A975B-A886-5202-0489-6965514A0D14}"/>
+          </ac:spMkLst>
+        </pc:spChg>
+        <pc:spChg chg="add del">
+          <ac:chgData name="Margo Bonal" userId="18c9fa0f-b53d-478b-9dc0-6ad88786c19f" providerId="ADAL" clId="{93D479E5-F67F-4B8A-A78F-A0B574A116B6}" dt="2026-02-08T17:40:20.371" v="965" actId="26606"/>
+          <ac:spMkLst>
+            <pc:docMk/>
+            <pc:sldMk cId="3596845019" sldId="268"/>
+            <ac:spMk id="21" creationId="{EA67E988-5919-57BB-C7DE-D3EAD38A3045}"/>
+          </ac:spMkLst>
+        </pc:spChg>
+        <pc:spChg chg="add del">
+          <ac:chgData name="Margo Bonal" userId="18c9fa0f-b53d-478b-9dc0-6ad88786c19f" providerId="ADAL" clId="{93D479E5-F67F-4B8A-A78F-A0B574A116B6}" dt="2026-02-08T17:40:20.371" v="965" actId="26606"/>
+          <ac:spMkLst>
+            <pc:docMk/>
+            <pc:sldMk cId="3596845019" sldId="268"/>
+            <ac:spMk id="22" creationId="{E20BB609-EF92-42DB-836C-0699A590B5CF}"/>
+          </ac:spMkLst>
+        </pc:spChg>
+        <pc:spChg chg="add del">
+          <ac:chgData name="Margo Bonal" userId="18c9fa0f-b53d-478b-9dc0-6ad88786c19f" providerId="ADAL" clId="{93D479E5-F67F-4B8A-A78F-A0B574A116B6}" dt="2026-02-08T17:40:20.371" v="965" actId="26606"/>
+          <ac:spMkLst>
+            <pc:docMk/>
+            <pc:sldMk cId="3596845019" sldId="268"/>
+            <ac:spMk id="24" creationId="{637992A9-1E8C-4E57-B4F4-EE2D38E504A2}"/>
+          </ac:spMkLst>
+        </pc:spChg>
+        <pc:spChg chg="add del">
+          <ac:chgData name="Margo Bonal" userId="18c9fa0f-b53d-478b-9dc0-6ad88786c19f" providerId="ADAL" clId="{93D479E5-F67F-4B8A-A78F-A0B574A116B6}" dt="2026-02-08T17:40:20.371" v="965" actId="26606"/>
+          <ac:spMkLst>
+            <pc:docMk/>
+            <pc:sldMk cId="3596845019" sldId="268"/>
+            <ac:spMk id="25" creationId="{B2C335F7-F61C-4EB4-80F2-4B1438FE66BB}"/>
+          </ac:spMkLst>
+        </pc:spChg>
+        <pc:spChg chg="add">
+          <ac:chgData name="Margo Bonal" userId="18c9fa0f-b53d-478b-9dc0-6ad88786c19f" providerId="ADAL" clId="{93D479E5-F67F-4B8A-A78F-A0B574A116B6}" dt="2026-02-08T17:40:20.414" v="966" actId="26606"/>
+          <ac:spMkLst>
+            <pc:docMk/>
+            <pc:sldMk cId="3596845019" sldId="268"/>
+            <ac:spMk id="27" creationId="{774A975B-A886-5202-0489-6965514A0D14}"/>
+          </ac:spMkLst>
+        </pc:spChg>
+        <pc:spChg chg="add del">
+          <ac:chgData name="Margo Bonal" userId="18c9fa0f-b53d-478b-9dc0-6ad88786c19f" providerId="ADAL" clId="{93D479E5-F67F-4B8A-A78F-A0B574A116B6}" dt="2026-02-08T17:41:25.233" v="970" actId="26606"/>
+          <ac:spMkLst>
+            <pc:docMk/>
+            <pc:sldMk cId="3596845019" sldId="268"/>
+            <ac:spMk id="28" creationId="{EA67E988-5919-57BB-C7DE-D3EAD38A3045}"/>
+          </ac:spMkLst>
+        </pc:spChg>
+        <pc:spChg chg="add">
+          <ac:chgData name="Margo Bonal" userId="18c9fa0f-b53d-478b-9dc0-6ad88786c19f" providerId="ADAL" clId="{93D479E5-F67F-4B8A-A78F-A0B574A116B6}" dt="2026-02-08T17:40:20.414" v="966" actId="26606"/>
+          <ac:spMkLst>
+            <pc:docMk/>
+            <pc:sldMk cId="3596845019" sldId="268"/>
+            <ac:spMk id="29" creationId="{E20BB609-EF92-42DB-836C-0699A590B5CF}"/>
+          </ac:spMkLst>
+        </pc:spChg>
+        <pc:spChg chg="add del">
+          <ac:chgData name="Margo Bonal" userId="18c9fa0f-b53d-478b-9dc0-6ad88786c19f" providerId="ADAL" clId="{93D479E5-F67F-4B8A-A78F-A0B574A116B6}" dt="2026-02-08T17:41:25.233" v="970" actId="26606"/>
+          <ac:spMkLst>
+            <pc:docMk/>
+            <pc:sldMk cId="3596845019" sldId="268"/>
+            <ac:spMk id="31" creationId="{ECF0998E-D577-43EA-A7B8-E3EC67F75955}"/>
+          </ac:spMkLst>
+        </pc:spChg>
+        <pc:spChg chg="add del">
+          <ac:chgData name="Margo Bonal" userId="18c9fa0f-b53d-478b-9dc0-6ad88786c19f" providerId="ADAL" clId="{93D479E5-F67F-4B8A-A78F-A0B574A116B6}" dt="2026-02-08T17:41:25.233" v="970" actId="26606"/>
+          <ac:spMkLst>
+            <pc:docMk/>
+            <pc:sldMk cId="3596845019" sldId="268"/>
+            <ac:spMk id="32" creationId="{B2C335F7-F61C-4EB4-80F2-4B1438FE66BB}"/>
+          </ac:spMkLst>
+        </pc:spChg>
+        <pc:spChg chg="add del">
+          <ac:chgData name="Margo Bonal" userId="18c9fa0f-b53d-478b-9dc0-6ad88786c19f" providerId="ADAL" clId="{93D479E5-F67F-4B8A-A78F-A0B574A116B6}" dt="2026-02-08T17:41:25.233" v="970" actId="26606"/>
+          <ac:spMkLst>
+            <pc:docMk/>
+            <pc:sldMk cId="3596845019" sldId="268"/>
+            <ac:spMk id="33" creationId="{E7DC364D-882B-4786-89FB-1703C1A5CFF0}"/>
+          </ac:spMkLst>
+        </pc:spChg>
+        <pc:spChg chg="add del">
+          <ac:chgData name="Margo Bonal" userId="18c9fa0f-b53d-478b-9dc0-6ad88786c19f" providerId="ADAL" clId="{93D479E5-F67F-4B8A-A78F-A0B574A116B6}" dt="2026-02-08T17:41:25.233" v="970" actId="26606"/>
+          <ac:spMkLst>
+            <pc:docMk/>
+            <pc:sldMk cId="3596845019" sldId="268"/>
+            <ac:spMk id="34" creationId="{F1189494-2B67-46D2-93D6-A122A09BF6B2}"/>
+          </ac:spMkLst>
+        </pc:spChg>
+        <pc:spChg chg="add">
+          <ac:chgData name="Margo Bonal" userId="18c9fa0f-b53d-478b-9dc0-6ad88786c19f" providerId="ADAL" clId="{93D479E5-F67F-4B8A-A78F-A0B574A116B6}" dt="2026-02-08T17:41:25.233" v="970" actId="26606"/>
+          <ac:spMkLst>
+            <pc:docMk/>
+            <pc:sldMk cId="3596845019" sldId="268"/>
+            <ac:spMk id="41" creationId="{774A975B-A886-5202-0489-6965514A0D14}"/>
+          </ac:spMkLst>
+        </pc:spChg>
+        <pc:spChg chg="add">
+          <ac:chgData name="Margo Bonal" userId="18c9fa0f-b53d-478b-9dc0-6ad88786c19f" providerId="ADAL" clId="{93D479E5-F67F-4B8A-A78F-A0B574A116B6}" dt="2026-02-08T17:41:25.233" v="970" actId="26606"/>
+          <ac:spMkLst>
+            <pc:docMk/>
+            <pc:sldMk cId="3596845019" sldId="268"/>
+            <ac:spMk id="43" creationId="{EA67E988-5919-57BB-C7DE-D3EAD38A3045}"/>
+          </ac:spMkLst>
+        </pc:spChg>
+        <pc:spChg chg="add">
+          <ac:chgData name="Margo Bonal" userId="18c9fa0f-b53d-478b-9dc0-6ad88786c19f" providerId="ADAL" clId="{93D479E5-F67F-4B8A-A78F-A0B574A116B6}" dt="2026-02-08T17:41:25.233" v="970" actId="26606"/>
+          <ac:spMkLst>
+            <pc:docMk/>
+            <pc:sldMk cId="3596845019" sldId="268"/>
+            <ac:spMk id="45" creationId="{FF9FFCE1-E057-415B-A971-88EC7E22AF15}"/>
+          </ac:spMkLst>
+        </pc:spChg>
+        <pc:spChg chg="add">
+          <ac:chgData name="Margo Bonal" userId="18c9fa0f-b53d-478b-9dc0-6ad88786c19f" providerId="ADAL" clId="{93D479E5-F67F-4B8A-A78F-A0B574A116B6}" dt="2026-02-08T17:41:25.233" v="970" actId="26606"/>
+          <ac:spMkLst>
+            <pc:docMk/>
+            <pc:sldMk cId="3596845019" sldId="268"/>
+            <ac:spMk id="49" creationId="{D58401B5-5F1B-4D21-9AC3-AAEC8D366502}"/>
+          </ac:spMkLst>
+        </pc:spChg>
+        <pc:picChg chg="add del">
+          <ac:chgData name="Margo Bonal" userId="18c9fa0f-b53d-478b-9dc0-6ad88786c19f" providerId="ADAL" clId="{93D479E5-F67F-4B8A-A78F-A0B574A116B6}" dt="2026-02-08T17:40:15.927" v="963" actId="26606"/>
+          <ac:picMkLst>
+            <pc:docMk/>
+            <pc:sldMk cId="3596845019" sldId="268"/>
+            <ac:picMk id="7" creationId="{49FB5458-B87E-5C41-1574-96D2B49AC4F0}"/>
+          </ac:picMkLst>
+        </pc:picChg>
+        <pc:picChg chg="add del">
+          <ac:chgData name="Margo Bonal" userId="18c9fa0f-b53d-478b-9dc0-6ad88786c19f" providerId="ADAL" clId="{93D479E5-F67F-4B8A-A78F-A0B574A116B6}" dt="2026-02-08T17:40:20.371" v="965" actId="26606"/>
+          <ac:picMkLst>
+            <pc:docMk/>
+            <pc:sldMk cId="3596845019" sldId="268"/>
+            <ac:picMk id="23" creationId="{BA58089C-7FBC-8901-D93C-259D9A122529}"/>
+          </ac:picMkLst>
+        </pc:picChg>
+        <pc:picChg chg="add del">
+          <ac:chgData name="Margo Bonal" userId="18c9fa0f-b53d-478b-9dc0-6ad88786c19f" providerId="ADAL" clId="{93D479E5-F67F-4B8A-A78F-A0B574A116B6}" dt="2026-02-08T17:40:44.815" v="967" actId="21"/>
+          <ac:picMkLst>
+            <pc:docMk/>
+            <pc:sldMk cId="3596845019" sldId="268"/>
+            <ac:picMk id="30" creationId="{8C02AD5E-133B-67BA-6ECA-A7A708A90960}"/>
+          </ac:picMkLst>
+        </pc:picChg>
+      </pc:sldChg>
+      <pc:sldChg chg="addSp modSp new del mod setBg">
+        <pc:chgData name="Margo Bonal" userId="18c9fa0f-b53d-478b-9dc0-6ad88786c19f" providerId="ADAL" clId="{93D479E5-F67F-4B8A-A78F-A0B574A116B6}" dt="2026-02-08T18:28:26.359" v="1051" actId="2696"/>
+        <pc:sldMkLst>
+          <pc:docMk/>
+          <pc:sldMk cId="389598370" sldId="269"/>
+        </pc:sldMkLst>
+        <pc:spChg chg="mod">
+          <ac:chgData name="Margo Bonal" userId="18c9fa0f-b53d-478b-9dc0-6ad88786c19f" providerId="ADAL" clId="{93D479E5-F67F-4B8A-A78F-A0B574A116B6}" dt="2026-02-08T17:50:13.129" v="1026" actId="14100"/>
+          <ac:spMkLst>
+            <pc:docMk/>
+            <pc:sldMk cId="389598370" sldId="269"/>
+            <ac:spMk id="2" creationId="{DA124214-8318-CD49-EBE7-4EF385FE5052}"/>
+          </ac:spMkLst>
+        </pc:spChg>
+        <pc:spChg chg="add mod">
+          <ac:chgData name="Margo Bonal" userId="18c9fa0f-b53d-478b-9dc0-6ad88786c19f" providerId="ADAL" clId="{93D479E5-F67F-4B8A-A78F-A0B574A116B6}" dt="2026-02-08T17:50:10.050" v="1025" actId="1076"/>
+          <ac:spMkLst>
+            <pc:docMk/>
+            <pc:sldMk cId="389598370" sldId="269"/>
+            <ac:spMk id="3" creationId="{D7A3A9B5-F1D5-612A-E55F-A14BFEEE65F1}"/>
+          </ac:spMkLst>
+        </pc:spChg>
+        <pc:spChg chg="add">
+          <ac:chgData name="Margo Bonal" userId="18c9fa0f-b53d-478b-9dc0-6ad88786c19f" providerId="ADAL" clId="{93D479E5-F67F-4B8A-A78F-A0B574A116B6}" dt="2026-02-08T17:42:18.196" v="975" actId="26606"/>
+          <ac:spMkLst>
+            <pc:docMk/>
+            <pc:sldMk cId="389598370" sldId="269"/>
+            <ac:spMk id="9" creationId="{774A975B-A886-5202-0489-6965514A0D14}"/>
+          </ac:spMkLst>
+        </pc:spChg>
+        <pc:spChg chg="add">
+          <ac:chgData name="Margo Bonal" userId="18c9fa0f-b53d-478b-9dc0-6ad88786c19f" providerId="ADAL" clId="{93D479E5-F67F-4B8A-A78F-A0B574A116B6}" dt="2026-02-08T17:42:18.196" v="975" actId="26606"/>
+          <ac:spMkLst>
+            <pc:docMk/>
+            <pc:sldMk cId="389598370" sldId="269"/>
+            <ac:spMk id="11" creationId="{EA67E988-5919-57BB-C7DE-D3EAD38A3045}"/>
+          </ac:spMkLst>
+        </pc:spChg>
+        <pc:spChg chg="add">
+          <ac:chgData name="Margo Bonal" userId="18c9fa0f-b53d-478b-9dc0-6ad88786c19f" providerId="ADAL" clId="{93D479E5-F67F-4B8A-A78F-A0B574A116B6}" dt="2026-02-08T17:42:18.196" v="975" actId="26606"/>
+          <ac:spMkLst>
+            <pc:docMk/>
+            <pc:sldMk cId="389598370" sldId="269"/>
+            <ac:spMk id="13" creationId="{FAF3766F-DEF3-4802-BB0D-7A18EDD9704F}"/>
+          </ac:spMkLst>
+        </pc:spChg>
+        <pc:spChg chg="add">
+          <ac:chgData name="Margo Bonal" userId="18c9fa0f-b53d-478b-9dc0-6ad88786c19f" providerId="ADAL" clId="{93D479E5-F67F-4B8A-A78F-A0B574A116B6}" dt="2026-02-08T17:42:18.196" v="975" actId="26606"/>
+          <ac:spMkLst>
+            <pc:docMk/>
+            <pc:sldMk cId="389598370" sldId="269"/>
+            <ac:spMk id="15" creationId="{D91952F0-771E-D2ED-C333-EEED6708B80C}"/>
+          </ac:spMkLst>
+        </pc:spChg>
+        <pc:spChg chg="add">
+          <ac:chgData name="Margo Bonal" userId="18c9fa0f-b53d-478b-9dc0-6ad88786c19f" providerId="ADAL" clId="{93D479E5-F67F-4B8A-A78F-A0B574A116B6}" dt="2026-02-08T17:42:18.196" v="975" actId="26606"/>
+          <ac:spMkLst>
+            <pc:docMk/>
+            <pc:sldMk cId="389598370" sldId="269"/>
+            <ac:spMk id="17" creationId="{3FB6D83C-2377-9CAD-A991-9E0B6AF25067}"/>
+          </ac:spMkLst>
+        </pc:spChg>
+        <pc:picChg chg="add mod">
+          <ac:chgData name="Margo Bonal" userId="18c9fa0f-b53d-478b-9dc0-6ad88786c19f" providerId="ADAL" clId="{93D479E5-F67F-4B8A-A78F-A0B574A116B6}" dt="2026-02-08T17:42:38.019" v="977" actId="207"/>
+          <ac:picMkLst>
+            <pc:docMk/>
+            <pc:sldMk cId="389598370" sldId="269"/>
+            <ac:picMk id="6" creationId="{0ED54BB7-05B0-A95C-C373-3FF583B39225}"/>
+          </ac:picMkLst>
+        </pc:picChg>
+      </pc:sldChg>
+      <pc:sldChg chg="addSp delSp modSp new del mod delAnim modAnim">
+        <pc:chgData name="Margo Bonal" userId="18c9fa0f-b53d-478b-9dc0-6ad88786c19f" providerId="ADAL" clId="{93D479E5-F67F-4B8A-A78F-A0B574A116B6}" dt="2026-02-08T18:34:33.937" v="1052" actId="2696"/>
+        <pc:sldMkLst>
+          <pc:docMk/>
+          <pc:sldMk cId="1717263033" sldId="270"/>
+        </pc:sldMkLst>
+        <pc:picChg chg="add del mod">
+          <ac:chgData name="Margo Bonal" userId="18c9fa0f-b53d-478b-9dc0-6ad88786c19f" providerId="ADAL" clId="{93D479E5-F67F-4B8A-A78F-A0B574A116B6}" dt="2026-02-08T18:06:46.777" v="1027" actId="478"/>
+          <ac:picMkLst>
+            <pc:docMk/>
+            <pc:sldMk cId="1717263033" sldId="270"/>
+            <ac:picMk id="2" creationId="{5282D935-2094-DB11-746F-6278E700E001}"/>
+          </ac:picMkLst>
+        </pc:picChg>
+        <pc:picChg chg="add del mod">
+          <ac:chgData name="Margo Bonal" userId="18c9fa0f-b53d-478b-9dc0-6ad88786c19f" providerId="ADAL" clId="{93D479E5-F67F-4B8A-A78F-A0B574A116B6}" dt="2026-02-08T18:23:02.169" v="1044" actId="478"/>
+          <ac:picMkLst>
+            <pc:docMk/>
+            <pc:sldMk cId="1717263033" sldId="270"/>
+            <ac:picMk id="3" creationId="{47498201-8EDF-1722-7D4C-16C5CED0EDBD}"/>
+          </ac:picMkLst>
+        </pc:picChg>
+        <pc:picChg chg="add mod">
+          <ac:chgData name="Margo Bonal" userId="18c9fa0f-b53d-478b-9dc0-6ad88786c19f" providerId="ADAL" clId="{93D479E5-F67F-4B8A-A78F-A0B574A116B6}" dt="2026-02-08T18:27:11.633" v="1050" actId="14100"/>
+          <ac:picMkLst>
+            <pc:docMk/>
+            <pc:sldMk cId="1717263033" sldId="270"/>
+            <ac:picMk id="4" creationId="{9C4877EA-A5B4-DFB9-F9C9-A7226398977A}"/>
+          </ac:picMkLst>
+        </pc:picChg>
       </pc:sldChg>
     </pc:docChg>
   </pc:docChgLst>
@@ -2480,7 +3013,7 @@
         <a:p>
           <a:r>
             <a:rPr lang="en-US" dirty="0"/>
-            <a:t>Begin Team Page Development</a:t>
+            <a:t>Continue Clubs Page Development </a:t>
           </a:r>
         </a:p>
       </dgm:t>
@@ -2516,13 +3049,8 @@
         <a:p>
           <a:r>
             <a:rPr lang="en-US" dirty="0"/>
-            <a:t>Implement </a:t>
+            <a:t>Continue Leaderboard Page Development </a:t>
           </a:r>
-          <a:r>
-            <a:rPr lang="en-US"/>
-            <a:t>password requirements</a:t>
-          </a:r>
-          <a:endParaRPr lang="en-US" dirty="0"/>
         </a:p>
       </dgm:t>
     </dgm:pt>
@@ -2548,6 +3076,78 @@
         </a:p>
       </dgm:t>
     </dgm:pt>
+    <dgm:pt modelId="{13EAF17F-E179-489C-8C7B-820079082AE2}">
+      <dgm:prSet/>
+      <dgm:spPr/>
+      <dgm:t>
+        <a:bodyPr/>
+        <a:lstStyle/>
+        <a:p>
+          <a:r>
+            <a:rPr lang="en-US" dirty="0"/>
+            <a:t>Begin Challenges Page Development</a:t>
+          </a:r>
+        </a:p>
+      </dgm:t>
+    </dgm:pt>
+    <dgm:pt modelId="{B050925C-E8AC-4D1D-860E-344C9EB5F256}" type="parTrans" cxnId="{B53DCEE8-CAED-4225-9FF2-A809EE91ED5F}">
+      <dgm:prSet/>
+      <dgm:spPr/>
+      <dgm:t>
+        <a:bodyPr/>
+        <a:lstStyle/>
+        <a:p>
+          <a:endParaRPr lang="en-US"/>
+        </a:p>
+      </dgm:t>
+    </dgm:pt>
+    <dgm:pt modelId="{4183C5E8-3F30-4046-82CD-C224611F81B6}" type="sibTrans" cxnId="{B53DCEE8-CAED-4225-9FF2-A809EE91ED5F}">
+      <dgm:prSet/>
+      <dgm:spPr/>
+      <dgm:t>
+        <a:bodyPr/>
+        <a:lstStyle/>
+        <a:p>
+          <a:endParaRPr lang="en-US"/>
+        </a:p>
+      </dgm:t>
+    </dgm:pt>
+    <dgm:pt modelId="{5274ACC2-5CD8-421B-B400-65F9017F93A3}">
+      <dgm:prSet/>
+      <dgm:spPr/>
+      <dgm:t>
+        <a:bodyPr/>
+        <a:lstStyle/>
+        <a:p>
+          <a:r>
+            <a:rPr lang="en-US" dirty="0"/>
+            <a:t>View Friends Accounts</a:t>
+          </a:r>
+        </a:p>
+      </dgm:t>
+    </dgm:pt>
+    <dgm:pt modelId="{35FD7264-5B0C-4BA4-B912-CD59D4303F58}" type="parTrans" cxnId="{3E97607E-8CD9-4BBF-B41C-1200A4631164}">
+      <dgm:prSet/>
+      <dgm:spPr/>
+      <dgm:t>
+        <a:bodyPr/>
+        <a:lstStyle/>
+        <a:p>
+          <a:endParaRPr lang="en-US"/>
+        </a:p>
+      </dgm:t>
+    </dgm:pt>
+    <dgm:pt modelId="{C83F91CA-13DB-4089-858E-E3D4B37DB32B}" type="sibTrans" cxnId="{3E97607E-8CD9-4BBF-B41C-1200A4631164}">
+      <dgm:prSet/>
+      <dgm:spPr/>
+      <dgm:t>
+        <a:bodyPr/>
+        <a:lstStyle/>
+        <a:p>
+          <a:endParaRPr lang="en-US"/>
+        </a:p>
+      </dgm:t>
+    </dgm:pt>
     <dgm:pt modelId="{276604CE-7742-461E-A1FB-5048586C5350}" type="pres">
       <dgm:prSet presAssocID="{7C883F58-09E0-4E70-98D4-32C537E6F358}" presName="vert0" presStyleCnt="0">
         <dgm:presLayoutVars>
@@ -2559,7 +3159,7 @@
       <dgm:spPr/>
     </dgm:pt>
     <dgm:pt modelId="{0F199995-7505-4B9F-9DBC-C39FD8496ABF}" type="pres">
-      <dgm:prSet presAssocID="{C65EF1A1-4987-4440-88B2-2E7916CF0BC5}" presName="thickLine" presStyleLbl="alignNode1" presStyleIdx="0" presStyleCnt="2"/>
+      <dgm:prSet presAssocID="{C65EF1A1-4987-4440-88B2-2E7916CF0BC5}" presName="thickLine" presStyleLbl="alignNode1" presStyleIdx="0" presStyleCnt="4"/>
       <dgm:spPr/>
     </dgm:pt>
     <dgm:pt modelId="{5DE2624A-6D7F-4DAA-96DF-B718DA4E7783}" type="pres">
@@ -2567,7 +3167,7 @@
       <dgm:spPr/>
     </dgm:pt>
     <dgm:pt modelId="{E7487A2F-0727-4597-8435-723BD19D3B22}" type="pres">
-      <dgm:prSet presAssocID="{C65EF1A1-4987-4440-88B2-2E7916CF0BC5}" presName="tx1" presStyleLbl="revTx" presStyleIdx="0" presStyleCnt="2"/>
+      <dgm:prSet presAssocID="{C65EF1A1-4987-4440-88B2-2E7916CF0BC5}" presName="tx1" presStyleLbl="revTx" presStyleIdx="0" presStyleCnt="4"/>
       <dgm:spPr/>
     </dgm:pt>
     <dgm:pt modelId="{4DC4D27E-86DA-4630-9F1E-424B508FE567}" type="pres">
@@ -2575,7 +3175,7 @@
       <dgm:spPr/>
     </dgm:pt>
     <dgm:pt modelId="{42DE9A3D-D36B-48B0-A9CC-5C9B4FB79C2A}" type="pres">
-      <dgm:prSet presAssocID="{9DC6CDF4-2BCB-4D5A-A2F7-9F8ECB80A928}" presName="thickLine" presStyleLbl="alignNode1" presStyleIdx="1" presStyleCnt="2"/>
+      <dgm:prSet presAssocID="{9DC6CDF4-2BCB-4D5A-A2F7-9F8ECB80A928}" presName="thickLine" presStyleLbl="alignNode1" presStyleIdx="1" presStyleCnt="4"/>
       <dgm:spPr/>
     </dgm:pt>
     <dgm:pt modelId="{D09D6C41-8919-4657-A155-C826C3ACFB78}" type="pres">
@@ -2583,19 +3183,55 @@
       <dgm:spPr/>
     </dgm:pt>
     <dgm:pt modelId="{A7348878-5FE5-4EEF-AE6E-6E7EA3A90261}" type="pres">
-      <dgm:prSet presAssocID="{9DC6CDF4-2BCB-4D5A-A2F7-9F8ECB80A928}" presName="tx1" presStyleLbl="revTx" presStyleIdx="1" presStyleCnt="2"/>
+      <dgm:prSet presAssocID="{9DC6CDF4-2BCB-4D5A-A2F7-9F8ECB80A928}" presName="tx1" presStyleLbl="revTx" presStyleIdx="1" presStyleCnt="4"/>
       <dgm:spPr/>
     </dgm:pt>
     <dgm:pt modelId="{44310A2F-0535-4896-BE26-02EE5186D6AC}" type="pres">
       <dgm:prSet presAssocID="{9DC6CDF4-2BCB-4D5A-A2F7-9F8ECB80A928}" presName="vert1" presStyleCnt="0"/>
       <dgm:spPr/>
     </dgm:pt>
+    <dgm:pt modelId="{6C8467B9-4C0B-4CE7-8A42-FC64A9E10138}" type="pres">
+      <dgm:prSet presAssocID="{13EAF17F-E179-489C-8C7B-820079082AE2}" presName="thickLine" presStyleLbl="alignNode1" presStyleIdx="2" presStyleCnt="4"/>
+      <dgm:spPr/>
+    </dgm:pt>
+    <dgm:pt modelId="{7E7AD706-D3F3-40B8-B57E-7965755C82C0}" type="pres">
+      <dgm:prSet presAssocID="{13EAF17F-E179-489C-8C7B-820079082AE2}" presName="horz1" presStyleCnt="0"/>
+      <dgm:spPr/>
+    </dgm:pt>
+    <dgm:pt modelId="{383CC481-DF00-41CD-A46D-FD01FC896133}" type="pres">
+      <dgm:prSet presAssocID="{13EAF17F-E179-489C-8C7B-820079082AE2}" presName="tx1" presStyleLbl="revTx" presStyleIdx="2" presStyleCnt="4"/>
+      <dgm:spPr/>
+    </dgm:pt>
+    <dgm:pt modelId="{DD9B1B45-7874-495E-8D38-2000547C63A4}" type="pres">
+      <dgm:prSet presAssocID="{13EAF17F-E179-489C-8C7B-820079082AE2}" presName="vert1" presStyleCnt="0"/>
+      <dgm:spPr/>
+    </dgm:pt>
+    <dgm:pt modelId="{56D65ACD-28A1-4234-A529-AA94488022DF}" type="pres">
+      <dgm:prSet presAssocID="{5274ACC2-5CD8-421B-B400-65F9017F93A3}" presName="thickLine" presStyleLbl="alignNode1" presStyleIdx="3" presStyleCnt="4"/>
+      <dgm:spPr/>
+    </dgm:pt>
+    <dgm:pt modelId="{2268E112-CDC6-4811-9EE6-8E2FD7779A73}" type="pres">
+      <dgm:prSet presAssocID="{5274ACC2-5CD8-421B-B400-65F9017F93A3}" presName="horz1" presStyleCnt="0"/>
+      <dgm:spPr/>
+    </dgm:pt>
+    <dgm:pt modelId="{AA4D3A39-EA1B-4A21-A9EE-A703B2DD1679}" type="pres">
+      <dgm:prSet presAssocID="{5274ACC2-5CD8-421B-B400-65F9017F93A3}" presName="tx1" presStyleLbl="revTx" presStyleIdx="3" presStyleCnt="4"/>
+      <dgm:spPr/>
+    </dgm:pt>
+    <dgm:pt modelId="{2EF5FD05-62CA-432E-8813-071EDAFA500B}" type="pres">
+      <dgm:prSet presAssocID="{5274ACC2-5CD8-421B-B400-65F9017F93A3}" presName="vert1" presStyleCnt="0"/>
+      <dgm:spPr/>
+    </dgm:pt>
   </dgm:ptLst>
   <dgm:cxnLst>
+    <dgm:cxn modelId="{F030A33A-2D57-474A-9006-FA847136A542}" type="presOf" srcId="{13EAF17F-E179-489C-8C7B-820079082AE2}" destId="{383CC481-DF00-41CD-A46D-FD01FC896133}" srcOrd="0" destOrd="0" presId="urn:microsoft.com/office/officeart/2008/layout/LinedList"/>
     <dgm:cxn modelId="{791CF645-63C7-4EDC-8A49-3104EA8923E4}" type="presOf" srcId="{C65EF1A1-4987-4440-88B2-2E7916CF0BC5}" destId="{E7487A2F-0727-4597-8435-723BD19D3B22}" srcOrd="0" destOrd="0" presId="urn:microsoft.com/office/officeart/2008/layout/LinedList"/>
+    <dgm:cxn modelId="{3E97607E-8CD9-4BBF-B41C-1200A4631164}" srcId="{7C883F58-09E0-4E70-98D4-32C537E6F358}" destId="{5274ACC2-5CD8-421B-B400-65F9017F93A3}" srcOrd="3" destOrd="0" parTransId="{35FD7264-5B0C-4BA4-B912-CD59D4303F58}" sibTransId="{C83F91CA-13DB-4089-858E-E3D4B37DB32B}"/>
     <dgm:cxn modelId="{35FCEE86-B5FE-47DA-87C2-D0F72527B7F6}" srcId="{7C883F58-09E0-4E70-98D4-32C537E6F358}" destId="{C65EF1A1-4987-4440-88B2-2E7916CF0BC5}" srcOrd="0" destOrd="0" parTransId="{DD7D6ECE-FF12-4EA8-A8E4-5F2EAA2892FB}" sibTransId="{FCF3654C-E3BD-47D0-A0CA-9FC07C5BE1B5}"/>
     <dgm:cxn modelId="{5301BA8C-06F8-48F6-8C0F-730BC0AA449A}" type="presOf" srcId="{7C883F58-09E0-4E70-98D4-32C537E6F358}" destId="{276604CE-7742-461E-A1FB-5048586C5350}" srcOrd="0" destOrd="0" presId="urn:microsoft.com/office/officeart/2008/layout/LinedList"/>
     <dgm:cxn modelId="{078A1CDD-EFC7-4264-AE23-9CD8AA11F804}" srcId="{7C883F58-09E0-4E70-98D4-32C537E6F358}" destId="{9DC6CDF4-2BCB-4D5A-A2F7-9F8ECB80A928}" srcOrd="1" destOrd="0" parTransId="{7C9BC6AB-481B-4ADC-BE3C-005DE147CD6E}" sibTransId="{4D855D76-FE7B-46C2-B885-4E579779B739}"/>
+    <dgm:cxn modelId="{51F458E0-54CD-4C7B-9EB5-597DA78D1BF6}" type="presOf" srcId="{5274ACC2-5CD8-421B-B400-65F9017F93A3}" destId="{AA4D3A39-EA1B-4A21-A9EE-A703B2DD1679}" srcOrd="0" destOrd="0" presId="urn:microsoft.com/office/officeart/2008/layout/LinedList"/>
+    <dgm:cxn modelId="{B53DCEE8-CAED-4225-9FF2-A809EE91ED5F}" srcId="{7C883F58-09E0-4E70-98D4-32C537E6F358}" destId="{13EAF17F-E179-489C-8C7B-820079082AE2}" srcOrd="2" destOrd="0" parTransId="{B050925C-E8AC-4D1D-860E-344C9EB5F256}" sibTransId="{4183C5E8-3F30-4046-82CD-C224611F81B6}"/>
     <dgm:cxn modelId="{EAFDCAF9-29AC-48D4-A298-CC2F75849CE0}" type="presOf" srcId="{9DC6CDF4-2BCB-4D5A-A2F7-9F8ECB80A928}" destId="{A7348878-5FE5-4EEF-AE6E-6E7EA3A90261}" srcOrd="0" destOrd="0" presId="urn:microsoft.com/office/officeart/2008/layout/LinedList"/>
     <dgm:cxn modelId="{25B94CAD-06A9-4658-960A-A4895F617863}" type="presParOf" srcId="{276604CE-7742-461E-A1FB-5048586C5350}" destId="{0F199995-7505-4B9F-9DBC-C39FD8496ABF}" srcOrd="0" destOrd="0" presId="urn:microsoft.com/office/officeart/2008/layout/LinedList"/>
     <dgm:cxn modelId="{6432556C-3E58-42B8-ACBD-C63FC7681150}" type="presParOf" srcId="{276604CE-7742-461E-A1FB-5048586C5350}" destId="{5DE2624A-6D7F-4DAA-96DF-B718DA4E7783}" srcOrd="1" destOrd="0" presId="urn:microsoft.com/office/officeart/2008/layout/LinedList"/>
@@ -2605,6 +3241,14 @@
     <dgm:cxn modelId="{599C4CA5-3C60-4EB7-9C5C-9406BD5FD5C5}" type="presParOf" srcId="{276604CE-7742-461E-A1FB-5048586C5350}" destId="{D09D6C41-8919-4657-A155-C826C3ACFB78}" srcOrd="3" destOrd="0" presId="urn:microsoft.com/office/officeart/2008/layout/LinedList"/>
     <dgm:cxn modelId="{3066C009-1AEC-4838-A837-B79E73E88EBE}" type="presParOf" srcId="{D09D6C41-8919-4657-A155-C826C3ACFB78}" destId="{A7348878-5FE5-4EEF-AE6E-6E7EA3A90261}" srcOrd="0" destOrd="0" presId="urn:microsoft.com/office/officeart/2008/layout/LinedList"/>
     <dgm:cxn modelId="{822D3625-81AB-4EF6-A864-89D886D52500}" type="presParOf" srcId="{D09D6C41-8919-4657-A155-C826C3ACFB78}" destId="{44310A2F-0535-4896-BE26-02EE5186D6AC}" srcOrd="1" destOrd="0" presId="urn:microsoft.com/office/officeart/2008/layout/LinedList"/>
+    <dgm:cxn modelId="{E6F44004-A0F1-45EC-86B9-67331DB04434}" type="presParOf" srcId="{276604CE-7742-461E-A1FB-5048586C5350}" destId="{6C8467B9-4C0B-4CE7-8A42-FC64A9E10138}" srcOrd="4" destOrd="0" presId="urn:microsoft.com/office/officeart/2008/layout/LinedList"/>
+    <dgm:cxn modelId="{748205F5-2397-4142-B613-2E3243F6684A}" type="presParOf" srcId="{276604CE-7742-461E-A1FB-5048586C5350}" destId="{7E7AD706-D3F3-40B8-B57E-7965755C82C0}" srcOrd="5" destOrd="0" presId="urn:microsoft.com/office/officeart/2008/layout/LinedList"/>
+    <dgm:cxn modelId="{8D0F816B-B145-4C7B-885E-7C2468E931E1}" type="presParOf" srcId="{7E7AD706-D3F3-40B8-B57E-7965755C82C0}" destId="{383CC481-DF00-41CD-A46D-FD01FC896133}" srcOrd="0" destOrd="0" presId="urn:microsoft.com/office/officeart/2008/layout/LinedList"/>
+    <dgm:cxn modelId="{497E415F-03CD-4D84-8F29-10A3D8A6EB29}" type="presParOf" srcId="{7E7AD706-D3F3-40B8-B57E-7965755C82C0}" destId="{DD9B1B45-7874-495E-8D38-2000547C63A4}" srcOrd="1" destOrd="0" presId="urn:microsoft.com/office/officeart/2008/layout/LinedList"/>
+    <dgm:cxn modelId="{B6F7C035-0F9E-4A94-AB94-A19ED2DB9C66}" type="presParOf" srcId="{276604CE-7742-461E-A1FB-5048586C5350}" destId="{56D65ACD-28A1-4234-A529-AA94488022DF}" srcOrd="6" destOrd="0" presId="urn:microsoft.com/office/officeart/2008/layout/LinedList"/>
+    <dgm:cxn modelId="{EB444053-D12C-42F5-933B-F81F2195D2DF}" type="presParOf" srcId="{276604CE-7742-461E-A1FB-5048586C5350}" destId="{2268E112-CDC6-4811-9EE6-8E2FD7779A73}" srcOrd="7" destOrd="0" presId="urn:microsoft.com/office/officeart/2008/layout/LinedList"/>
+    <dgm:cxn modelId="{5D1A5A06-B591-4771-9959-FD9BFA34A46F}" type="presParOf" srcId="{2268E112-CDC6-4811-9EE6-8E2FD7779A73}" destId="{AA4D3A39-EA1B-4A21-A9EE-A703B2DD1679}" srcOrd="0" destOrd="0" presId="urn:microsoft.com/office/officeart/2008/layout/LinedList"/>
+    <dgm:cxn modelId="{B8A2E9FB-8BDF-4D4F-B4D9-88F96AAE777D}" type="presParOf" srcId="{2268E112-CDC6-4811-9EE6-8E2FD7779A73}" destId="{2EF5FD05-62CA-432E-8813-071EDAFA500B}" srcOrd="1" destOrd="0" presId="urn:microsoft.com/office/officeart/2008/layout/LinedList"/>
   </dgm:cxnLst>
   <dgm:bg/>
   <dgm:whole/>
@@ -2929,7 +3573,7 @@
       <dsp:spPr>
         <a:xfrm>
           <a:off x="0" y="0"/>
-          <a:ext cx="6620255" cy="2482596"/>
+          <a:ext cx="6620255" cy="1241298"/>
         </a:xfrm>
         <a:prstGeom prst="rect">
           <a:avLst/>
@@ -2953,12 +3597,12 @@
         <a:fontRef idx="minor"/>
       </dsp:style>
       <dsp:txBody>
-        <a:bodyPr spcFirstLastPara="0" vert="horz" wrap="square" lIns="201930" tIns="201930" rIns="201930" bIns="201930" numCol="1" spcCol="1270" anchor="t" anchorCtr="0">
+        <a:bodyPr spcFirstLastPara="0" vert="horz" wrap="square" lIns="133350" tIns="133350" rIns="133350" bIns="133350" numCol="1" spcCol="1270" anchor="t" anchorCtr="0">
           <a:noAutofit/>
         </a:bodyPr>
         <a:lstStyle/>
         <a:p>
-          <a:pPr marL="0" lvl="0" indent="0" algn="l" defTabSz="2355850">
+          <a:pPr marL="0" lvl="0" indent="0" algn="l" defTabSz="1555750">
             <a:lnSpc>
               <a:spcPct val="90000"/>
             </a:lnSpc>
@@ -2971,17 +3615,128 @@
             <a:buNone/>
           </a:pPr>
           <a:r>
-            <a:rPr lang="en-US" sz="5300" kern="1200" dirty="0"/>
-            <a:t>Begin Team Page Development</a:t>
+            <a:rPr lang="en-US" sz="3500" kern="1200" dirty="0"/>
+            <a:t>Continue Clubs Page Development </a:t>
           </a:r>
         </a:p>
       </dsp:txBody>
       <dsp:txXfrm>
         <a:off x="0" y="0"/>
-        <a:ext cx="6620255" cy="2482596"/>
+        <a:ext cx="6620255" cy="1241298"/>
       </dsp:txXfrm>
     </dsp:sp>
     <dsp:sp modelId="{42DE9A3D-D36B-48B0-A9CC-5C9B4FB79C2A}">
+      <dsp:nvSpPr>
+        <dsp:cNvPr id="0" name=""/>
+        <dsp:cNvSpPr/>
+      </dsp:nvSpPr>
+      <dsp:spPr>
+        <a:xfrm>
+          <a:off x="0" y="1241298"/>
+          <a:ext cx="6620255" cy="0"/>
+        </a:xfrm>
+        <a:prstGeom prst="line">
+          <a:avLst/>
+        </a:prstGeom>
+        <a:solidFill>
+          <a:schemeClr val="lt1">
+            <a:hueOff val="0"/>
+            <a:satOff val="0"/>
+            <a:lumOff val="0"/>
+            <a:alphaOff val="0"/>
+          </a:schemeClr>
+        </a:solidFill>
+        <a:ln w="19050" cap="flat" cmpd="sng" algn="ctr">
+          <a:solidFill>
+            <a:schemeClr val="dk1">
+              <a:shade val="80000"/>
+              <a:hueOff val="0"/>
+              <a:satOff val="0"/>
+              <a:lumOff val="0"/>
+              <a:alphaOff val="0"/>
+            </a:schemeClr>
+          </a:solidFill>
+          <a:prstDash val="solid"/>
+          <a:miter lim="800000"/>
+        </a:ln>
+        <a:effectLst/>
+      </dsp:spPr>
+      <dsp:style>
+        <a:lnRef idx="2">
+          <a:scrgbClr r="0" g="0" b="0"/>
+        </a:lnRef>
+        <a:fillRef idx="1">
+          <a:scrgbClr r="0" g="0" b="0"/>
+        </a:fillRef>
+        <a:effectRef idx="0">
+          <a:scrgbClr r="0" g="0" b="0"/>
+        </a:effectRef>
+        <a:fontRef idx="minor">
+          <a:schemeClr val="lt1"/>
+        </a:fontRef>
+      </dsp:style>
+    </dsp:sp>
+    <dsp:sp modelId="{A7348878-5FE5-4EEF-AE6E-6E7EA3A90261}">
+      <dsp:nvSpPr>
+        <dsp:cNvPr id="0" name=""/>
+        <dsp:cNvSpPr/>
+      </dsp:nvSpPr>
+      <dsp:spPr>
+        <a:xfrm>
+          <a:off x="0" y="1241298"/>
+          <a:ext cx="6620255" cy="1241298"/>
+        </a:xfrm>
+        <a:prstGeom prst="rect">
+          <a:avLst/>
+        </a:prstGeom>
+        <a:noFill/>
+        <a:ln>
+          <a:noFill/>
+        </a:ln>
+        <a:effectLst/>
+      </dsp:spPr>
+      <dsp:style>
+        <a:lnRef idx="0">
+          <a:scrgbClr r="0" g="0" b="0"/>
+        </a:lnRef>
+        <a:fillRef idx="0">
+          <a:scrgbClr r="0" g="0" b="0"/>
+        </a:fillRef>
+        <a:effectRef idx="0">
+          <a:scrgbClr r="0" g="0" b="0"/>
+        </a:effectRef>
+        <a:fontRef idx="minor"/>
+      </dsp:style>
+      <dsp:txBody>
+        <a:bodyPr spcFirstLastPara="0" vert="horz" wrap="square" lIns="133350" tIns="133350" rIns="133350" bIns="133350" numCol="1" spcCol="1270" anchor="t" anchorCtr="0">
+          <a:noAutofit/>
+        </a:bodyPr>
+        <a:lstStyle/>
+        <a:p>
+          <a:pPr marL="0" lvl="0" indent="0" algn="l" defTabSz="1555750">
+            <a:lnSpc>
+              <a:spcPct val="90000"/>
+            </a:lnSpc>
+            <a:spcBef>
+              <a:spcPct val="0"/>
+            </a:spcBef>
+            <a:spcAft>
+              <a:spcPct val="35000"/>
+            </a:spcAft>
+            <a:buNone/>
+          </a:pPr>
+          <a:r>
+            <a:rPr lang="en-US" sz="3500" kern="1200" dirty="0"/>
+            <a:t>Continue Leaderboard Page Development </a:t>
+          </a:r>
+        </a:p>
+      </dsp:txBody>
+      <dsp:txXfrm>
+        <a:off x="0" y="1241298"/>
+        <a:ext cx="6620255" cy="1241298"/>
+      </dsp:txXfrm>
+    </dsp:sp>
+    <dsp:sp modelId="{6C8467B9-4C0B-4CE7-8A42-FC64A9E10138}">
       <dsp:nvSpPr>
         <dsp:cNvPr id="0" name=""/>
         <dsp:cNvSpPr/>
@@ -3032,7 +3787,7 @@
         </a:fontRef>
       </dsp:style>
     </dsp:sp>
-    <dsp:sp modelId="{A7348878-5FE5-4EEF-AE6E-6E7EA3A90261}">
+    <dsp:sp modelId="{383CC481-DF00-41CD-A46D-FD01FC896133}">
       <dsp:nvSpPr>
         <dsp:cNvPr id="0" name=""/>
         <dsp:cNvSpPr/>
@@ -3040,7 +3795,7 @@
       <dsp:spPr>
         <a:xfrm>
           <a:off x="0" y="2482596"/>
-          <a:ext cx="6620255" cy="2482596"/>
+          <a:ext cx="6620255" cy="1241298"/>
         </a:xfrm>
         <a:prstGeom prst="rect">
           <a:avLst/>
@@ -3064,12 +3819,12 @@
         <a:fontRef idx="minor"/>
       </dsp:style>
       <dsp:txBody>
-        <a:bodyPr spcFirstLastPara="0" vert="horz" wrap="square" lIns="201930" tIns="201930" rIns="201930" bIns="201930" numCol="1" spcCol="1270" anchor="t" anchorCtr="0">
+        <a:bodyPr spcFirstLastPara="0" vert="horz" wrap="square" lIns="133350" tIns="133350" rIns="133350" bIns="133350" numCol="1" spcCol="1270" anchor="t" anchorCtr="0">
           <a:noAutofit/>
         </a:bodyPr>
         <a:lstStyle/>
         <a:p>
-          <a:pPr marL="0" lvl="0" indent="0" algn="l" defTabSz="2355850">
+          <a:pPr marL="0" lvl="0" indent="0" algn="l" defTabSz="1555750">
             <a:lnSpc>
               <a:spcPct val="90000"/>
             </a:lnSpc>
@@ -3082,19 +3837,125 @@
             <a:buNone/>
           </a:pPr>
           <a:r>
-            <a:rPr lang="en-US" sz="5300" kern="1200" dirty="0"/>
-            <a:t>Implement </a:t>
+            <a:rPr lang="en-US" sz="3500" kern="1200" dirty="0"/>
+            <a:t>Begin Challenges Page Development</a:t>
           </a:r>
-          <a:r>
-            <a:rPr lang="en-US" sz="5300" kern="1200"/>
-            <a:t>password requirements</a:t>
-          </a:r>
-          <a:endParaRPr lang="en-US" sz="5300" kern="1200" dirty="0"/>
         </a:p>
       </dsp:txBody>
       <dsp:txXfrm>
         <a:off x="0" y="2482596"/>
-        <a:ext cx="6620255" cy="2482596"/>
+        <a:ext cx="6620255" cy="1241298"/>
+      </dsp:txXfrm>
+    </dsp:sp>
+    <dsp:sp modelId="{56D65ACD-28A1-4234-A529-AA94488022DF}">
+      <dsp:nvSpPr>
+        <dsp:cNvPr id="0" name=""/>
+        <dsp:cNvSpPr/>
+      </dsp:nvSpPr>
+      <dsp:spPr>
+        <a:xfrm>
+          <a:off x="0" y="3723894"/>
+          <a:ext cx="6620255" cy="0"/>
+        </a:xfrm>
+        <a:prstGeom prst="line">
+          <a:avLst/>
+        </a:prstGeom>
+        <a:solidFill>
+          <a:schemeClr val="lt1">
+            <a:hueOff val="0"/>
+            <a:satOff val="0"/>
+            <a:lumOff val="0"/>
+            <a:alphaOff val="0"/>
+          </a:schemeClr>
+        </a:solidFill>
+        <a:ln w="19050" cap="flat" cmpd="sng" algn="ctr">
+          <a:solidFill>
+            <a:schemeClr val="dk1">
+              <a:shade val="80000"/>
+              <a:hueOff val="0"/>
+              <a:satOff val="0"/>
+              <a:lumOff val="0"/>
+              <a:alphaOff val="0"/>
+            </a:schemeClr>
+          </a:solidFill>
+          <a:prstDash val="solid"/>
+          <a:miter lim="800000"/>
+        </a:ln>
+        <a:effectLst/>
+      </dsp:spPr>
+      <dsp:style>
+        <a:lnRef idx="2">
+          <a:scrgbClr r="0" g="0" b="0"/>
+        </a:lnRef>
+        <a:fillRef idx="1">
+          <a:scrgbClr r="0" g="0" b="0"/>
+        </a:fillRef>
+        <a:effectRef idx="0">
+          <a:scrgbClr r="0" g="0" b="0"/>
+        </a:effectRef>
+        <a:fontRef idx="minor">
+          <a:schemeClr val="lt1"/>
+        </a:fontRef>
+      </dsp:style>
+    </dsp:sp>
+    <dsp:sp modelId="{AA4D3A39-EA1B-4A21-A9EE-A703B2DD1679}">
+      <dsp:nvSpPr>
+        <dsp:cNvPr id="0" name=""/>
+        <dsp:cNvSpPr/>
+      </dsp:nvSpPr>
+      <dsp:spPr>
+        <a:xfrm>
+          <a:off x="0" y="3723894"/>
+          <a:ext cx="6620255" cy="1241298"/>
+        </a:xfrm>
+        <a:prstGeom prst="rect">
+          <a:avLst/>
+        </a:prstGeom>
+        <a:noFill/>
+        <a:ln>
+          <a:noFill/>
+        </a:ln>
+        <a:effectLst/>
+      </dsp:spPr>
+      <dsp:style>
+        <a:lnRef idx="0">
+          <a:scrgbClr r="0" g="0" b="0"/>
+        </a:lnRef>
+        <a:fillRef idx="0">
+          <a:scrgbClr r="0" g="0" b="0"/>
+        </a:fillRef>
+        <a:effectRef idx="0">
+          <a:scrgbClr r="0" g="0" b="0"/>
+        </a:effectRef>
+        <a:fontRef idx="minor"/>
+      </dsp:style>
+      <dsp:txBody>
+        <a:bodyPr spcFirstLastPara="0" vert="horz" wrap="square" lIns="133350" tIns="133350" rIns="133350" bIns="133350" numCol="1" spcCol="1270" anchor="t" anchorCtr="0">
+          <a:noAutofit/>
+        </a:bodyPr>
+        <a:lstStyle/>
+        <a:p>
+          <a:pPr marL="0" lvl="0" indent="0" algn="l" defTabSz="1555750">
+            <a:lnSpc>
+              <a:spcPct val="90000"/>
+            </a:lnSpc>
+            <a:spcBef>
+              <a:spcPct val="0"/>
+            </a:spcBef>
+            <a:spcAft>
+              <a:spcPct val="35000"/>
+            </a:spcAft>
+            <a:buNone/>
+          </a:pPr>
+          <a:r>
+            <a:rPr lang="en-US" sz="3500" kern="1200" dirty="0"/>
+            <a:t>View Friends Accounts</a:t>
+          </a:r>
+        </a:p>
+      </dsp:txBody>
+      <dsp:txXfrm>
+        <a:off x="0" y="3723894"/>
+        <a:ext cx="6620255" cy="1241298"/>
       </dsp:txXfrm>
     </dsp:sp>
   </dsp:spTree>
@@ -6108,7 +6969,7 @@
           <a:p>
             <a:fld id="{E80C50CD-E178-4744-9B35-B2F624D6C5E9}" type="datetimeFigureOut">
               <a:rPr lang="en-US" smtClean="0"/>
-              <a:t>2/13/2026</a:t>
+              <a:t>2/9/2026</a:t>
             </a:fld>
             <a:endParaRPr lang="en-US"/>
           </a:p>
@@ -6306,7 +7167,7 @@
           <a:p>
             <a:fld id="{E80C50CD-E178-4744-9B35-B2F624D6C5E9}" type="datetimeFigureOut">
               <a:rPr lang="en-US" smtClean="0"/>
-              <a:t>2/13/2026</a:t>
+              <a:t>2/9/2026</a:t>
             </a:fld>
             <a:endParaRPr lang="en-US"/>
           </a:p>
@@ -6514,7 +7375,7 @@
           <a:p>
             <a:fld id="{E80C50CD-E178-4744-9B35-B2F624D6C5E9}" type="datetimeFigureOut">
               <a:rPr lang="en-US" smtClean="0"/>
-              <a:t>2/13/2026</a:t>
+              <a:t>2/9/2026</a:t>
             </a:fld>
             <a:endParaRPr lang="en-US"/>
           </a:p>
@@ -6764,7 +7625,7 @@
           <a:p>
             <a:fld id="{E80C50CD-E178-4744-9B35-B2F624D6C5E9}" type="datetimeFigureOut">
               <a:rPr lang="en-US" smtClean="0"/>
-              <a:t>2/13/2026</a:t>
+              <a:t>2/9/2026</a:t>
             </a:fld>
             <a:endParaRPr lang="en-US"/>
           </a:p>
@@ -7043,7 +7904,7 @@
           <a:p>
             <a:fld id="{E80C50CD-E178-4744-9B35-B2F624D6C5E9}" type="datetimeFigureOut">
               <a:rPr lang="en-US" smtClean="0"/>
-              <a:t>2/13/2026</a:t>
+              <a:t>2/9/2026</a:t>
             </a:fld>
             <a:endParaRPr lang="en-US"/>
           </a:p>
@@ -7360,7 +8221,7 @@
           <a:p>
             <a:fld id="{E80C50CD-E178-4744-9B35-B2F624D6C5E9}" type="datetimeFigureOut">
               <a:rPr lang="en-US" smtClean="0"/>
-              <a:t>2/13/2026</a:t>
+              <a:t>2/9/2026</a:t>
             </a:fld>
             <a:endParaRPr lang="en-US"/>
           </a:p>
@@ -7776,7 +8637,7 @@
           <a:p>
             <a:fld id="{E80C50CD-E178-4744-9B35-B2F624D6C5E9}" type="datetimeFigureOut">
               <a:rPr lang="en-US" smtClean="0"/>
-              <a:t>2/13/2026</a:t>
+              <a:t>2/9/2026</a:t>
             </a:fld>
             <a:endParaRPr lang="en-US"/>
           </a:p>
@@ -7917,7 +8778,7 @@
           <a:p>
             <a:fld id="{E80C50CD-E178-4744-9B35-B2F624D6C5E9}" type="datetimeFigureOut">
               <a:rPr lang="en-US" smtClean="0"/>
-              <a:t>2/13/2026</a:t>
+              <a:t>2/9/2026</a:t>
             </a:fld>
             <a:endParaRPr lang="en-US"/>
           </a:p>
@@ -8030,7 +8891,7 @@
           <a:p>
             <a:fld id="{E80C50CD-E178-4744-9B35-B2F624D6C5E9}" type="datetimeFigureOut">
               <a:rPr lang="en-US" smtClean="0"/>
-              <a:t>2/13/2026</a:t>
+              <a:t>2/9/2026</a:t>
             </a:fld>
             <a:endParaRPr lang="en-US"/>
           </a:p>
@@ -8347,7 +9208,7 @@
           <a:p>
             <a:fld id="{E80C50CD-E178-4744-9B35-B2F624D6C5E9}" type="datetimeFigureOut">
               <a:rPr lang="en-US" smtClean="0"/>
-              <a:t>2/13/2026</a:t>
+              <a:t>2/9/2026</a:t>
             </a:fld>
             <a:endParaRPr lang="en-US"/>
           </a:p>
@@ -8639,7 +9500,7 @@
           <a:p>
             <a:fld id="{E80C50CD-E178-4744-9B35-B2F624D6C5E9}" type="datetimeFigureOut">
               <a:rPr lang="en-US" smtClean="0"/>
-              <a:t>2/13/2026</a:t>
+              <a:t>2/9/2026</a:t>
             </a:fld>
             <a:endParaRPr lang="en-US"/>
           </a:p>
@@ -8879,7 +9740,7 @@
             <a:fld id="{E80C50CD-E178-4744-9B35-B2F624D6C5E9}" type="datetimeFigureOut">
               <a:rPr lang="en-US" smtClean="0"/>
               <a:pPr/>
-              <a:t>2/13/2026</a:t>
+              <a:t>2/9/2026</a:t>
             </a:fld>
             <a:endParaRPr lang="en-US"/>
           </a:p>
@@ -9892,31 +10753,46 @@
           <a:p>
             <a:r>
               <a:rPr lang="en-US" dirty="0"/>
-              <a:t>Continue Club Page development</a:t>
+              <a:t>Corrected Activity Table refreshing error, data can be seen immediately now</a:t>
             </a:r>
           </a:p>
           <a:p>
             <a:r>
               <a:rPr lang="en-US" dirty="0"/>
-              <a:t>Fix leaderboard sport-specific data issue</a:t>
+              <a:t>Set up the leaderboard page to extract user activities and filter them based on activity type or general statistics</a:t>
             </a:r>
           </a:p>
           <a:p>
             <a:r>
               <a:rPr lang="en-US" dirty="0"/>
-              <a:t>Begin challenges page</a:t>
+              <a:t>Begin setup of the Clubs page</a:t>
             </a:r>
           </a:p>
           <a:p>
             <a:r>
               <a:rPr lang="en-US" dirty="0"/>
-              <a:t>Include the ability to view a friend’s profile</a:t>
+              <a:t>Display recent activities on the dashboard</a:t>
             </a:r>
           </a:p>
           <a:p>
-            <a:endParaRPr lang="en-US" dirty="0"/>
-          </a:p>
-          <a:p>
+            <a:r>
+              <a:rPr lang="en-US" dirty="0"/>
+              <a:t>Addition of Friends feature: user can view list available users and friends</a:t>
+            </a:r>
+          </a:p>
+          <a:p>
+            <a:pPr marL="0" indent="0">
+              <a:buNone/>
+            </a:pPr>
+            <a:r>
+              <a:rPr lang="en-US" dirty="0"/>
+              <a:t> </a:t>
+            </a:r>
+          </a:p>
+          <a:p>
+            <a:pPr marL="0" indent="0">
+              <a:buNone/>
+            </a:pPr>
             <a:endParaRPr lang="en-US" dirty="0"/>
           </a:p>
           <a:p>
@@ -10047,7 +10923,47 @@
             </a:pPr>
             <a:r>
               <a:rPr lang="en-US" dirty="0"/>
-              <a:t>Once the leaderboard began extracting sport-specific data correctly, the table rankings would not accurately reflect the data</a:t>
+              <a:t>Async function timing on Activity Table API </a:t>
+            </a:r>
+          </a:p>
+          <a:p>
+            <a:pPr marL="342900" indent="-342900">
+              <a:buFont typeface="+mj-lt"/>
+              <a:buAutoNum type="arabicPeriod"/>
+            </a:pPr>
+            <a:r>
+              <a:rPr lang="en-US" dirty="0"/>
+              <a:t>Owner could join their own club</a:t>
+            </a:r>
+          </a:p>
+          <a:p>
+            <a:pPr marL="342900" indent="-342900">
+              <a:buFont typeface="+mj-lt"/>
+              <a:buAutoNum type="arabicPeriod"/>
+            </a:pPr>
+            <a:r>
+              <a:rPr lang="en-US" dirty="0"/>
+              <a:t>Struggle to filter data on leaderboard based on activity type</a:t>
+            </a:r>
+          </a:p>
+          <a:p>
+            <a:pPr marL="342900" indent="-342900">
+              <a:buFont typeface="+mj-lt"/>
+              <a:buAutoNum type="arabicPeriod"/>
+            </a:pPr>
+            <a:r>
+              <a:rPr lang="en-US" dirty="0"/>
+              <a:t>User can’t add themselves as a friend</a:t>
+            </a:r>
+          </a:p>
+          <a:p>
+            <a:pPr marL="342900" indent="-342900">
+              <a:buFont typeface="+mj-lt"/>
+              <a:buAutoNum type="arabicPeriod"/>
+            </a:pPr>
+            <a:r>
+              <a:rPr lang="en-US" dirty="0"/>
+              <a:t>Duplicate Friends</a:t>
             </a:r>
           </a:p>
           <a:p>
@@ -10120,7 +11036,54 @@
             </a:pPr>
             <a:r>
               <a:rPr lang="en-US" dirty="0"/>
-              <a:t>Rankings were based on only initial build of the leaderboard table. No matter what, the rankings were based on values at time of rendering. Function to continuously render based on filter implemented.</a:t>
+              <a:t>Logic needed rearranged so table API triggered</a:t>
+            </a:r>
+          </a:p>
+          <a:p>
+            <a:pPr marL="342900" indent="-342900">
+              <a:buFont typeface="+mj-lt"/>
+              <a:buAutoNum type="arabicPeriod"/>
+            </a:pPr>
+            <a:r>
+              <a:rPr lang="en-US" dirty="0"/>
+              <a:t>Added column in schema to hold club creators User ID</a:t>
+            </a:r>
+          </a:p>
+          <a:p>
+            <a:pPr marL="342900" indent="-342900">
+              <a:buFont typeface="+mj-lt"/>
+              <a:buAutoNum type="arabicPeriod"/>
+            </a:pPr>
+            <a:r>
+              <a:rPr lang="en-US" dirty="0"/>
+              <a:t>No solution yet</a:t>
+            </a:r>
+          </a:p>
+          <a:p>
+            <a:pPr marL="342900" indent="-342900">
+              <a:buFont typeface="+mj-lt"/>
+              <a:buAutoNum type="arabicPeriod"/>
+            </a:pPr>
+            <a:r>
+              <a:rPr lang="en-US" dirty="0"/>
+              <a:t>Check user unique id from database, and remove from dropdown </a:t>
+            </a:r>
+          </a:p>
+          <a:p>
+            <a:pPr marL="342900" indent="-342900">
+              <a:buFont typeface="+mj-lt"/>
+              <a:buAutoNum type="arabicPeriod"/>
+            </a:pPr>
+            <a:r>
+              <a:rPr lang="en-US" dirty="0"/>
+              <a:t> Once friend is added, take off dropdown list </a:t>
+            </a:r>
+          </a:p>
+          <a:p>
+            <a:pPr lvl="1"/>
+            <a:r>
+              <a:rPr lang="en-US" dirty="0"/>
+              <a:t>Add to existing friend schema so next session friends are visible</a:t>
             </a:r>
           </a:p>
         </p:txBody>
@@ -10752,7 +11715,15 @@
           <a:p>
             <a:r>
               <a:rPr lang="en-US" dirty="0"/>
-              <a:t>Team Week 5 Schedule:</a:t>
+              <a:t>Team </a:t>
+            </a:r>
+            <a:r>
+              <a:rPr lang="en-US"/>
+              <a:t>Week 4 </a:t>
+            </a:r>
+            <a:r>
+              <a:rPr lang="en-US" dirty="0"/>
+              <a:t>Schedule:</a:t>
             </a:r>
           </a:p>
         </p:txBody>
@@ -10899,7 +11870,7 @@
             <p:ph idx="1"/>
             <p:extLst>
               <p:ext uri="{D42A27DB-BD31-4B8C-83A1-F6EECF244321}">
-                <p14:modId xmlns:p14="http://schemas.microsoft.com/office/powerpoint/2010/main" val="1837571450"/>
+                <p14:modId xmlns:p14="http://schemas.microsoft.com/office/powerpoint/2010/main" val="1374972028"/>
               </p:ext>
             </p:extLst>
           </p:nvPr>
@@ -10918,86 +11889,6 @@
     <p:extLst>
       <p:ext uri="{BB962C8B-B14F-4D97-AF65-F5344CB8AC3E}">
         <p14:creationId xmlns:p14="http://schemas.microsoft.com/office/powerpoint/2010/main" val="908531274"/>
-      </p:ext>
-    </p:extLst>
-  </p:cSld>
-  <p:clrMapOvr>
-    <a:masterClrMapping/>
-  </p:clrMapOvr>
-</p:sld>
-</file>
-
-<file path=ppt/slides/slide7.xml><?xml version="1.0" encoding="utf-8"?>
-<p:sld xmlns:a="http://schemas.openxmlformats.org/drawingml/2006/main" xmlns:r="http://schemas.openxmlformats.org/officeDocument/2006/relationships" xmlns:p="http://schemas.openxmlformats.org/presentationml/2006/main">
-  <p:cSld>
-    <p:spTree>
-      <p:nvGrpSpPr>
-        <p:cNvPr id="1" name=""/>
-        <p:cNvGrpSpPr/>
-        <p:nvPr/>
-      </p:nvGrpSpPr>
-      <p:grpSpPr>
-        <a:xfrm>
-          <a:off x="0" y="0"/>
-          <a:ext cx="0" cy="0"/>
-          <a:chOff x="0" y="0"/>
-          <a:chExt cx="0" cy="0"/>
-        </a:xfrm>
-      </p:grpSpPr>
-      <p:sp>
-        <p:nvSpPr>
-          <p:cNvPr id="2" name="Title 1">
-            <a:extLst>
-              <a:ext uri="{FF2B5EF4-FFF2-40B4-BE49-F238E27FC236}">
-                <a16:creationId xmlns:a16="http://schemas.microsoft.com/office/drawing/2014/main" id="{B92A0143-14B3-E3F5-40C1-B722B11D6C39}"/>
-              </a:ext>
-            </a:extLst>
-          </p:cNvPr>
-          <p:cNvSpPr>
-            <a:spLocks noGrp="1"/>
-          </p:cNvSpPr>
-          <p:nvPr>
-            <p:ph type="title"/>
-          </p:nvPr>
-        </p:nvSpPr>
-        <p:spPr/>
-        <p:txBody>
-          <a:bodyPr/>
-          <a:lstStyle/>
-          <a:p>
-            <a:endParaRPr lang="en-US"/>
-          </a:p>
-        </p:txBody>
-      </p:sp>
-      <p:sp>
-        <p:nvSpPr>
-          <p:cNvPr id="3" name="Content Placeholder 2">
-            <a:extLst>
-              <a:ext uri="{FF2B5EF4-FFF2-40B4-BE49-F238E27FC236}">
-                <a16:creationId xmlns:a16="http://schemas.microsoft.com/office/drawing/2014/main" id="{8E69346B-FA36-CD4B-AB2D-E8D1E6148C80}"/>
-              </a:ext>
-            </a:extLst>
-          </p:cNvPr>
-          <p:cNvSpPr>
-            <a:spLocks noGrp="1"/>
-          </p:cNvSpPr>
-          <p:nvPr>
-            <p:ph idx="1"/>
-          </p:nvPr>
-        </p:nvSpPr>
-        <p:spPr/>
-        <p:txBody>
-          <a:bodyPr/>
-          <a:lstStyle/>
-          <a:p>
-            <a:endParaRPr lang="en-US"/>
-          </a:p>
-        </p:txBody>
-      </p:sp>
-    </p:spTree>
-    <p:extLst>
-      <p:ext uri="{BB962C8B-B14F-4D97-AF65-F5344CB8AC3E}">
-        <p14:creationId xmlns:p14="http://schemas.microsoft.com/office/powerpoint/2010/main" val="1387929111"/>
       </p:ext>
     </p:extLst>
   </p:cSld>

</xml_diff>